<commit_message>
Update the java study website
</commit_message>
<xml_diff>
--- a/JavaStudyRecord/JavaStudyRecord.pptx
+++ b/JavaStudyRecord/JavaStudyRecord.pptx
@@ -1,20 +1,115 @@
 
 <file path=ppt/presentation.xml><?xml version="1.0" encoding="utf-8"?>
-<p:presentation xmlns:a="http://schemas.openxmlformats.org/drawingml/2006/main" xmlns:p="http://schemas.openxmlformats.org/presentationml/2006/main" xmlns:r="http://schemas.openxmlformats.org/officeDocument/2006/relationships" xmlns:p14="http://schemas.microsoft.com/office/powerpoint/2010/main" xmlns:p15="http://schemas.microsoft.com/office/powerpoint/2012/main" xmlns:mc="http://schemas.openxmlformats.org/markup-compatibility/2006">
+<p:presentation xmlns:a="http://schemas.openxmlformats.org/drawingml/2006/main" xmlns:r="http://schemas.openxmlformats.org/officeDocument/2006/relationships" xmlns:p="http://schemas.openxmlformats.org/presentationml/2006/main">
   <p:sldMasterIdLst>
-    <p:sldMasterId id="2147483648" r:id="rId2"/>
+    <p:sldMasterId id="2147483648" r:id="rId1"/>
   </p:sldMasterIdLst>
   <p:sldIdLst>
-    <p:sldId id="256" r:id="rId3"/>
-    <p:sldId id="257" r:id="rId4"/>
+    <p:sldId id="256" r:id="rId2"/>
+    <p:sldId id="257" r:id="rId3"/>
   </p:sldIdLst>
   <p:sldSz cx="12192000" cy="6858000"/>
-  <p:notesSz cx="7559675" cy="10691812"/>
+  <p:notesSz cx="7559675" cy="10691813"/>
+  <p:defaultTextStyle>
+    <a:defPPr>
+      <a:defRPr lang="zh-TW"/>
+    </a:defPPr>
+    <a:lvl1pPr marL="0" algn="l" defTabSz="914400" rtl="0" eaLnBrk="1" latinLnBrk="0" hangingPunct="1">
+      <a:defRPr sz="1800" kern="1200">
+        <a:solidFill>
+          <a:schemeClr val="tx1"/>
+        </a:solidFill>
+        <a:latin typeface="+mn-lt"/>
+        <a:ea typeface="+mn-ea"/>
+        <a:cs typeface="+mn-cs"/>
+      </a:defRPr>
+    </a:lvl1pPr>
+    <a:lvl2pPr marL="457200" algn="l" defTabSz="914400" rtl="0" eaLnBrk="1" latinLnBrk="0" hangingPunct="1">
+      <a:defRPr sz="1800" kern="1200">
+        <a:solidFill>
+          <a:schemeClr val="tx1"/>
+        </a:solidFill>
+        <a:latin typeface="+mn-lt"/>
+        <a:ea typeface="+mn-ea"/>
+        <a:cs typeface="+mn-cs"/>
+      </a:defRPr>
+    </a:lvl2pPr>
+    <a:lvl3pPr marL="914400" algn="l" defTabSz="914400" rtl="0" eaLnBrk="1" latinLnBrk="0" hangingPunct="1">
+      <a:defRPr sz="1800" kern="1200">
+        <a:solidFill>
+          <a:schemeClr val="tx1"/>
+        </a:solidFill>
+        <a:latin typeface="+mn-lt"/>
+        <a:ea typeface="+mn-ea"/>
+        <a:cs typeface="+mn-cs"/>
+      </a:defRPr>
+    </a:lvl3pPr>
+    <a:lvl4pPr marL="1371600" algn="l" defTabSz="914400" rtl="0" eaLnBrk="1" latinLnBrk="0" hangingPunct="1">
+      <a:defRPr sz="1800" kern="1200">
+        <a:solidFill>
+          <a:schemeClr val="tx1"/>
+        </a:solidFill>
+        <a:latin typeface="+mn-lt"/>
+        <a:ea typeface="+mn-ea"/>
+        <a:cs typeface="+mn-cs"/>
+      </a:defRPr>
+    </a:lvl4pPr>
+    <a:lvl5pPr marL="1828800" algn="l" defTabSz="914400" rtl="0" eaLnBrk="1" latinLnBrk="0" hangingPunct="1">
+      <a:defRPr sz="1800" kern="1200">
+        <a:solidFill>
+          <a:schemeClr val="tx1"/>
+        </a:solidFill>
+        <a:latin typeface="+mn-lt"/>
+        <a:ea typeface="+mn-ea"/>
+        <a:cs typeface="+mn-cs"/>
+      </a:defRPr>
+    </a:lvl5pPr>
+    <a:lvl6pPr marL="2286000" algn="l" defTabSz="914400" rtl="0" eaLnBrk="1" latinLnBrk="0" hangingPunct="1">
+      <a:defRPr sz="1800" kern="1200">
+        <a:solidFill>
+          <a:schemeClr val="tx1"/>
+        </a:solidFill>
+        <a:latin typeface="+mn-lt"/>
+        <a:ea typeface="+mn-ea"/>
+        <a:cs typeface="+mn-cs"/>
+      </a:defRPr>
+    </a:lvl6pPr>
+    <a:lvl7pPr marL="2743200" algn="l" defTabSz="914400" rtl="0" eaLnBrk="1" latinLnBrk="0" hangingPunct="1">
+      <a:defRPr sz="1800" kern="1200">
+        <a:solidFill>
+          <a:schemeClr val="tx1"/>
+        </a:solidFill>
+        <a:latin typeface="+mn-lt"/>
+        <a:ea typeface="+mn-ea"/>
+        <a:cs typeface="+mn-cs"/>
+      </a:defRPr>
+    </a:lvl7pPr>
+    <a:lvl8pPr marL="3200400" algn="l" defTabSz="914400" rtl="0" eaLnBrk="1" latinLnBrk="0" hangingPunct="1">
+      <a:defRPr sz="1800" kern="1200">
+        <a:solidFill>
+          <a:schemeClr val="tx1"/>
+        </a:solidFill>
+        <a:latin typeface="+mn-lt"/>
+        <a:ea typeface="+mn-ea"/>
+        <a:cs typeface="+mn-cs"/>
+      </a:defRPr>
+    </a:lvl8pPr>
+    <a:lvl9pPr marL="3657600" algn="l" defTabSz="914400" rtl="0" eaLnBrk="1" latinLnBrk="0" hangingPunct="1">
+      <a:defRPr sz="1800" kern="1200">
+        <a:solidFill>
+          <a:schemeClr val="tx1"/>
+        </a:solidFill>
+        <a:latin typeface="+mn-lt"/>
+        <a:ea typeface="+mn-ea"/>
+        <a:cs typeface="+mn-cs"/>
+      </a:defRPr>
+    </a:lvl9pPr>
+  </p:defaultTextStyle>
 </p:presentation>
 </file>
 
 <file path=ppt/slideLayouts/slideLayout1.xml><?xml version="1.0" encoding="utf-8"?>
-<p:sldLayout xmlns:a="http://schemas.openxmlformats.org/drawingml/2006/main" xmlns:p="http://schemas.openxmlformats.org/presentationml/2006/main" xmlns:r="http://schemas.openxmlformats.org/officeDocument/2006/relationships" xmlns:p14="http://schemas.microsoft.com/office/powerpoint/2010/main" xmlns:p15="http://schemas.microsoft.com/office/powerpoint/2012/main" xmlns:mc="http://schemas.openxmlformats.org/markup-compatibility/2006" type="blank" preserve="1">
+<p:sldLayout xmlns:a="http://schemas.openxmlformats.org/drawingml/2006/main" xmlns:r="http://schemas.openxmlformats.org/officeDocument/2006/relationships" xmlns:p="http://schemas.openxmlformats.org/presentationml/2006/main" type="blank" preserve="1">
   <p:cSld name="Blank Slide">
     <p:spTree>
       <p:nvGrpSpPr>
@@ -32,11 +127,14 @@
       </p:grpSpPr>
     </p:spTree>
   </p:cSld>
+  <p:clrMapOvr>
+    <a:masterClrMapping/>
+  </p:clrMapOvr>
 </p:sldLayout>
 </file>
 
 <file path=ppt/slideLayouts/slideLayout10.xml><?xml version="1.0" encoding="utf-8"?>
-<p:sldLayout xmlns:a="http://schemas.openxmlformats.org/drawingml/2006/main" xmlns:p="http://schemas.openxmlformats.org/presentationml/2006/main" xmlns:r="http://schemas.openxmlformats.org/officeDocument/2006/relationships" xmlns:p14="http://schemas.microsoft.com/office/powerpoint/2010/main" xmlns:p15="http://schemas.microsoft.com/office/powerpoint/2012/main" xmlns:mc="http://schemas.openxmlformats.org/markup-compatibility/2006" type="objOverTx" preserve="1">
+<p:sldLayout xmlns:a="http://schemas.openxmlformats.org/drawingml/2006/main" xmlns:r="http://schemas.openxmlformats.org/officeDocument/2006/relationships" xmlns:p="http://schemas.openxmlformats.org/presentationml/2006/main" type="objOverTx" preserve="1">
   <p:cSld name="Title, Content over Content">
     <p:spTree>
       <p:nvGrpSpPr>
@@ -72,11 +170,12 @@
           </a:prstGeom>
         </p:spPr>
         <p:txBody>
-          <a:bodyPr lIns="0" rIns="0" tIns="0" bIns="0" anchor="ctr">
+          <a:bodyPr lIns="0" tIns="0" rIns="0" bIns="0" anchor="ctr">
             <a:spAutoFit/>
           </a:bodyPr>
-          <a:p>
-            <a:endParaRPr b="0" lang="zh-TW" sz="1800" spc="-1" strike="noStrike">
+          <a:lstStyle/>
+          <a:p>
+            <a:endParaRPr lang="zh-TW" sz="1800" b="0" strike="noStrike" spc="-1">
               <a:solidFill>
                 <a:srgbClr val="000000"/>
               </a:solidFill>
@@ -105,11 +204,12 @@
           </a:prstGeom>
         </p:spPr>
         <p:txBody>
-          <a:bodyPr lIns="0" rIns="0" tIns="0" bIns="0">
+          <a:bodyPr lIns="0" tIns="0" rIns="0" bIns="0">
             <a:normAutofit/>
           </a:bodyPr>
-          <a:p>
-            <a:endParaRPr b="0" lang="zh-TW" sz="2800" spc="-1" strike="noStrike">
+          <a:lstStyle/>
+          <a:p>
+            <a:endParaRPr lang="zh-TW" sz="2800" b="0" strike="noStrike" spc="-1">
               <a:solidFill>
                 <a:srgbClr val="000000"/>
               </a:solidFill>
@@ -138,11 +238,12 @@
           </a:prstGeom>
         </p:spPr>
         <p:txBody>
-          <a:bodyPr lIns="0" rIns="0" tIns="0" bIns="0">
+          <a:bodyPr lIns="0" tIns="0" rIns="0" bIns="0">
             <a:normAutofit/>
           </a:bodyPr>
-          <a:p>
-            <a:endParaRPr b="0" lang="zh-TW" sz="2800" spc="-1" strike="noStrike">
+          <a:lstStyle/>
+          <a:p>
+            <a:endParaRPr lang="zh-TW" sz="2800" b="0" strike="noStrike" spc="-1">
               <a:solidFill>
                 <a:srgbClr val="000000"/>
               </a:solidFill>
@@ -153,11 +254,14 @@
       </p:sp>
     </p:spTree>
   </p:cSld>
+  <p:clrMapOvr>
+    <a:masterClrMapping/>
+  </p:clrMapOvr>
 </p:sldLayout>
 </file>
 
 <file path=ppt/slideLayouts/slideLayout11.xml><?xml version="1.0" encoding="utf-8"?>
-<p:sldLayout xmlns:a="http://schemas.openxmlformats.org/drawingml/2006/main" xmlns:p="http://schemas.openxmlformats.org/presentationml/2006/main" xmlns:r="http://schemas.openxmlformats.org/officeDocument/2006/relationships" xmlns:p14="http://schemas.microsoft.com/office/powerpoint/2010/main" xmlns:p15="http://schemas.microsoft.com/office/powerpoint/2012/main" xmlns:mc="http://schemas.openxmlformats.org/markup-compatibility/2006" type="fourObj" preserve="1">
+<p:sldLayout xmlns:a="http://schemas.openxmlformats.org/drawingml/2006/main" xmlns:r="http://schemas.openxmlformats.org/officeDocument/2006/relationships" xmlns:p="http://schemas.openxmlformats.org/presentationml/2006/main" type="fourObj" preserve="1">
   <p:cSld name="Title, 4 Content">
     <p:spTree>
       <p:nvGrpSpPr>
@@ -193,11 +297,12 @@
           </a:prstGeom>
         </p:spPr>
         <p:txBody>
-          <a:bodyPr lIns="0" rIns="0" tIns="0" bIns="0" anchor="ctr">
+          <a:bodyPr lIns="0" tIns="0" rIns="0" bIns="0" anchor="ctr">
             <a:spAutoFit/>
           </a:bodyPr>
-          <a:p>
-            <a:endParaRPr b="0" lang="zh-TW" sz="1800" spc="-1" strike="noStrike">
+          <a:lstStyle/>
+          <a:p>
+            <a:endParaRPr lang="zh-TW" sz="1800" b="0" strike="noStrike" spc="-1">
               <a:solidFill>
                 <a:srgbClr val="000000"/>
               </a:solidFill>
@@ -226,11 +331,12 @@
           </a:prstGeom>
         </p:spPr>
         <p:txBody>
-          <a:bodyPr lIns="0" rIns="0" tIns="0" bIns="0">
+          <a:bodyPr lIns="0" tIns="0" rIns="0" bIns="0">
             <a:normAutofit/>
           </a:bodyPr>
-          <a:p>
-            <a:endParaRPr b="0" lang="zh-TW" sz="2800" spc="-1" strike="noStrike">
+          <a:lstStyle/>
+          <a:p>
+            <a:endParaRPr lang="zh-TW" sz="2800" b="0" strike="noStrike" spc="-1">
               <a:solidFill>
                 <a:srgbClr val="000000"/>
               </a:solidFill>
@@ -259,11 +365,12 @@
           </a:prstGeom>
         </p:spPr>
         <p:txBody>
-          <a:bodyPr lIns="0" rIns="0" tIns="0" bIns="0">
+          <a:bodyPr lIns="0" tIns="0" rIns="0" bIns="0">
             <a:normAutofit/>
           </a:bodyPr>
-          <a:p>
-            <a:endParaRPr b="0" lang="zh-TW" sz="2800" spc="-1" strike="noStrike">
+          <a:lstStyle/>
+          <a:p>
+            <a:endParaRPr lang="zh-TW" sz="2800" b="0" strike="noStrike" spc="-1">
               <a:solidFill>
                 <a:srgbClr val="000000"/>
               </a:solidFill>
@@ -292,11 +399,12 @@
           </a:prstGeom>
         </p:spPr>
         <p:txBody>
-          <a:bodyPr lIns="0" rIns="0" tIns="0" bIns="0">
+          <a:bodyPr lIns="0" tIns="0" rIns="0" bIns="0">
             <a:normAutofit/>
           </a:bodyPr>
-          <a:p>
-            <a:endParaRPr b="0" lang="zh-TW" sz="2800" spc="-1" strike="noStrike">
+          <a:lstStyle/>
+          <a:p>
+            <a:endParaRPr lang="zh-TW" sz="2800" b="0" strike="noStrike" spc="-1">
               <a:solidFill>
                 <a:srgbClr val="000000"/>
               </a:solidFill>
@@ -325,11 +433,12 @@
           </a:prstGeom>
         </p:spPr>
         <p:txBody>
-          <a:bodyPr lIns="0" rIns="0" tIns="0" bIns="0">
+          <a:bodyPr lIns="0" tIns="0" rIns="0" bIns="0">
             <a:normAutofit/>
           </a:bodyPr>
-          <a:p>
-            <a:endParaRPr b="0" lang="zh-TW" sz="2800" spc="-1" strike="noStrike">
+          <a:lstStyle/>
+          <a:p>
+            <a:endParaRPr lang="zh-TW" sz="2800" b="0" strike="noStrike" spc="-1">
               <a:solidFill>
                 <a:srgbClr val="000000"/>
               </a:solidFill>
@@ -340,11 +449,14 @@
       </p:sp>
     </p:spTree>
   </p:cSld>
+  <p:clrMapOvr>
+    <a:masterClrMapping/>
+  </p:clrMapOvr>
 </p:sldLayout>
 </file>
 
 <file path=ppt/slideLayouts/slideLayout12.xml><?xml version="1.0" encoding="utf-8"?>
-<p:sldLayout xmlns:a="http://schemas.openxmlformats.org/drawingml/2006/main" xmlns:p="http://schemas.openxmlformats.org/presentationml/2006/main" xmlns:r="http://schemas.openxmlformats.org/officeDocument/2006/relationships" xmlns:p14="http://schemas.microsoft.com/office/powerpoint/2010/main" xmlns:p15="http://schemas.microsoft.com/office/powerpoint/2012/main" xmlns:mc="http://schemas.openxmlformats.org/markup-compatibility/2006" type="blank" preserve="1">
+<p:sldLayout xmlns:a="http://schemas.openxmlformats.org/drawingml/2006/main" xmlns:r="http://schemas.openxmlformats.org/officeDocument/2006/relationships" xmlns:p="http://schemas.openxmlformats.org/presentationml/2006/main" type="blank" preserve="1">
   <p:cSld name="Title, 6 Content">
     <p:spTree>
       <p:nvGrpSpPr>
@@ -380,11 +492,12 @@
           </a:prstGeom>
         </p:spPr>
         <p:txBody>
-          <a:bodyPr lIns="0" rIns="0" tIns="0" bIns="0" anchor="ctr">
+          <a:bodyPr lIns="0" tIns="0" rIns="0" bIns="0" anchor="ctr">
             <a:spAutoFit/>
           </a:bodyPr>
-          <a:p>
-            <a:endParaRPr b="0" lang="zh-TW" sz="1800" spc="-1" strike="noStrike">
+          <a:lstStyle/>
+          <a:p>
+            <a:endParaRPr lang="zh-TW" sz="1800" b="0" strike="noStrike" spc="-1">
               <a:solidFill>
                 <a:srgbClr val="000000"/>
               </a:solidFill>
@@ -413,11 +526,12 @@
           </a:prstGeom>
         </p:spPr>
         <p:txBody>
-          <a:bodyPr lIns="0" rIns="0" tIns="0" bIns="0">
+          <a:bodyPr lIns="0" tIns="0" rIns="0" bIns="0">
             <a:normAutofit/>
           </a:bodyPr>
-          <a:p>
-            <a:endParaRPr b="0" lang="zh-TW" sz="2800" spc="-1" strike="noStrike">
+          <a:lstStyle/>
+          <a:p>
+            <a:endParaRPr lang="zh-TW" sz="2800" b="0" strike="noStrike" spc="-1">
               <a:solidFill>
                 <a:srgbClr val="000000"/>
               </a:solidFill>
@@ -446,11 +560,12 @@
           </a:prstGeom>
         </p:spPr>
         <p:txBody>
-          <a:bodyPr lIns="0" rIns="0" tIns="0" bIns="0">
+          <a:bodyPr lIns="0" tIns="0" rIns="0" bIns="0">
             <a:normAutofit/>
           </a:bodyPr>
-          <a:p>
-            <a:endParaRPr b="0" lang="zh-TW" sz="2800" spc="-1" strike="noStrike">
+          <a:lstStyle/>
+          <a:p>
+            <a:endParaRPr lang="zh-TW" sz="2800" b="0" strike="noStrike" spc="-1">
               <a:solidFill>
                 <a:srgbClr val="000000"/>
               </a:solidFill>
@@ -479,11 +594,12 @@
           </a:prstGeom>
         </p:spPr>
         <p:txBody>
-          <a:bodyPr lIns="0" rIns="0" tIns="0" bIns="0">
+          <a:bodyPr lIns="0" tIns="0" rIns="0" bIns="0">
             <a:normAutofit/>
           </a:bodyPr>
-          <a:p>
-            <a:endParaRPr b="0" lang="zh-TW" sz="2800" spc="-1" strike="noStrike">
+          <a:lstStyle/>
+          <a:p>
+            <a:endParaRPr lang="zh-TW" sz="2800" b="0" strike="noStrike" spc="-1">
               <a:solidFill>
                 <a:srgbClr val="000000"/>
               </a:solidFill>
@@ -512,11 +628,12 @@
           </a:prstGeom>
         </p:spPr>
         <p:txBody>
-          <a:bodyPr lIns="0" rIns="0" tIns="0" bIns="0">
+          <a:bodyPr lIns="0" tIns="0" rIns="0" bIns="0">
             <a:normAutofit/>
           </a:bodyPr>
-          <a:p>
-            <a:endParaRPr b="0" lang="zh-TW" sz="2800" spc="-1" strike="noStrike">
+          <a:lstStyle/>
+          <a:p>
+            <a:endParaRPr lang="zh-TW" sz="2800" b="0" strike="noStrike" spc="-1">
               <a:solidFill>
                 <a:srgbClr val="000000"/>
               </a:solidFill>
@@ -545,11 +662,12 @@
           </a:prstGeom>
         </p:spPr>
         <p:txBody>
-          <a:bodyPr lIns="0" rIns="0" tIns="0" bIns="0">
+          <a:bodyPr lIns="0" tIns="0" rIns="0" bIns="0">
             <a:normAutofit/>
           </a:bodyPr>
-          <a:p>
-            <a:endParaRPr b="0" lang="zh-TW" sz="2800" spc="-1" strike="noStrike">
+          <a:lstStyle/>
+          <a:p>
+            <a:endParaRPr lang="zh-TW" sz="2800" b="0" strike="noStrike" spc="-1">
               <a:solidFill>
                 <a:srgbClr val="000000"/>
               </a:solidFill>
@@ -578,11 +696,12 @@
           </a:prstGeom>
         </p:spPr>
         <p:txBody>
-          <a:bodyPr lIns="0" rIns="0" tIns="0" bIns="0">
+          <a:bodyPr lIns="0" tIns="0" rIns="0" bIns="0">
             <a:normAutofit/>
           </a:bodyPr>
-          <a:p>
-            <a:endParaRPr b="0" lang="zh-TW" sz="2800" spc="-1" strike="noStrike">
+          <a:lstStyle/>
+          <a:p>
+            <a:endParaRPr lang="zh-TW" sz="2800" b="0" strike="noStrike" spc="-1">
               <a:solidFill>
                 <a:srgbClr val="000000"/>
               </a:solidFill>
@@ -593,11 +712,14 @@
       </p:sp>
     </p:spTree>
   </p:cSld>
+  <p:clrMapOvr>
+    <a:masterClrMapping/>
+  </p:clrMapOvr>
 </p:sldLayout>
 </file>
 
 <file path=ppt/slideLayouts/slideLayout2.xml><?xml version="1.0" encoding="utf-8"?>
-<p:sldLayout xmlns:a="http://schemas.openxmlformats.org/drawingml/2006/main" xmlns:p="http://schemas.openxmlformats.org/presentationml/2006/main" xmlns:r="http://schemas.openxmlformats.org/officeDocument/2006/relationships" xmlns:p14="http://schemas.microsoft.com/office/powerpoint/2010/main" xmlns:p15="http://schemas.microsoft.com/office/powerpoint/2012/main" xmlns:mc="http://schemas.openxmlformats.org/markup-compatibility/2006" type="tx" preserve="1">
+<p:sldLayout xmlns:a="http://schemas.openxmlformats.org/drawingml/2006/main" xmlns:r="http://schemas.openxmlformats.org/officeDocument/2006/relationships" xmlns:p="http://schemas.openxmlformats.org/presentationml/2006/main" type="tx" preserve="1">
   <p:cSld name="Title Slide">
     <p:spTree>
       <p:nvGrpSpPr>
@@ -633,11 +755,12 @@
           </a:prstGeom>
         </p:spPr>
         <p:txBody>
-          <a:bodyPr lIns="0" rIns="0" tIns="0" bIns="0" anchor="ctr">
+          <a:bodyPr lIns="0" tIns="0" rIns="0" bIns="0" anchor="ctr">
             <a:spAutoFit/>
           </a:bodyPr>
-          <a:p>
-            <a:endParaRPr b="0" lang="zh-TW" sz="1800" spc="-1" strike="noStrike">
+          <a:lstStyle/>
+          <a:p>
+            <a:endParaRPr lang="zh-TW" sz="1800" b="0" strike="noStrike" spc="-1">
               <a:solidFill>
                 <a:srgbClr val="000000"/>
               </a:solidFill>
@@ -666,12 +789,13 @@
           </a:prstGeom>
         </p:spPr>
         <p:txBody>
-          <a:bodyPr lIns="0" rIns="0" tIns="0" bIns="0" anchor="ctr">
+          <a:bodyPr lIns="0" tIns="0" rIns="0" bIns="0" anchor="ctr">
             <a:spAutoFit/>
           </a:bodyPr>
+          <a:lstStyle/>
           <a:p>
             <a:pPr algn="ctr"/>
-            <a:endParaRPr b="0" lang="en-US" sz="3200" spc="-1" strike="noStrike">
+            <a:endParaRPr lang="en-US" sz="3200" b="0" strike="noStrike" spc="-1">
               <a:latin typeface="DejaVu Sans"/>
             </a:endParaRPr>
           </a:p>
@@ -679,11 +803,14 @@
       </p:sp>
     </p:spTree>
   </p:cSld>
+  <p:clrMapOvr>
+    <a:masterClrMapping/>
+  </p:clrMapOvr>
 </p:sldLayout>
 </file>
 
 <file path=ppt/slideLayouts/slideLayout3.xml><?xml version="1.0" encoding="utf-8"?>
-<p:sldLayout xmlns:a="http://schemas.openxmlformats.org/drawingml/2006/main" xmlns:p="http://schemas.openxmlformats.org/presentationml/2006/main" xmlns:r="http://schemas.openxmlformats.org/officeDocument/2006/relationships" xmlns:p14="http://schemas.microsoft.com/office/powerpoint/2010/main" xmlns:p15="http://schemas.microsoft.com/office/powerpoint/2012/main" xmlns:mc="http://schemas.openxmlformats.org/markup-compatibility/2006" type="obj" preserve="1">
+<p:sldLayout xmlns:a="http://schemas.openxmlformats.org/drawingml/2006/main" xmlns:r="http://schemas.openxmlformats.org/officeDocument/2006/relationships" xmlns:p="http://schemas.openxmlformats.org/presentationml/2006/main" type="obj" preserve="1">
   <p:cSld name="Title, Content">
     <p:spTree>
       <p:nvGrpSpPr>
@@ -719,11 +846,12 @@
           </a:prstGeom>
         </p:spPr>
         <p:txBody>
-          <a:bodyPr lIns="0" rIns="0" tIns="0" bIns="0" anchor="ctr">
+          <a:bodyPr lIns="0" tIns="0" rIns="0" bIns="0" anchor="ctr">
             <a:spAutoFit/>
           </a:bodyPr>
-          <a:p>
-            <a:endParaRPr b="0" lang="zh-TW" sz="1800" spc="-1" strike="noStrike">
+          <a:lstStyle/>
+          <a:p>
+            <a:endParaRPr lang="zh-TW" sz="1800" b="0" strike="noStrike" spc="-1">
               <a:solidFill>
                 <a:srgbClr val="000000"/>
               </a:solidFill>
@@ -752,11 +880,12 @@
           </a:prstGeom>
         </p:spPr>
         <p:txBody>
-          <a:bodyPr lIns="0" rIns="0" tIns="0" bIns="0">
+          <a:bodyPr lIns="0" tIns="0" rIns="0" bIns="0">
             <a:normAutofit/>
           </a:bodyPr>
-          <a:p>
-            <a:endParaRPr b="0" lang="zh-TW" sz="2800" spc="-1" strike="noStrike">
+          <a:lstStyle/>
+          <a:p>
+            <a:endParaRPr lang="zh-TW" sz="2800" b="0" strike="noStrike" spc="-1">
               <a:solidFill>
                 <a:srgbClr val="000000"/>
               </a:solidFill>
@@ -767,11 +896,14 @@
       </p:sp>
     </p:spTree>
   </p:cSld>
+  <p:clrMapOvr>
+    <a:masterClrMapping/>
+  </p:clrMapOvr>
 </p:sldLayout>
 </file>
 
 <file path=ppt/slideLayouts/slideLayout4.xml><?xml version="1.0" encoding="utf-8"?>
-<p:sldLayout xmlns:a="http://schemas.openxmlformats.org/drawingml/2006/main" xmlns:p="http://schemas.openxmlformats.org/presentationml/2006/main" xmlns:r="http://schemas.openxmlformats.org/officeDocument/2006/relationships" xmlns:p14="http://schemas.microsoft.com/office/powerpoint/2010/main" xmlns:p15="http://schemas.microsoft.com/office/powerpoint/2012/main" xmlns:mc="http://schemas.openxmlformats.org/markup-compatibility/2006" type="twoObj" preserve="1">
+<p:sldLayout xmlns:a="http://schemas.openxmlformats.org/drawingml/2006/main" xmlns:r="http://schemas.openxmlformats.org/officeDocument/2006/relationships" xmlns:p="http://schemas.openxmlformats.org/presentationml/2006/main" type="twoObj" preserve="1">
   <p:cSld name="Title, 2 Content">
     <p:spTree>
       <p:nvGrpSpPr>
@@ -807,11 +939,12 @@
           </a:prstGeom>
         </p:spPr>
         <p:txBody>
-          <a:bodyPr lIns="0" rIns="0" tIns="0" bIns="0" anchor="ctr">
+          <a:bodyPr lIns="0" tIns="0" rIns="0" bIns="0" anchor="ctr">
             <a:spAutoFit/>
           </a:bodyPr>
-          <a:p>
-            <a:endParaRPr b="0" lang="zh-TW" sz="1800" spc="-1" strike="noStrike">
+          <a:lstStyle/>
+          <a:p>
+            <a:endParaRPr lang="zh-TW" sz="1800" b="0" strike="noStrike" spc="-1">
               <a:solidFill>
                 <a:srgbClr val="000000"/>
               </a:solidFill>
@@ -840,11 +973,12 @@
           </a:prstGeom>
         </p:spPr>
         <p:txBody>
-          <a:bodyPr lIns="0" rIns="0" tIns="0" bIns="0">
+          <a:bodyPr lIns="0" tIns="0" rIns="0" bIns="0">
             <a:normAutofit/>
           </a:bodyPr>
-          <a:p>
-            <a:endParaRPr b="0" lang="zh-TW" sz="2800" spc="-1" strike="noStrike">
+          <a:lstStyle/>
+          <a:p>
+            <a:endParaRPr lang="zh-TW" sz="2800" b="0" strike="noStrike" spc="-1">
               <a:solidFill>
                 <a:srgbClr val="000000"/>
               </a:solidFill>
@@ -873,11 +1007,12 @@
           </a:prstGeom>
         </p:spPr>
         <p:txBody>
-          <a:bodyPr lIns="0" rIns="0" tIns="0" bIns="0">
+          <a:bodyPr lIns="0" tIns="0" rIns="0" bIns="0">
             <a:normAutofit/>
           </a:bodyPr>
-          <a:p>
-            <a:endParaRPr b="0" lang="zh-TW" sz="2800" spc="-1" strike="noStrike">
+          <a:lstStyle/>
+          <a:p>
+            <a:endParaRPr lang="zh-TW" sz="2800" b="0" strike="noStrike" spc="-1">
               <a:solidFill>
                 <a:srgbClr val="000000"/>
               </a:solidFill>
@@ -888,11 +1023,14 @@
       </p:sp>
     </p:spTree>
   </p:cSld>
+  <p:clrMapOvr>
+    <a:masterClrMapping/>
+  </p:clrMapOvr>
 </p:sldLayout>
 </file>
 
 <file path=ppt/slideLayouts/slideLayout5.xml><?xml version="1.0" encoding="utf-8"?>
-<p:sldLayout xmlns:a="http://schemas.openxmlformats.org/drawingml/2006/main" xmlns:p="http://schemas.openxmlformats.org/presentationml/2006/main" xmlns:r="http://schemas.openxmlformats.org/officeDocument/2006/relationships" xmlns:p14="http://schemas.microsoft.com/office/powerpoint/2010/main" xmlns:p15="http://schemas.microsoft.com/office/powerpoint/2012/main" xmlns:mc="http://schemas.openxmlformats.org/markup-compatibility/2006" type="titleOnly" preserve="1">
+<p:sldLayout xmlns:a="http://schemas.openxmlformats.org/drawingml/2006/main" xmlns:r="http://schemas.openxmlformats.org/officeDocument/2006/relationships" xmlns:p="http://schemas.openxmlformats.org/presentationml/2006/main" type="titleOnly" preserve="1">
   <p:cSld name="Title Only">
     <p:spTree>
       <p:nvGrpSpPr>
@@ -928,11 +1066,12 @@
           </a:prstGeom>
         </p:spPr>
         <p:txBody>
-          <a:bodyPr lIns="0" rIns="0" tIns="0" bIns="0" anchor="ctr">
+          <a:bodyPr lIns="0" tIns="0" rIns="0" bIns="0" anchor="ctr">
             <a:spAutoFit/>
           </a:bodyPr>
-          <a:p>
-            <a:endParaRPr b="0" lang="zh-TW" sz="1800" spc="-1" strike="noStrike">
+          <a:lstStyle/>
+          <a:p>
+            <a:endParaRPr lang="zh-TW" sz="1800" b="0" strike="noStrike" spc="-1">
               <a:solidFill>
                 <a:srgbClr val="000000"/>
               </a:solidFill>
@@ -943,11 +1082,14 @@
       </p:sp>
     </p:spTree>
   </p:cSld>
+  <p:clrMapOvr>
+    <a:masterClrMapping/>
+  </p:clrMapOvr>
 </p:sldLayout>
 </file>
 
 <file path=ppt/slideLayouts/slideLayout6.xml><?xml version="1.0" encoding="utf-8"?>
-<p:sldLayout xmlns:a="http://schemas.openxmlformats.org/drawingml/2006/main" xmlns:p="http://schemas.openxmlformats.org/presentationml/2006/main" xmlns:r="http://schemas.openxmlformats.org/officeDocument/2006/relationships" xmlns:p14="http://schemas.microsoft.com/office/powerpoint/2010/main" xmlns:p15="http://schemas.microsoft.com/office/powerpoint/2012/main" xmlns:mc="http://schemas.openxmlformats.org/markup-compatibility/2006" type="objOnly" preserve="1">
+<p:sldLayout xmlns:a="http://schemas.openxmlformats.org/drawingml/2006/main" xmlns:r="http://schemas.openxmlformats.org/officeDocument/2006/relationships" xmlns:p="http://schemas.openxmlformats.org/presentationml/2006/main" type="objOnly" preserve="1">
   <p:cSld name="Centered Text">
     <p:spTree>
       <p:nvGrpSpPr>
@@ -983,12 +1125,13 @@
           </a:prstGeom>
         </p:spPr>
         <p:txBody>
-          <a:bodyPr lIns="0" rIns="0" tIns="0" bIns="0" anchor="ctr">
+          <a:bodyPr lIns="0" tIns="0" rIns="0" bIns="0" anchor="ctr">
             <a:spAutoFit/>
           </a:bodyPr>
+          <a:lstStyle/>
           <a:p>
             <a:pPr algn="ctr"/>
-            <a:endParaRPr b="0" lang="en-US" sz="3200" spc="-1" strike="noStrike">
+            <a:endParaRPr lang="en-US" sz="3200" b="0" strike="noStrike" spc="-1">
               <a:latin typeface="DejaVu Sans"/>
             </a:endParaRPr>
           </a:p>
@@ -996,11 +1139,14 @@
       </p:sp>
     </p:spTree>
   </p:cSld>
+  <p:clrMapOvr>
+    <a:masterClrMapping/>
+  </p:clrMapOvr>
 </p:sldLayout>
 </file>
 
 <file path=ppt/slideLayouts/slideLayout7.xml><?xml version="1.0" encoding="utf-8"?>
-<p:sldLayout xmlns:a="http://schemas.openxmlformats.org/drawingml/2006/main" xmlns:p="http://schemas.openxmlformats.org/presentationml/2006/main" xmlns:r="http://schemas.openxmlformats.org/officeDocument/2006/relationships" xmlns:p14="http://schemas.microsoft.com/office/powerpoint/2010/main" xmlns:p15="http://schemas.microsoft.com/office/powerpoint/2012/main" xmlns:mc="http://schemas.openxmlformats.org/markup-compatibility/2006" type="twoObjAndObj" preserve="1">
+<p:sldLayout xmlns:a="http://schemas.openxmlformats.org/drawingml/2006/main" xmlns:r="http://schemas.openxmlformats.org/officeDocument/2006/relationships" xmlns:p="http://schemas.openxmlformats.org/presentationml/2006/main" type="twoObjAndObj" preserve="1">
   <p:cSld name="Title, 2 Content and Content">
     <p:spTree>
       <p:nvGrpSpPr>
@@ -1036,11 +1182,12 @@
           </a:prstGeom>
         </p:spPr>
         <p:txBody>
-          <a:bodyPr lIns="0" rIns="0" tIns="0" bIns="0" anchor="ctr">
+          <a:bodyPr lIns="0" tIns="0" rIns="0" bIns="0" anchor="ctr">
             <a:spAutoFit/>
           </a:bodyPr>
-          <a:p>
-            <a:endParaRPr b="0" lang="zh-TW" sz="1800" spc="-1" strike="noStrike">
+          <a:lstStyle/>
+          <a:p>
+            <a:endParaRPr lang="zh-TW" sz="1800" b="0" strike="noStrike" spc="-1">
               <a:solidFill>
                 <a:srgbClr val="000000"/>
               </a:solidFill>
@@ -1069,11 +1216,12 @@
           </a:prstGeom>
         </p:spPr>
         <p:txBody>
-          <a:bodyPr lIns="0" rIns="0" tIns="0" bIns="0">
+          <a:bodyPr lIns="0" tIns="0" rIns="0" bIns="0">
             <a:normAutofit/>
           </a:bodyPr>
-          <a:p>
-            <a:endParaRPr b="0" lang="zh-TW" sz="2800" spc="-1" strike="noStrike">
+          <a:lstStyle/>
+          <a:p>
+            <a:endParaRPr lang="zh-TW" sz="2800" b="0" strike="noStrike" spc="-1">
               <a:solidFill>
                 <a:srgbClr val="000000"/>
               </a:solidFill>
@@ -1102,11 +1250,12 @@
           </a:prstGeom>
         </p:spPr>
         <p:txBody>
-          <a:bodyPr lIns="0" rIns="0" tIns="0" bIns="0">
+          <a:bodyPr lIns="0" tIns="0" rIns="0" bIns="0">
             <a:normAutofit/>
           </a:bodyPr>
-          <a:p>
-            <a:endParaRPr b="0" lang="zh-TW" sz="2800" spc="-1" strike="noStrike">
+          <a:lstStyle/>
+          <a:p>
+            <a:endParaRPr lang="zh-TW" sz="2800" b="0" strike="noStrike" spc="-1">
               <a:solidFill>
                 <a:srgbClr val="000000"/>
               </a:solidFill>
@@ -1135,11 +1284,12 @@
           </a:prstGeom>
         </p:spPr>
         <p:txBody>
-          <a:bodyPr lIns="0" rIns="0" tIns="0" bIns="0">
+          <a:bodyPr lIns="0" tIns="0" rIns="0" bIns="0">
             <a:normAutofit/>
           </a:bodyPr>
-          <a:p>
-            <a:endParaRPr b="0" lang="zh-TW" sz="2800" spc="-1" strike="noStrike">
+          <a:lstStyle/>
+          <a:p>
+            <a:endParaRPr lang="zh-TW" sz="2800" b="0" strike="noStrike" spc="-1">
               <a:solidFill>
                 <a:srgbClr val="000000"/>
               </a:solidFill>
@@ -1150,11 +1300,14 @@
       </p:sp>
     </p:spTree>
   </p:cSld>
+  <p:clrMapOvr>
+    <a:masterClrMapping/>
+  </p:clrMapOvr>
 </p:sldLayout>
 </file>
 
 <file path=ppt/slideLayouts/slideLayout8.xml><?xml version="1.0" encoding="utf-8"?>
-<p:sldLayout xmlns:a="http://schemas.openxmlformats.org/drawingml/2006/main" xmlns:p="http://schemas.openxmlformats.org/presentationml/2006/main" xmlns:r="http://schemas.openxmlformats.org/officeDocument/2006/relationships" xmlns:p14="http://schemas.microsoft.com/office/powerpoint/2010/main" xmlns:p15="http://schemas.microsoft.com/office/powerpoint/2012/main" xmlns:mc="http://schemas.openxmlformats.org/markup-compatibility/2006" type="objAndTwoObj" preserve="1">
+<p:sldLayout xmlns:a="http://schemas.openxmlformats.org/drawingml/2006/main" xmlns:r="http://schemas.openxmlformats.org/officeDocument/2006/relationships" xmlns:p="http://schemas.openxmlformats.org/presentationml/2006/main" type="objAndTwoObj" preserve="1">
   <p:cSld name="Title Content and 2 Content">
     <p:spTree>
       <p:nvGrpSpPr>
@@ -1190,11 +1343,12 @@
           </a:prstGeom>
         </p:spPr>
         <p:txBody>
-          <a:bodyPr lIns="0" rIns="0" tIns="0" bIns="0" anchor="ctr">
+          <a:bodyPr lIns="0" tIns="0" rIns="0" bIns="0" anchor="ctr">
             <a:spAutoFit/>
           </a:bodyPr>
-          <a:p>
-            <a:endParaRPr b="0" lang="zh-TW" sz="1800" spc="-1" strike="noStrike">
+          <a:lstStyle/>
+          <a:p>
+            <a:endParaRPr lang="zh-TW" sz="1800" b="0" strike="noStrike" spc="-1">
               <a:solidFill>
                 <a:srgbClr val="000000"/>
               </a:solidFill>
@@ -1223,11 +1377,12 @@
           </a:prstGeom>
         </p:spPr>
         <p:txBody>
-          <a:bodyPr lIns="0" rIns="0" tIns="0" bIns="0">
+          <a:bodyPr lIns="0" tIns="0" rIns="0" bIns="0">
             <a:normAutofit/>
           </a:bodyPr>
-          <a:p>
-            <a:endParaRPr b="0" lang="zh-TW" sz="2800" spc="-1" strike="noStrike">
+          <a:lstStyle/>
+          <a:p>
+            <a:endParaRPr lang="zh-TW" sz="2800" b="0" strike="noStrike" spc="-1">
               <a:solidFill>
                 <a:srgbClr val="000000"/>
               </a:solidFill>
@@ -1256,11 +1411,12 @@
           </a:prstGeom>
         </p:spPr>
         <p:txBody>
-          <a:bodyPr lIns="0" rIns="0" tIns="0" bIns="0">
+          <a:bodyPr lIns="0" tIns="0" rIns="0" bIns="0">
             <a:normAutofit/>
           </a:bodyPr>
-          <a:p>
-            <a:endParaRPr b="0" lang="zh-TW" sz="2800" spc="-1" strike="noStrike">
+          <a:lstStyle/>
+          <a:p>
+            <a:endParaRPr lang="zh-TW" sz="2800" b="0" strike="noStrike" spc="-1">
               <a:solidFill>
                 <a:srgbClr val="000000"/>
               </a:solidFill>
@@ -1289,11 +1445,12 @@
           </a:prstGeom>
         </p:spPr>
         <p:txBody>
-          <a:bodyPr lIns="0" rIns="0" tIns="0" bIns="0">
+          <a:bodyPr lIns="0" tIns="0" rIns="0" bIns="0">
             <a:normAutofit/>
           </a:bodyPr>
-          <a:p>
-            <a:endParaRPr b="0" lang="zh-TW" sz="2800" spc="-1" strike="noStrike">
+          <a:lstStyle/>
+          <a:p>
+            <a:endParaRPr lang="zh-TW" sz="2800" b="0" strike="noStrike" spc="-1">
               <a:solidFill>
                 <a:srgbClr val="000000"/>
               </a:solidFill>
@@ -1304,11 +1461,14 @@
       </p:sp>
     </p:spTree>
   </p:cSld>
+  <p:clrMapOvr>
+    <a:masterClrMapping/>
+  </p:clrMapOvr>
 </p:sldLayout>
 </file>
 
 <file path=ppt/slideLayouts/slideLayout9.xml><?xml version="1.0" encoding="utf-8"?>
-<p:sldLayout xmlns:a="http://schemas.openxmlformats.org/drawingml/2006/main" xmlns:p="http://schemas.openxmlformats.org/presentationml/2006/main" xmlns:r="http://schemas.openxmlformats.org/officeDocument/2006/relationships" xmlns:p14="http://schemas.microsoft.com/office/powerpoint/2010/main" xmlns:p15="http://schemas.microsoft.com/office/powerpoint/2012/main" xmlns:mc="http://schemas.openxmlformats.org/markup-compatibility/2006" type="twoObjOverTx" preserve="1">
+<p:sldLayout xmlns:a="http://schemas.openxmlformats.org/drawingml/2006/main" xmlns:r="http://schemas.openxmlformats.org/officeDocument/2006/relationships" xmlns:p="http://schemas.openxmlformats.org/presentationml/2006/main" type="twoObjOverTx" preserve="1">
   <p:cSld name="Title, 2 Content over Content">
     <p:spTree>
       <p:nvGrpSpPr>
@@ -1344,11 +1504,12 @@
           </a:prstGeom>
         </p:spPr>
         <p:txBody>
-          <a:bodyPr lIns="0" rIns="0" tIns="0" bIns="0" anchor="ctr">
+          <a:bodyPr lIns="0" tIns="0" rIns="0" bIns="0" anchor="ctr">
             <a:spAutoFit/>
           </a:bodyPr>
-          <a:p>
-            <a:endParaRPr b="0" lang="zh-TW" sz="1800" spc="-1" strike="noStrike">
+          <a:lstStyle/>
+          <a:p>
+            <a:endParaRPr lang="zh-TW" sz="1800" b="0" strike="noStrike" spc="-1">
               <a:solidFill>
                 <a:srgbClr val="000000"/>
               </a:solidFill>
@@ -1377,11 +1538,12 @@
           </a:prstGeom>
         </p:spPr>
         <p:txBody>
-          <a:bodyPr lIns="0" rIns="0" tIns="0" bIns="0">
+          <a:bodyPr lIns="0" tIns="0" rIns="0" bIns="0">
             <a:normAutofit/>
           </a:bodyPr>
-          <a:p>
-            <a:endParaRPr b="0" lang="zh-TW" sz="2800" spc="-1" strike="noStrike">
+          <a:lstStyle/>
+          <a:p>
+            <a:endParaRPr lang="zh-TW" sz="2800" b="0" strike="noStrike" spc="-1">
               <a:solidFill>
                 <a:srgbClr val="000000"/>
               </a:solidFill>
@@ -1410,11 +1572,12 @@
           </a:prstGeom>
         </p:spPr>
         <p:txBody>
-          <a:bodyPr lIns="0" rIns="0" tIns="0" bIns="0">
+          <a:bodyPr lIns="0" tIns="0" rIns="0" bIns="0">
             <a:normAutofit/>
           </a:bodyPr>
-          <a:p>
-            <a:endParaRPr b="0" lang="zh-TW" sz="2800" spc="-1" strike="noStrike">
+          <a:lstStyle/>
+          <a:p>
+            <a:endParaRPr lang="zh-TW" sz="2800" b="0" strike="noStrike" spc="-1">
               <a:solidFill>
                 <a:srgbClr val="000000"/>
               </a:solidFill>
@@ -1443,11 +1606,12 @@
           </a:prstGeom>
         </p:spPr>
         <p:txBody>
-          <a:bodyPr lIns="0" rIns="0" tIns="0" bIns="0">
+          <a:bodyPr lIns="0" tIns="0" rIns="0" bIns="0">
             <a:normAutofit/>
           </a:bodyPr>
-          <a:p>
-            <a:endParaRPr b="0" lang="zh-TW" sz="2800" spc="-1" strike="noStrike">
+          <a:lstStyle/>
+          <a:p>
+            <a:endParaRPr lang="zh-TW" sz="2800" b="0" strike="noStrike" spc="-1">
               <a:solidFill>
                 <a:srgbClr val="000000"/>
               </a:solidFill>
@@ -1458,17 +1622,21 @@
       </p:sp>
     </p:spTree>
   </p:cSld>
+  <p:clrMapOvr>
+    <a:masterClrMapping/>
+  </p:clrMapOvr>
 </p:sldLayout>
 </file>
 
 <file path=ppt/slideMasters/slideMaster1.xml><?xml version="1.0" encoding="utf-8"?>
-<p:sldMaster xmlns:a="http://schemas.openxmlformats.org/drawingml/2006/main" xmlns:p="http://schemas.openxmlformats.org/presentationml/2006/main" xmlns:r="http://schemas.openxmlformats.org/officeDocument/2006/relationships" xmlns:p14="http://schemas.microsoft.com/office/powerpoint/2010/main" xmlns:p15="http://schemas.microsoft.com/office/powerpoint/2012/main" xmlns:mc="http://schemas.openxmlformats.org/markup-compatibility/2006">
+<p:sldMaster xmlns:a="http://schemas.openxmlformats.org/drawingml/2006/main" xmlns:r="http://schemas.openxmlformats.org/officeDocument/2006/relationships" xmlns:p="http://schemas.openxmlformats.org/presentationml/2006/main">
   <p:cSld>
     <p:bg>
       <p:bgPr>
         <a:solidFill>
-          <a:srgbClr val="ffffff"/>
+          <a:srgbClr val="FFFFFF"/>
         </a:solidFill>
+        <a:effectLst/>
       </p:bgPr>
     </p:bg>
     <p:spTree>
@@ -1487,7 +1655,7 @@
       </p:grpSpPr>
       <p:sp>
         <p:nvSpPr>
-          <p:cNvPr id="0" name="PlaceHolder 1"/>
+          <p:cNvPr id="5" name="PlaceHolder 1"/>
           <p:cNvSpPr>
             <a:spLocks noGrp="1"/>
           </p:cNvSpPr>
@@ -1508,6 +1676,7 @@
           <a:bodyPr anchor="b">
             <a:noAutofit/>
           </a:bodyPr>
+          <a:lstStyle/>
           <a:p>
             <a:pPr algn="ctr">
               <a:lnSpc>
@@ -1515,7 +1684,7 @@
               </a:lnSpc>
             </a:pPr>
             <a:r>
-              <a:rPr b="0" lang="zh-TW" sz="6000" spc="-1" strike="noStrike">
+              <a:rPr lang="zh-TW" sz="6000" b="0" strike="noStrike" spc="-1">
                 <a:solidFill>
                   <a:srgbClr val="000000"/>
                 </a:solidFill>
@@ -1523,18 +1692,18 @@
               </a:rPr>
               <a:t>按一下以編輯母片標題樣式</a:t>
             </a:r>
-            <a:endParaRPr b="0" lang="zh-TW" sz="6000" spc="-1" strike="noStrike">
-              <a:solidFill>
-                <a:srgbClr val="000000"/>
-              </a:solidFill>
-              <a:latin typeface="Calibri"/>
-            </a:endParaRPr>
-          </a:p>
-        </p:txBody>
-      </p:sp>
-      <p:sp>
-        <p:nvSpPr>
-          <p:cNvPr id="1" name="PlaceHolder 2"/>
+            <a:endParaRPr lang="zh-TW" sz="6000" b="0" strike="noStrike" spc="-1">
+              <a:solidFill>
+                <a:srgbClr val="000000"/>
+              </a:solidFill>
+              <a:latin typeface="Calibri"/>
+            </a:endParaRPr>
+          </a:p>
+        </p:txBody>
+      </p:sp>
+      <p:sp>
+        <p:nvSpPr>
+          <p:cNvPr id="6" name="PlaceHolder 2"/>
           <p:cNvSpPr>
             <a:spLocks noGrp="1"/>
           </p:cNvSpPr>
@@ -1555,6 +1724,7 @@
           <a:bodyPr anchor="ctr">
             <a:noAutofit/>
           </a:bodyPr>
+          <a:lstStyle/>
           <a:p>
             <a:pPr>
               <a:lnSpc>
@@ -1562,15 +1732,15 @@
               </a:lnSpc>
             </a:pPr>
             <a:fld id="{B7AB3CDA-2B69-4C63-A40D-0F1B5DBA250E}" type="datetime">
-              <a:rPr b="0" lang="en-US" sz="1200" spc="-1" strike="noStrike">
+              <a:rPr lang="en-US" sz="1200" b="0" strike="noStrike" spc="-1">
                 <a:solidFill>
-                  <a:srgbClr val="8b8b8b"/>
+                  <a:srgbClr val="8B8B8B"/>
                 </a:solidFill>
                 <a:latin typeface="Calibri"/>
               </a:rPr>
-              <a:t>11/18/23</a:t>
+              <a:t>11/18/2023</a:t>
             </a:fld>
-            <a:endParaRPr b="0" lang="en-US" sz="1200" spc="-1" strike="noStrike">
+            <a:endParaRPr lang="en-US" sz="1200" b="0" strike="noStrike" spc="-1">
               <a:latin typeface="DejaVu Serif"/>
             </a:endParaRPr>
           </a:p>
@@ -1599,8 +1769,9 @@
           <a:bodyPr anchor="ctr">
             <a:noAutofit/>
           </a:bodyPr>
-          <a:p>
-            <a:endParaRPr b="0" lang="en-US" sz="2400" spc="-1" strike="noStrike">
+          <a:lstStyle/>
+          <a:p>
+            <a:endParaRPr lang="en-US" sz="2400" b="0" strike="noStrike" spc="-1">
               <a:latin typeface="DejaVu Serif"/>
             </a:endParaRPr>
           </a:p>
@@ -1629,6 +1800,7 @@
           <a:bodyPr anchor="ctr">
             <a:noAutofit/>
           </a:bodyPr>
+          <a:lstStyle/>
           <a:p>
             <a:pPr algn="r">
               <a:lnSpc>
@@ -1636,15 +1808,15 @@
               </a:lnSpc>
             </a:pPr>
             <a:fld id="{ABC0722D-0231-4EE3-8919-A645028D36B0}" type="slidenum">
-              <a:rPr b="0" lang="en-US" sz="1200" spc="-1" strike="noStrike">
+              <a:rPr lang="en-US" sz="1200" b="0" strike="noStrike" spc="-1">
                 <a:solidFill>
-                  <a:srgbClr val="8b8b8b"/>
+                  <a:srgbClr val="8B8B8B"/>
                 </a:solidFill>
                 <a:latin typeface="Calibri"/>
               </a:rPr>
-              <a:t>2</a:t>
+              <a:t>‹#›</a:t>
             </a:fld>
-            <a:endParaRPr b="0" lang="en-US" sz="1200" spc="-1" strike="noStrike">
+            <a:endParaRPr lang="en-US" sz="1200" b="0" strike="noStrike" spc="-1">
               <a:latin typeface="DejaVu Serif"/>
             </a:endParaRPr>
           </a:p>
@@ -1670,9 +1842,10 @@
           </a:prstGeom>
         </p:spPr>
         <p:txBody>
-          <a:bodyPr lIns="0" rIns="0" tIns="0" bIns="0">
+          <a:bodyPr lIns="0" tIns="0" rIns="0" bIns="0">
             <a:normAutofit/>
           </a:bodyPr>
+          <a:lstStyle/>
           <a:p>
             <a:pPr marL="432000" indent="-324000">
               <a:spcBef>
@@ -1686,7 +1859,7 @@
               <a:buChar char=""/>
             </a:pPr>
             <a:r>
-              <a:rPr b="0" lang="zh-TW" sz="2800" spc="-1" strike="noStrike">
+              <a:rPr lang="zh-TW" sz="2800" b="0" strike="noStrike" spc="-1">
                 <a:solidFill>
                   <a:srgbClr val="000000"/>
                 </a:solidFill>
@@ -1694,15 +1867,9 @@
               </a:rPr>
               <a:t>单击鼠标编辑大纲文字格式</a:t>
             </a:r>
-            <a:endParaRPr b="0" lang="zh-TW" sz="2800" spc="-1" strike="noStrike">
-              <a:solidFill>
-                <a:srgbClr val="000000"/>
-              </a:solidFill>
-              <a:latin typeface="Calibri"/>
-            </a:endParaRPr>
-          </a:p>
-          <a:p>
-            <a:pPr lvl="1" marL="864000" indent="-324000">
+          </a:p>
+          <a:p>
+            <a:pPr marL="864000" lvl="1" indent="-324000">
               <a:spcBef>
                 <a:spcPts val="1134"/>
               </a:spcBef>
@@ -1714,7 +1881,7 @@
               <a:buChar char=""/>
             </a:pPr>
             <a:r>
-              <a:rPr b="0" lang="zh-TW" sz="2000" spc="-1" strike="noStrike">
+              <a:rPr lang="zh-TW" sz="2000" b="0" strike="noStrike" spc="-1">
                 <a:solidFill>
                   <a:srgbClr val="000000"/>
                 </a:solidFill>
@@ -1722,15 +1889,9 @@
               </a:rPr>
               <a:t>第二个大纲级</a:t>
             </a:r>
-            <a:endParaRPr b="0" lang="zh-TW" sz="2000" spc="-1" strike="noStrike">
-              <a:solidFill>
-                <a:srgbClr val="000000"/>
-              </a:solidFill>
-              <a:latin typeface="Calibri"/>
-            </a:endParaRPr>
-          </a:p>
-          <a:p>
-            <a:pPr lvl="2" marL="1296000" indent="-288000">
+          </a:p>
+          <a:p>
+            <a:pPr marL="1296000" lvl="2" indent="-288000">
               <a:spcBef>
                 <a:spcPts val="850"/>
               </a:spcBef>
@@ -1742,7 +1903,7 @@
               <a:buChar char=""/>
             </a:pPr>
             <a:r>
-              <a:rPr b="0" lang="zh-TW" sz="1800" spc="-1" strike="noStrike">
+              <a:rPr lang="zh-TW" sz="1800" b="0" strike="noStrike" spc="-1">
                 <a:solidFill>
                   <a:srgbClr val="000000"/>
                 </a:solidFill>
@@ -1750,15 +1911,9 @@
               </a:rPr>
               <a:t>第三大纲级别</a:t>
             </a:r>
-            <a:endParaRPr b="0" lang="zh-TW" sz="1800" spc="-1" strike="noStrike">
-              <a:solidFill>
-                <a:srgbClr val="000000"/>
-              </a:solidFill>
-              <a:latin typeface="Calibri"/>
-            </a:endParaRPr>
-          </a:p>
-          <a:p>
-            <a:pPr lvl="3" marL="1728000" indent="-216000">
+          </a:p>
+          <a:p>
+            <a:pPr marL="1728000" lvl="3" indent="-216000">
               <a:spcBef>
                 <a:spcPts val="567"/>
               </a:spcBef>
@@ -1770,7 +1925,7 @@
               <a:buChar char=""/>
             </a:pPr>
             <a:r>
-              <a:rPr b="0" lang="zh-TW" sz="1800" spc="-1" strike="noStrike">
+              <a:rPr lang="zh-TW" sz="1800" b="0" strike="noStrike" spc="-1">
                 <a:solidFill>
                   <a:srgbClr val="000000"/>
                 </a:solidFill>
@@ -1778,15 +1933,9 @@
               </a:rPr>
               <a:t>第四大纲级别</a:t>
             </a:r>
-            <a:endParaRPr b="0" lang="zh-TW" sz="1800" spc="-1" strike="noStrike">
-              <a:solidFill>
-                <a:srgbClr val="000000"/>
-              </a:solidFill>
-              <a:latin typeface="Calibri"/>
-            </a:endParaRPr>
-          </a:p>
-          <a:p>
-            <a:pPr lvl="4" marL="2160000" indent="-216000">
+          </a:p>
+          <a:p>
+            <a:pPr marL="2160000" lvl="4" indent="-216000">
               <a:spcBef>
                 <a:spcPts val="283"/>
               </a:spcBef>
@@ -1798,7 +1947,7 @@
               <a:buChar char=""/>
             </a:pPr>
             <a:r>
-              <a:rPr b="0" lang="zh-TW" sz="2000" spc="-1" strike="noStrike">
+              <a:rPr lang="zh-TW" sz="2000" b="0" strike="noStrike" spc="-1">
                 <a:solidFill>
                   <a:srgbClr val="000000"/>
                 </a:solidFill>
@@ -1806,15 +1955,9 @@
               </a:rPr>
               <a:t>第五大纲级别</a:t>
             </a:r>
-            <a:endParaRPr b="0" lang="zh-TW" sz="2000" spc="-1" strike="noStrike">
-              <a:solidFill>
-                <a:srgbClr val="000000"/>
-              </a:solidFill>
-              <a:latin typeface="Calibri"/>
-            </a:endParaRPr>
-          </a:p>
-          <a:p>
-            <a:pPr lvl="5" marL="2592000" indent="-216000">
+          </a:p>
+          <a:p>
+            <a:pPr marL="2592000" lvl="5" indent="-216000">
               <a:spcBef>
                 <a:spcPts val="283"/>
               </a:spcBef>
@@ -1826,7 +1969,7 @@
               <a:buChar char=""/>
             </a:pPr>
             <a:r>
-              <a:rPr b="0" lang="zh-TW" sz="2000" spc="-1" strike="noStrike">
+              <a:rPr lang="zh-TW" sz="2000" b="0" strike="noStrike" spc="-1">
                 <a:solidFill>
                   <a:srgbClr val="000000"/>
                 </a:solidFill>
@@ -1834,15 +1977,9 @@
               </a:rPr>
               <a:t>第六大纲级别</a:t>
             </a:r>
-            <a:endParaRPr b="0" lang="zh-TW" sz="2000" spc="-1" strike="noStrike">
-              <a:solidFill>
-                <a:srgbClr val="000000"/>
-              </a:solidFill>
-              <a:latin typeface="Calibri"/>
-            </a:endParaRPr>
-          </a:p>
-          <a:p>
-            <a:pPr lvl="6" marL="3024000" indent="-216000">
+          </a:p>
+          <a:p>
+            <a:pPr marL="3024000" lvl="6" indent="-216000">
               <a:spcBef>
                 <a:spcPts val="283"/>
               </a:spcBef>
@@ -1854,7 +1991,7 @@
               <a:buChar char=""/>
             </a:pPr>
             <a:r>
-              <a:rPr b="0" lang="zh-TW" sz="2000" spc="-1" strike="noStrike">
+              <a:rPr lang="zh-TW" sz="2000" b="0" strike="noStrike" spc="-1">
                 <a:solidFill>
                   <a:srgbClr val="000000"/>
                 </a:solidFill>
@@ -1862,37 +1999,311 @@
               </a:rPr>
               <a:t>第七大纲级别</a:t>
             </a:r>
-            <a:endParaRPr b="0" lang="zh-TW" sz="2000" spc="-1" strike="noStrike">
-              <a:solidFill>
-                <a:srgbClr val="000000"/>
-              </a:solidFill>
-              <a:latin typeface="Calibri"/>
-            </a:endParaRPr>
           </a:p>
         </p:txBody>
       </p:sp>
     </p:spTree>
   </p:cSld>
-  <p:clrMap bg1="lt1" bg2="lt2" tx1="dk1" tx2="dk2" accent1="accent1" accent2="accent2" accent3="accent3" accent4="accent4" accent5="accent5" accent6="accent6" hlink="hlink" folHlink="folHlink"/>
+  <p:clrMap bg1="lt1" tx1="dk1" bg2="lt2" tx2="dk2" accent1="accent1" accent2="accent2" accent3="accent3" accent4="accent4" accent5="accent5" accent6="accent6" hlink="hlink" folHlink="folHlink"/>
   <p:sldLayoutIdLst>
-    <p:sldLayoutId id="2147483649" r:id="rId2"/>
-    <p:sldLayoutId id="2147483650" r:id="rId3"/>
-    <p:sldLayoutId id="2147483651" r:id="rId4"/>
-    <p:sldLayoutId id="2147483652" r:id="rId5"/>
-    <p:sldLayoutId id="2147483653" r:id="rId6"/>
-    <p:sldLayoutId id="2147483654" r:id="rId7"/>
-    <p:sldLayoutId id="2147483655" r:id="rId8"/>
-    <p:sldLayoutId id="2147483656" r:id="rId9"/>
-    <p:sldLayoutId id="2147483657" r:id="rId10"/>
-    <p:sldLayoutId id="2147483658" r:id="rId11"/>
-    <p:sldLayoutId id="2147483659" r:id="rId12"/>
-    <p:sldLayoutId id="2147483660" r:id="rId13"/>
+    <p:sldLayoutId id="2147483649" r:id="rId1"/>
+    <p:sldLayoutId id="2147483650" r:id="rId2"/>
+    <p:sldLayoutId id="2147483651" r:id="rId3"/>
+    <p:sldLayoutId id="2147483652" r:id="rId4"/>
+    <p:sldLayoutId id="2147483653" r:id="rId5"/>
+    <p:sldLayoutId id="2147483654" r:id="rId6"/>
+    <p:sldLayoutId id="2147483655" r:id="rId7"/>
+    <p:sldLayoutId id="2147483656" r:id="rId8"/>
+    <p:sldLayoutId id="2147483657" r:id="rId9"/>
+    <p:sldLayoutId id="2147483658" r:id="rId10"/>
+    <p:sldLayoutId id="2147483659" r:id="rId11"/>
+    <p:sldLayoutId id="2147483660" r:id="rId12"/>
   </p:sldLayoutIdLst>
+  <p:txStyles>
+    <p:titleStyle>
+      <a:lvl1pPr algn="l" defTabSz="914400" rtl="0" eaLnBrk="1" latinLnBrk="0" hangingPunct="1">
+        <a:lnSpc>
+          <a:spcPct val="90000"/>
+        </a:lnSpc>
+        <a:spcBef>
+          <a:spcPct val="0"/>
+        </a:spcBef>
+        <a:buNone/>
+        <a:defRPr sz="4400" kern="1200">
+          <a:solidFill>
+            <a:schemeClr val="tx1"/>
+          </a:solidFill>
+          <a:latin typeface="+mj-lt"/>
+          <a:ea typeface="+mj-ea"/>
+          <a:cs typeface="+mj-cs"/>
+        </a:defRPr>
+      </a:lvl1pPr>
+    </p:titleStyle>
+    <p:bodyStyle>
+      <a:lvl1pPr marL="228600" indent="-228600" algn="l" defTabSz="914400" rtl="0" eaLnBrk="1" latinLnBrk="0" hangingPunct="1">
+        <a:lnSpc>
+          <a:spcPct val="90000"/>
+        </a:lnSpc>
+        <a:spcBef>
+          <a:spcPts val="1000"/>
+        </a:spcBef>
+        <a:buFont typeface="Arial" panose="020B0604020202020204" pitchFamily="34" charset="0"/>
+        <a:buChar char="•"/>
+        <a:defRPr sz="2800" kern="1200">
+          <a:solidFill>
+            <a:schemeClr val="tx1"/>
+          </a:solidFill>
+          <a:latin typeface="+mn-lt"/>
+          <a:ea typeface="+mn-ea"/>
+          <a:cs typeface="+mn-cs"/>
+        </a:defRPr>
+      </a:lvl1pPr>
+      <a:lvl2pPr marL="685800" indent="-228600" algn="l" defTabSz="914400" rtl="0" eaLnBrk="1" latinLnBrk="0" hangingPunct="1">
+        <a:lnSpc>
+          <a:spcPct val="90000"/>
+        </a:lnSpc>
+        <a:spcBef>
+          <a:spcPts val="500"/>
+        </a:spcBef>
+        <a:buFont typeface="Arial" panose="020B0604020202020204" pitchFamily="34" charset="0"/>
+        <a:buChar char="•"/>
+        <a:defRPr sz="2400" kern="1200">
+          <a:solidFill>
+            <a:schemeClr val="tx1"/>
+          </a:solidFill>
+          <a:latin typeface="+mn-lt"/>
+          <a:ea typeface="+mn-ea"/>
+          <a:cs typeface="+mn-cs"/>
+        </a:defRPr>
+      </a:lvl2pPr>
+      <a:lvl3pPr marL="1143000" indent="-228600" algn="l" defTabSz="914400" rtl="0" eaLnBrk="1" latinLnBrk="0" hangingPunct="1">
+        <a:lnSpc>
+          <a:spcPct val="90000"/>
+        </a:lnSpc>
+        <a:spcBef>
+          <a:spcPts val="500"/>
+        </a:spcBef>
+        <a:buFont typeface="Arial" panose="020B0604020202020204" pitchFamily="34" charset="0"/>
+        <a:buChar char="•"/>
+        <a:defRPr sz="2000" kern="1200">
+          <a:solidFill>
+            <a:schemeClr val="tx1"/>
+          </a:solidFill>
+          <a:latin typeface="+mn-lt"/>
+          <a:ea typeface="+mn-ea"/>
+          <a:cs typeface="+mn-cs"/>
+        </a:defRPr>
+      </a:lvl3pPr>
+      <a:lvl4pPr marL="1600200" indent="-228600" algn="l" defTabSz="914400" rtl="0" eaLnBrk="1" latinLnBrk="0" hangingPunct="1">
+        <a:lnSpc>
+          <a:spcPct val="90000"/>
+        </a:lnSpc>
+        <a:spcBef>
+          <a:spcPts val="500"/>
+        </a:spcBef>
+        <a:buFont typeface="Arial" panose="020B0604020202020204" pitchFamily="34" charset="0"/>
+        <a:buChar char="•"/>
+        <a:defRPr sz="1800" kern="1200">
+          <a:solidFill>
+            <a:schemeClr val="tx1"/>
+          </a:solidFill>
+          <a:latin typeface="+mn-lt"/>
+          <a:ea typeface="+mn-ea"/>
+          <a:cs typeface="+mn-cs"/>
+        </a:defRPr>
+      </a:lvl4pPr>
+      <a:lvl5pPr marL="2057400" indent="-228600" algn="l" defTabSz="914400" rtl="0" eaLnBrk="1" latinLnBrk="0" hangingPunct="1">
+        <a:lnSpc>
+          <a:spcPct val="90000"/>
+        </a:lnSpc>
+        <a:spcBef>
+          <a:spcPts val="500"/>
+        </a:spcBef>
+        <a:buFont typeface="Arial" panose="020B0604020202020204" pitchFamily="34" charset="0"/>
+        <a:buChar char="•"/>
+        <a:defRPr sz="1800" kern="1200">
+          <a:solidFill>
+            <a:schemeClr val="tx1"/>
+          </a:solidFill>
+          <a:latin typeface="+mn-lt"/>
+          <a:ea typeface="+mn-ea"/>
+          <a:cs typeface="+mn-cs"/>
+        </a:defRPr>
+      </a:lvl5pPr>
+      <a:lvl6pPr marL="2514600" indent="-228600" algn="l" defTabSz="914400" rtl="0" eaLnBrk="1" latinLnBrk="0" hangingPunct="1">
+        <a:lnSpc>
+          <a:spcPct val="90000"/>
+        </a:lnSpc>
+        <a:spcBef>
+          <a:spcPts val="500"/>
+        </a:spcBef>
+        <a:buFont typeface="Arial" panose="020B0604020202020204" pitchFamily="34" charset="0"/>
+        <a:buChar char="•"/>
+        <a:defRPr sz="1800" kern="1200">
+          <a:solidFill>
+            <a:schemeClr val="tx1"/>
+          </a:solidFill>
+          <a:latin typeface="+mn-lt"/>
+          <a:ea typeface="+mn-ea"/>
+          <a:cs typeface="+mn-cs"/>
+        </a:defRPr>
+      </a:lvl6pPr>
+      <a:lvl7pPr marL="2971800" indent="-228600" algn="l" defTabSz="914400" rtl="0" eaLnBrk="1" latinLnBrk="0" hangingPunct="1">
+        <a:lnSpc>
+          <a:spcPct val="90000"/>
+        </a:lnSpc>
+        <a:spcBef>
+          <a:spcPts val="500"/>
+        </a:spcBef>
+        <a:buFont typeface="Arial" panose="020B0604020202020204" pitchFamily="34" charset="0"/>
+        <a:buChar char="•"/>
+        <a:defRPr sz="1800" kern="1200">
+          <a:solidFill>
+            <a:schemeClr val="tx1"/>
+          </a:solidFill>
+          <a:latin typeface="+mn-lt"/>
+          <a:ea typeface="+mn-ea"/>
+          <a:cs typeface="+mn-cs"/>
+        </a:defRPr>
+      </a:lvl7pPr>
+      <a:lvl8pPr marL="3429000" indent="-228600" algn="l" defTabSz="914400" rtl="0" eaLnBrk="1" latinLnBrk="0" hangingPunct="1">
+        <a:lnSpc>
+          <a:spcPct val="90000"/>
+        </a:lnSpc>
+        <a:spcBef>
+          <a:spcPts val="500"/>
+        </a:spcBef>
+        <a:buFont typeface="Arial" panose="020B0604020202020204" pitchFamily="34" charset="0"/>
+        <a:buChar char="•"/>
+        <a:defRPr sz="1800" kern="1200">
+          <a:solidFill>
+            <a:schemeClr val="tx1"/>
+          </a:solidFill>
+          <a:latin typeface="+mn-lt"/>
+          <a:ea typeface="+mn-ea"/>
+          <a:cs typeface="+mn-cs"/>
+        </a:defRPr>
+      </a:lvl8pPr>
+      <a:lvl9pPr marL="3886200" indent="-228600" algn="l" defTabSz="914400" rtl="0" eaLnBrk="1" latinLnBrk="0" hangingPunct="1">
+        <a:lnSpc>
+          <a:spcPct val="90000"/>
+        </a:lnSpc>
+        <a:spcBef>
+          <a:spcPts val="500"/>
+        </a:spcBef>
+        <a:buFont typeface="Arial" panose="020B0604020202020204" pitchFamily="34" charset="0"/>
+        <a:buChar char="•"/>
+        <a:defRPr sz="1800" kern="1200">
+          <a:solidFill>
+            <a:schemeClr val="tx1"/>
+          </a:solidFill>
+          <a:latin typeface="+mn-lt"/>
+          <a:ea typeface="+mn-ea"/>
+          <a:cs typeface="+mn-cs"/>
+        </a:defRPr>
+      </a:lvl9pPr>
+    </p:bodyStyle>
+    <p:otherStyle>
+      <a:defPPr>
+        <a:defRPr lang="zh-TW"/>
+      </a:defPPr>
+      <a:lvl1pPr marL="0" algn="l" defTabSz="914400" rtl="0" eaLnBrk="1" latinLnBrk="0" hangingPunct="1">
+        <a:defRPr sz="1800" kern="1200">
+          <a:solidFill>
+            <a:schemeClr val="tx1"/>
+          </a:solidFill>
+          <a:latin typeface="+mn-lt"/>
+          <a:ea typeface="+mn-ea"/>
+          <a:cs typeface="+mn-cs"/>
+        </a:defRPr>
+      </a:lvl1pPr>
+      <a:lvl2pPr marL="457200" algn="l" defTabSz="914400" rtl="0" eaLnBrk="1" latinLnBrk="0" hangingPunct="1">
+        <a:defRPr sz="1800" kern="1200">
+          <a:solidFill>
+            <a:schemeClr val="tx1"/>
+          </a:solidFill>
+          <a:latin typeface="+mn-lt"/>
+          <a:ea typeface="+mn-ea"/>
+          <a:cs typeface="+mn-cs"/>
+        </a:defRPr>
+      </a:lvl2pPr>
+      <a:lvl3pPr marL="914400" algn="l" defTabSz="914400" rtl="0" eaLnBrk="1" latinLnBrk="0" hangingPunct="1">
+        <a:defRPr sz="1800" kern="1200">
+          <a:solidFill>
+            <a:schemeClr val="tx1"/>
+          </a:solidFill>
+          <a:latin typeface="+mn-lt"/>
+          <a:ea typeface="+mn-ea"/>
+          <a:cs typeface="+mn-cs"/>
+        </a:defRPr>
+      </a:lvl3pPr>
+      <a:lvl4pPr marL="1371600" algn="l" defTabSz="914400" rtl="0" eaLnBrk="1" latinLnBrk="0" hangingPunct="1">
+        <a:defRPr sz="1800" kern="1200">
+          <a:solidFill>
+            <a:schemeClr val="tx1"/>
+          </a:solidFill>
+          <a:latin typeface="+mn-lt"/>
+          <a:ea typeface="+mn-ea"/>
+          <a:cs typeface="+mn-cs"/>
+        </a:defRPr>
+      </a:lvl4pPr>
+      <a:lvl5pPr marL="1828800" algn="l" defTabSz="914400" rtl="0" eaLnBrk="1" latinLnBrk="0" hangingPunct="1">
+        <a:defRPr sz="1800" kern="1200">
+          <a:solidFill>
+            <a:schemeClr val="tx1"/>
+          </a:solidFill>
+          <a:latin typeface="+mn-lt"/>
+          <a:ea typeface="+mn-ea"/>
+          <a:cs typeface="+mn-cs"/>
+        </a:defRPr>
+      </a:lvl5pPr>
+      <a:lvl6pPr marL="2286000" algn="l" defTabSz="914400" rtl="0" eaLnBrk="1" latinLnBrk="0" hangingPunct="1">
+        <a:defRPr sz="1800" kern="1200">
+          <a:solidFill>
+            <a:schemeClr val="tx1"/>
+          </a:solidFill>
+          <a:latin typeface="+mn-lt"/>
+          <a:ea typeface="+mn-ea"/>
+          <a:cs typeface="+mn-cs"/>
+        </a:defRPr>
+      </a:lvl6pPr>
+      <a:lvl7pPr marL="2743200" algn="l" defTabSz="914400" rtl="0" eaLnBrk="1" latinLnBrk="0" hangingPunct="1">
+        <a:defRPr sz="1800" kern="1200">
+          <a:solidFill>
+            <a:schemeClr val="tx1"/>
+          </a:solidFill>
+          <a:latin typeface="+mn-lt"/>
+          <a:ea typeface="+mn-ea"/>
+          <a:cs typeface="+mn-cs"/>
+        </a:defRPr>
+      </a:lvl7pPr>
+      <a:lvl8pPr marL="3200400" algn="l" defTabSz="914400" rtl="0" eaLnBrk="1" latinLnBrk="0" hangingPunct="1">
+        <a:defRPr sz="1800" kern="1200">
+          <a:solidFill>
+            <a:schemeClr val="tx1"/>
+          </a:solidFill>
+          <a:latin typeface="+mn-lt"/>
+          <a:ea typeface="+mn-ea"/>
+          <a:cs typeface="+mn-cs"/>
+        </a:defRPr>
+      </a:lvl8pPr>
+      <a:lvl9pPr marL="3657600" algn="l" defTabSz="914400" rtl="0" eaLnBrk="1" latinLnBrk="0" hangingPunct="1">
+        <a:defRPr sz="1800" kern="1200">
+          <a:solidFill>
+            <a:schemeClr val="tx1"/>
+          </a:solidFill>
+          <a:latin typeface="+mn-lt"/>
+          <a:ea typeface="+mn-ea"/>
+          <a:cs typeface="+mn-cs"/>
+        </a:defRPr>
+      </a:lvl9pPr>
+    </p:otherStyle>
+  </p:txStyles>
 </p:sldMaster>
 </file>
 
 <file path=ppt/slides/slide1.xml><?xml version="1.0" encoding="utf-8"?>
-<p:sld xmlns:a="http://schemas.openxmlformats.org/drawingml/2006/main" xmlns:p="http://schemas.openxmlformats.org/presentationml/2006/main" xmlns:r="http://schemas.openxmlformats.org/officeDocument/2006/relationships" xmlns:p14="http://schemas.microsoft.com/office/powerpoint/2010/main" xmlns:p15="http://schemas.microsoft.com/office/powerpoint/2012/main" xmlns:mc="http://schemas.openxmlformats.org/markup-compatibility/2006">
+<p:sld xmlns:a="http://schemas.openxmlformats.org/drawingml/2006/main" xmlns:r="http://schemas.openxmlformats.org/officeDocument/2006/relationships" xmlns:p="http://schemas.openxmlformats.org/presentationml/2006/main">
   <p:cSld>
     <p:spTree>
       <p:nvGrpSpPr>
@@ -1941,9 +2352,10 @@
           <a:fontRef idx="minor"/>
         </p:style>
         <p:txBody>
-          <a:bodyPr lIns="90000" rIns="90000" tIns="45000" bIns="45000" anchor="ctr">
+          <a:bodyPr lIns="90000" tIns="45000" rIns="90000" bIns="45000" anchor="ctr">
             <a:noAutofit/>
           </a:bodyPr>
+          <a:lstStyle/>
           <a:p>
             <a:pPr algn="ctr">
               <a:lnSpc>
@@ -1951,24 +2363,15 @@
               </a:lnSpc>
             </a:pPr>
             <a:r>
-              <a:rPr b="0" lang="en-US" sz="1800" spc="-1" strike="noStrike">
+              <a:rPr lang="en-US" sz="1800" b="0" strike="noStrike" spc="-1">
                 <a:solidFill>
-                  <a:srgbClr val="ffffff"/>
+                  <a:srgbClr val="FFFFFF"/>
                 </a:solidFill>
                 <a:latin typeface="Calibri"/>
               </a:rPr>
-              <a:t>XML</a:t>
+              <a:t>XML解析的四種方式</a:t>
             </a:r>
-            <a:r>
-              <a:rPr b="0" lang="en-US" sz="1800" spc="-1" strike="noStrike">
-                <a:solidFill>
-                  <a:srgbClr val="ffffff"/>
-                </a:solidFill>
-                <a:latin typeface="Calibri"/>
-              </a:rPr>
-              <a:t>解析的四種方式</a:t>
-            </a:r>
-            <a:endParaRPr b="0" lang="en-US" sz="1800" spc="-1" strike="noStrike">
+            <a:endParaRPr lang="en-US" sz="1800" b="0" strike="noStrike" spc="-1">
               <a:latin typeface="DejaVu Sans"/>
             </a:endParaRPr>
           </a:p>
@@ -2007,9 +2410,10 @@
           <a:fontRef idx="minor"/>
         </p:style>
         <p:txBody>
-          <a:bodyPr lIns="90000" rIns="90000" tIns="45000" bIns="45000" anchor="ctr">
+          <a:bodyPr lIns="90000" tIns="45000" rIns="90000" bIns="45000" anchor="ctr">
             <a:noAutofit/>
           </a:bodyPr>
+          <a:lstStyle/>
           <a:p>
             <a:pPr algn="ctr">
               <a:lnSpc>
@@ -2017,15 +2421,15 @@
               </a:lnSpc>
             </a:pPr>
             <a:r>
-              <a:rPr b="0" lang="en-US" sz="1800" spc="-1" strike="noStrike">
+              <a:rPr lang="en-US" sz="1800" b="0" strike="noStrike" spc="-1">
                 <a:solidFill>
-                  <a:srgbClr val="ffffff"/>
+                  <a:srgbClr val="FFFFFF"/>
                 </a:solidFill>
                 <a:latin typeface="Calibri"/>
               </a:rPr>
               <a:t>Xpath</a:t>
             </a:r>
-            <a:endParaRPr b="0" lang="en-US" sz="1800" spc="-1" strike="noStrike">
+            <a:endParaRPr lang="en-US" sz="1800" b="0" strike="noStrike" spc="-1">
               <a:latin typeface="DejaVu Sans"/>
             </a:endParaRPr>
           </a:p>
@@ -2046,6 +2450,7 @@
             <a:avLst/>
             <a:gdLst/>
             <a:ahLst/>
+            <a:cxnLst/>
             <a:rect l="l" t="t" r="r" b="b"/>
             <a:pathLst>
               <a:path w="21600" h="21600">
@@ -2060,7 +2465,7 @@
           </a:custGeom>
           <a:noFill/>
           <a:ln>
-            <a:tailEnd len="med" type="triangle" w="med"/>
+            <a:tailEnd type="triangle" w="med" len="med"/>
           </a:ln>
         </p:spPr>
         <p:style>
@@ -2078,14 +2483,9 @@
       </p:sp>
     </p:spTree>
   </p:cSld>
-  <mc:AlternateContent>
-    <mc:Choice Requires="p14">
-      <p:transition spd="slow" p14:dur="2000"/>
-    </mc:Choice>
-    <mc:Fallback>
-      <p:transition spd="slow"/>
-    </mc:Fallback>
-  </mc:AlternateContent>
+  <p:clrMapOvr>
+    <a:masterClrMapping/>
+  </p:clrMapOvr>
   <p:timing>
     <p:tnLst>
       <p:par>
@@ -2094,14 +2494,14 @@
             <p:seq>
               <p:cTn id="2" dur="indefinite" nodeType="mainSeq"/>
               <p:prevCondLst>
-                <p:cond delay="0" evt="onPrev">
+                <p:cond evt="onPrev" delay="0">
                   <p:tgtEl>
                     <p:sldTgt/>
                   </p:tgtEl>
                 </p:cond>
               </p:prevCondLst>
               <p:nextCondLst>
-                <p:cond delay="0" evt="onNext">
+                <p:cond evt="onNext" delay="0">
                   <p:tgtEl>
                     <p:sldTgt/>
                   </p:tgtEl>
@@ -2117,7 +2517,7 @@
 </file>
 
 <file path=ppt/slides/slide2.xml><?xml version="1.0" encoding="utf-8"?>
-<p:sld xmlns:a="http://schemas.openxmlformats.org/drawingml/2006/main" xmlns:p="http://schemas.openxmlformats.org/presentationml/2006/main" xmlns:r="http://schemas.openxmlformats.org/officeDocument/2006/relationships" xmlns:p14="http://schemas.microsoft.com/office/powerpoint/2010/main" xmlns:p15="http://schemas.microsoft.com/office/powerpoint/2012/main" xmlns:mc="http://schemas.openxmlformats.org/markup-compatibility/2006">
+<p:sld xmlns:a="http://schemas.openxmlformats.org/drawingml/2006/main" xmlns:r="http://schemas.openxmlformats.org/officeDocument/2006/relationships" xmlns:p="http://schemas.openxmlformats.org/presentationml/2006/main">
   <p:cSld>
     <p:spTree>
       <p:nvGrpSpPr>
@@ -2142,7 +2542,7 @@
         <p:spPr>
           <a:xfrm>
             <a:off x="216000" y="288000"/>
-            <a:ext cx="36447480" cy="2889720"/>
+            <a:ext cx="36447480" cy="2860868"/>
           </a:xfrm>
           <a:prstGeom prst="rect">
             <a:avLst/>
@@ -2153,156 +2553,169 @@
           </a:ln>
         </p:spPr>
         <p:txBody>
-          <a:bodyPr lIns="90000" rIns="90000" tIns="45000" bIns="45000">
+          <a:bodyPr lIns="90000" tIns="45000" rIns="90000" bIns="45000">
             <a:spAutoFit/>
           </a:bodyPr>
+          <a:lstStyle/>
           <a:p>
             <a:r>
-              <a:rPr b="0" lang="en-US" sz="1800" spc="-1" strike="noStrike">
+              <a:rPr lang="en-US" sz="1800" b="0" strike="noStrike" spc="-1" dirty="0">
                 <a:latin typeface="DejaVu Sans"/>
               </a:rPr>
               <a:t>XML Parser Study Website:</a:t>
             </a:r>
-            <a:endParaRPr b="0" lang="en-US" sz="1800" spc="-1" strike="noStrike">
-              <a:latin typeface="DejaVu Sans"/>
-            </a:endParaRPr>
           </a:p>
           <a:p>
             <a:r>
-              <a:rPr b="0" lang="en-US" sz="1800" spc="-1" strike="noStrike">
-                <a:latin typeface="DejaVu Sans"/>
-              </a:rPr>
-              <a:t>	</a:t>
-            </a:r>
-            <a:r>
-              <a:rPr b="0" lang="en-US" sz="1800" spc="-1" strike="noStrike">
-                <a:latin typeface="DejaVu Sans"/>
-                <a:hlinkClick r:id="rId1"/>
-              </a:rPr>
-              <a:t>https://zhuanlan.zhihu.com/p/66284713</a:t>
-            </a:r>
-            <a:endParaRPr b="0" lang="en-US" sz="1800" spc="-1" strike="noStrike">
-              <a:latin typeface="DejaVu Sans"/>
-            </a:endParaRPr>
-          </a:p>
-          <a:p>
-            <a:r>
-              <a:rPr b="0" lang="en-US" sz="1800" spc="-1" strike="noStrike">
+              <a:rPr lang="en-US" spc="-1" dirty="0">
                 <a:latin typeface="DejaVu Sans"/>
               </a:rPr>
               <a:t>      </a:t>
             </a:r>
             <a:r>
-              <a:rPr b="0" lang="en-US" sz="1800" spc="-1" strike="noStrike">
+              <a:rPr lang="en-US" spc="-1" dirty="0" err="1">
                 <a:latin typeface="DejaVu Sans"/>
                 <a:hlinkClick r:id="rId2"/>
               </a:rPr>
-              <a:t>https://www.cnblogs.com/rwjnb/p/15670191.html</a:t>
+              <a:t>Xml_Parser</a:t>
             </a:r>
-            <a:endParaRPr b="0" lang="en-US" sz="1800" spc="-1" strike="noStrike">
+            <a:endParaRPr lang="en-US" spc="-1" dirty="0">
               <a:latin typeface="DejaVu Sans"/>
             </a:endParaRPr>
           </a:p>
           <a:p>
             <a:r>
-              <a:rPr b="0" lang="en-US" sz="1800" spc="-1" strike="noStrike">
+              <a:rPr lang="en-US" sz="1800" b="0" strike="noStrike" spc="-1" dirty="0">
                 <a:latin typeface="DejaVu Sans"/>
               </a:rPr>
               <a:t>      </a:t>
             </a:r>
             <a:r>
-              <a:rPr b="0" lang="en-US" sz="1800" spc="-1" strike="noStrike">
+              <a:rPr lang="en-US" sz="1800" b="0" strike="noStrike" spc="-1" dirty="0">
                 <a:latin typeface="DejaVu Sans"/>
+                <a:hlinkClick r:id="rId3"/>
               </a:rPr>
-              <a:t>https://blog.csdn.net/songjianlong/article/details/130548306</a:t>
+              <a:t>Xml_Parser2</a:t>
             </a:r>
-            <a:endParaRPr b="0" lang="en-US" sz="1800" spc="-1" strike="noStrike">
+            <a:endParaRPr lang="en-US" sz="1800" b="0" strike="noStrike" spc="-1" dirty="0">
               <a:latin typeface="DejaVu Sans"/>
             </a:endParaRPr>
           </a:p>
           <a:p>
             <a:r>
-              <a:rPr b="0" lang="en-US" sz="1800" spc="-1" strike="noStrike">
+              <a:rPr lang="en-US" spc="-1" dirty="0">
                 <a:latin typeface="DejaVu Sans"/>
               </a:rPr>
               <a:t>      </a:t>
             </a:r>
             <a:r>
-              <a:rPr b="0" lang="en-US" sz="1800" spc="-1" strike="noStrike">
+              <a:rPr lang="en-US" spc="-1" dirty="0">
+                <a:latin typeface="DejaVu Sans"/>
+                <a:hlinkClick r:id="rId4"/>
+              </a:rPr>
+              <a:t>Xml_Parser3</a:t>
+            </a:r>
+            <a:endParaRPr lang="en-US" spc="-1" dirty="0">
+              <a:latin typeface="DejaVu Sans"/>
+            </a:endParaRPr>
+          </a:p>
+          <a:p>
+            <a:r>
+              <a:rPr lang="en-US" sz="1800" b="0" strike="noStrike" spc="-1" dirty="0">
                 <a:latin typeface="DejaVu Sans"/>
               </a:rPr>
-              <a:t>https://blog.csdn.net/m0_37499059/article/details/80505567?ops_request_misc=%257B%2522request%255Fid%2522%253A%2522169839588716800215079905%2522%252C%2522scm%2522%253A%252220140713.130102334.pc%255Fall.%2522%257D&amp;request_id=169839588716800215079905&amp;biz_id=0&amp;utm_medium=distribute.pc_search_result.none-task-blog-2%7Eall%7Efirst_rank_ecpm_v1%7Ehot_rank-1-80505567-null-null.142%5ev96%5epc_search_result_base3&amp;utm_term=Java%20xml%E8%A7%A3%E6%9E%90&amp;spm=1018.2226.3001.4187</a:t>
+              <a:t>      </a:t>
             </a:r>
-            <a:endParaRPr b="0" lang="en-US" sz="1800" spc="-1" strike="noStrike">
+            <a:r>
+              <a:rPr lang="en-US" sz="1800" b="0" strike="noStrike" spc="-1" dirty="0">
+                <a:latin typeface="DejaVu Sans"/>
+                <a:hlinkClick r:id="rId5"/>
+              </a:rPr>
+              <a:t>Xml_Parser4</a:t>
+            </a:r>
+            <a:endParaRPr lang="en-US" sz="1800" b="0" strike="noStrike" spc="-1" dirty="0">
               <a:latin typeface="DejaVu Sans"/>
             </a:endParaRPr>
           </a:p>
           <a:p>
-            <a:endParaRPr b="0" lang="en-US" sz="1800" spc="-1" strike="noStrike">
-              <a:latin typeface="DejaVu Sans"/>
-            </a:endParaRPr>
-          </a:p>
-          <a:p>
-            <a:endParaRPr b="0" lang="en-US" sz="1800" spc="-1" strike="noStrike">
-              <a:latin typeface="DejaVu Sans"/>
-            </a:endParaRPr>
-          </a:p>
-          <a:p>
             <a:r>
-              <a:rPr b="0" lang="en-US" sz="1800" spc="-1" strike="noStrike">
+              <a:rPr lang="en-US" spc="-1" dirty="0">
                 <a:latin typeface="DejaVu Sans"/>
               </a:rPr>
-              <a:t>Xpath Study Website:</a:t>
+              <a:t>      </a:t>
             </a:r>
-            <a:endParaRPr b="0" lang="en-US" sz="1800" spc="-1" strike="noStrike">
+            <a:endParaRPr lang="en-US" sz="1800" b="0" strike="noStrike" spc="-1" dirty="0">
               <a:latin typeface="DejaVu Sans"/>
             </a:endParaRPr>
           </a:p>
           <a:p>
+            <a:endParaRPr lang="en-US" sz="1800" b="0" strike="noStrike" spc="-1" dirty="0">
+              <a:latin typeface="DejaVu Sans"/>
+            </a:endParaRPr>
+          </a:p>
+          <a:p>
             <a:r>
-              <a:rPr b="0" lang="en-US" sz="1800" spc="-1" strike="noStrike">
+              <a:rPr lang="en-US" sz="1800" b="0" strike="noStrike" spc="-1" dirty="0" err="1">
+                <a:latin typeface="DejaVu Sans"/>
+              </a:rPr>
+              <a:t>Xpath</a:t>
+            </a:r>
+            <a:r>
+              <a:rPr lang="en-US" sz="1800" b="0" strike="noStrike" spc="-1" dirty="0">
+                <a:latin typeface="DejaVu Sans"/>
+              </a:rPr>
+              <a:t> Study Website:</a:t>
+            </a:r>
+          </a:p>
+          <a:p>
+            <a:r>
+              <a:rPr lang="en-US" spc="-1" dirty="0">
+                <a:latin typeface="DejaVu Sans"/>
+              </a:rPr>
+              <a:t>      </a:t>
+            </a:r>
+            <a:r>
+              <a:rPr lang="en-US" spc="-1" dirty="0">
+                <a:latin typeface="DejaVu Sans"/>
+                <a:hlinkClick r:id="rId6"/>
+              </a:rPr>
+              <a:t>XPath</a:t>
+            </a:r>
+            <a:endParaRPr lang="en-US" sz="1800" b="0" strike="noStrike" spc="-1" dirty="0">
+              <a:latin typeface="DejaVu Sans"/>
+            </a:endParaRPr>
+          </a:p>
+          <a:p>
+            <a:r>
+              <a:rPr lang="en-US" sz="1800" b="0" strike="noStrike" spc="-1" dirty="0">
                 <a:latin typeface="DejaVu Sans"/>
               </a:rPr>
               <a:t>	</a:t>
             </a:r>
-            <a:r>
-              <a:rPr b="0" lang="en-US" sz="1800" spc="-1" strike="noStrike">
-                <a:latin typeface="DejaVu Sans"/>
-              </a:rPr>
-              <a:t>https://www.cnblogs.com/windpoplar/p/12179483.html</a:t>
-            </a:r>
-            <a:endParaRPr b="0" lang="en-US" sz="1800" spc="-1" strike="noStrike">
-              <a:latin typeface="DejaVu Sans"/>
-            </a:endParaRPr>
           </a:p>
         </p:txBody>
       </p:sp>
     </p:spTree>
   </p:cSld>
-  <mc:AlternateContent>
-    <mc:Choice Requires="p14">
-      <p:transition spd="slow" p14:dur="2000"/>
-    </mc:Choice>
-    <mc:Fallback>
-      <p:transition spd="slow"/>
-    </mc:Fallback>
-  </mc:AlternateContent>
+  <p:clrMapOvr>
+    <a:masterClrMapping/>
+  </p:clrMapOvr>
   <p:timing>
     <p:tnLst>
       <p:par>
-        <p:cTn id="3" dur="indefinite" restart="never" nodeType="tmRoot">
+        <p:cTn id="1" dur="indefinite" restart="never" nodeType="tmRoot">
           <p:childTnLst>
             <p:seq>
-              <p:cTn id="4" dur="indefinite" nodeType="mainSeq"/>
+              <p:cTn id="2" dur="indefinite" nodeType="mainSeq"/>
               <p:prevCondLst>
-                <p:cond delay="0" evt="onPrev">
+                <p:cond evt="onPrev" delay="0">
                   <p:tgtEl>
                     <p:sldTgt/>
                   </p:tgtEl>
                 </p:cond>
               </p:prevCondLst>
               <p:nextCondLst>
-                <p:cond delay="0" evt="onNext">
+                <p:cond evt="onNext" delay="0">
                   <p:tgtEl>
                     <p:sldTgt/>
                   </p:tgtEl>
@@ -2328,34 +2741,34 @@
         <a:sysClr val="window" lastClr="FFFFFF"/>
       </a:lt1>
       <a:dk2>
-        <a:srgbClr val="44546a"/>
+        <a:srgbClr val="44546A"/>
       </a:dk2>
       <a:lt2>
-        <a:srgbClr val="e7e6e6"/>
+        <a:srgbClr val="E7E6E6"/>
       </a:lt2>
       <a:accent1>
-        <a:srgbClr val="4472c4"/>
+        <a:srgbClr val="4472C4"/>
       </a:accent1>
       <a:accent2>
-        <a:srgbClr val="ed7d31"/>
+        <a:srgbClr val="ED7D31"/>
       </a:accent2>
       <a:accent3>
-        <a:srgbClr val="a5a5a5"/>
+        <a:srgbClr val="A5A5A5"/>
       </a:accent3>
       <a:accent4>
-        <a:srgbClr val="ffc000"/>
+        <a:srgbClr val="FFC000"/>
       </a:accent4>
       <a:accent5>
-        <a:srgbClr val="5b9bd5"/>
+        <a:srgbClr val="5B9BD5"/>
       </a:accent5>
       <a:accent6>
-        <a:srgbClr val="70ad47"/>
+        <a:srgbClr val="70AD47"/>
       </a:accent6>
       <a:hlink>
-        <a:srgbClr val="0563c1"/>
+        <a:srgbClr val="0563C1"/>
       </a:hlink>
       <a:folHlink>
-        <a:srgbClr val="954f72"/>
+        <a:srgbClr val="954F72"/>
       </a:folHlink>
     </a:clrScheme>
     <a:fontScheme name="Office">
@@ -2537,5 +2950,7 @@
       </a:bgFillStyleLst>
     </a:fmtScheme>
   </a:themeElements>
+  <a:objectDefaults/>
+  <a:extraClrSchemeLst/>
 </a:theme>
 </file>
</xml_diff>

<commit_message>
Add the java study record PPT
</commit_message>
<xml_diff>
--- a/JavaStudyRecord/JavaStudyRecord.pptx
+++ b/JavaStudyRecord/JavaStudyRecord.pptx
@@ -2377,110 +2377,6 @@
           </a:p>
         </p:txBody>
       </p:sp>
-      <p:sp>
-        <p:nvSpPr>
-          <p:cNvPr id="42" name="CustomShape 2"/>
-          <p:cNvSpPr/>
-          <p:nvPr/>
-        </p:nvSpPr>
-        <p:spPr>
-          <a:xfrm>
-            <a:off x="2519640" y="977760"/>
-            <a:ext cx="2986560" cy="959760"/>
-          </a:xfrm>
-          <a:prstGeom prst="roundRect">
-            <a:avLst>
-              <a:gd name="adj" fmla="val 16667"/>
-            </a:avLst>
-          </a:prstGeom>
-          <a:ln/>
-        </p:spPr>
-        <p:style>
-          <a:lnRef idx="2">
-            <a:schemeClr val="accent1">
-              <a:shade val="50000"/>
-            </a:schemeClr>
-          </a:lnRef>
-          <a:fillRef idx="1">
-            <a:schemeClr val="accent1"/>
-          </a:fillRef>
-          <a:effectRef idx="0">
-            <a:schemeClr val="accent1"/>
-          </a:effectRef>
-          <a:fontRef idx="minor"/>
-        </p:style>
-        <p:txBody>
-          <a:bodyPr lIns="90000" tIns="45000" rIns="90000" bIns="45000" anchor="ctr">
-            <a:noAutofit/>
-          </a:bodyPr>
-          <a:lstStyle/>
-          <a:p>
-            <a:pPr algn="ctr">
-              <a:lnSpc>
-                <a:spcPct val="100000"/>
-              </a:lnSpc>
-            </a:pPr>
-            <a:r>
-              <a:rPr lang="en-US" sz="1800" b="0" strike="noStrike" spc="-1">
-                <a:solidFill>
-                  <a:srgbClr val="FFFFFF"/>
-                </a:solidFill>
-                <a:latin typeface="Calibri"/>
-              </a:rPr>
-              <a:t>Xpath</a:t>
-            </a:r>
-            <a:endParaRPr lang="en-US" sz="1800" b="0" strike="noStrike" spc="-1">
-              <a:latin typeface="DejaVu Sans"/>
-            </a:endParaRPr>
-          </a:p>
-        </p:txBody>
-      </p:sp>
-      <p:sp>
-        <p:nvSpPr>
-          <p:cNvPr id="43" name="CustomShape 3"/>
-          <p:cNvSpPr/>
-          <p:nvPr/>
-        </p:nvSpPr>
-        <p:spPr>
-          <a:xfrm flipH="1" flipV="1">
-            <a:off x="4013280" y="1937880"/>
-            <a:ext cx="2234880" cy="1132560"/>
-          </a:xfrm>
-          <a:custGeom>
-            <a:avLst/>
-            <a:gdLst/>
-            <a:ahLst/>
-            <a:cxnLst/>
-            <a:rect l="l" t="t" r="r" b="b"/>
-            <a:pathLst>
-              <a:path w="21600" h="21600">
-                <a:moveTo>
-                  <a:pt x="0" y="0"/>
-                </a:moveTo>
-                <a:lnTo>
-                  <a:pt x="21600" y="21600"/>
-                </a:lnTo>
-              </a:path>
-            </a:pathLst>
-          </a:custGeom>
-          <a:noFill/>
-          <a:ln>
-            <a:tailEnd type="triangle" w="med" len="med"/>
-          </a:ln>
-        </p:spPr>
-        <p:style>
-          <a:lnRef idx="1">
-            <a:schemeClr val="accent1"/>
-          </a:lnRef>
-          <a:fillRef idx="0">
-            <a:schemeClr val="accent1"/>
-          </a:fillRef>
-          <a:effectRef idx="0">
-            <a:schemeClr val="accent1"/>
-          </a:effectRef>
-          <a:fontRef idx="minor"/>
-        </p:style>
-      </p:sp>
     </p:spTree>
   </p:cSld>
   <p:clrMapOvr>
@@ -2542,7 +2438,7 @@
         <p:spPr>
           <a:xfrm>
             <a:off x="216000" y="288000"/>
-            <a:ext cx="36447480" cy="2860868"/>
+            <a:ext cx="36447480" cy="1475873"/>
           </a:xfrm>
           <a:prstGeom prst="rect">
             <a:avLst/>
@@ -2633,59 +2529,6 @@
               </a:rPr>
               <a:t>Xml_Parser4</a:t>
             </a:r>
-            <a:endParaRPr lang="en-US" sz="1800" b="0" strike="noStrike" spc="-1" dirty="0">
-              <a:latin typeface="DejaVu Sans"/>
-            </a:endParaRPr>
-          </a:p>
-          <a:p>
-            <a:r>
-              <a:rPr lang="en-US" spc="-1" dirty="0">
-                <a:latin typeface="DejaVu Sans"/>
-              </a:rPr>
-              <a:t>      </a:t>
-            </a:r>
-            <a:endParaRPr lang="en-US" sz="1800" b="0" strike="noStrike" spc="-1" dirty="0">
-              <a:latin typeface="DejaVu Sans"/>
-            </a:endParaRPr>
-          </a:p>
-          <a:p>
-            <a:endParaRPr lang="en-US" sz="1800" b="0" strike="noStrike" spc="-1" dirty="0">
-              <a:latin typeface="DejaVu Sans"/>
-            </a:endParaRPr>
-          </a:p>
-          <a:p>
-            <a:r>
-              <a:rPr lang="en-US" sz="1800" b="0" strike="noStrike" spc="-1" dirty="0" err="1">
-                <a:latin typeface="DejaVu Sans"/>
-              </a:rPr>
-              <a:t>Xpath</a:t>
-            </a:r>
-            <a:r>
-              <a:rPr lang="en-US" sz="1800" b="0" strike="noStrike" spc="-1" dirty="0">
-                <a:latin typeface="DejaVu Sans"/>
-              </a:rPr>
-              <a:t> Study Website:</a:t>
-            </a:r>
-          </a:p>
-          <a:p>
-            <a:r>
-              <a:rPr lang="en-US" spc="-1" dirty="0">
-                <a:latin typeface="DejaVu Sans"/>
-              </a:rPr>
-              <a:t>      </a:t>
-            </a:r>
-            <a:r>
-              <a:rPr lang="en-US" spc="-1" dirty="0">
-                <a:latin typeface="DejaVu Sans"/>
-                <a:hlinkClick r:id="rId6"/>
-              </a:rPr>
-              <a:t>XPath</a:t>
-            </a:r>
-            <a:endParaRPr lang="en-US" sz="1800" b="0" strike="noStrike" spc="-1" dirty="0">
-              <a:latin typeface="DejaVu Sans"/>
-            </a:endParaRPr>
-          </a:p>
-          <a:p>
             <a:r>
               <a:rPr lang="en-US" sz="1800" b="0" strike="noStrike" spc="-1" dirty="0">
                 <a:latin typeface="DejaVu Sans"/>

</xml_diff>

<commit_message>
Record Hashcode Study Website
</commit_message>
<xml_diff>
--- a/JavaStudyRecord/JavaStudyRecord.pptx
+++ b/JavaStudyRecord/JavaStudyRecord.pptx
@@ -7,6 +7,7 @@
   <p:sldIdLst>
     <p:sldId id="256" r:id="rId2"/>
     <p:sldId id="257" r:id="rId3"/>
+    <p:sldId id="258" r:id="rId4"/>
   </p:sldIdLst>
   <p:sldSz cx="12192000" cy="6858000"/>
   <p:notesSz cx="7559675" cy="10691813"/>
@@ -105,6 +106,11 @@
       </a:defRPr>
     </a:lvl9pPr>
   </p:defaultTextStyle>
+  <p:extLst>
+    <p:ext uri="{EFAFB233-063F-42B5-8137-9DF3F51BA10A}">
+      <p15:sldGuideLst xmlns:p15="http://schemas.microsoft.com/office/powerpoint/2012/main"/>
+    </p:ext>
+  </p:extLst>
 </p:presentation>
 </file>
 
@@ -1738,7 +1744,7 @@
                 </a:solidFill>
                 <a:latin typeface="Calibri"/>
               </a:rPr>
-              <a:t>11/18/2023</a:t>
+              <a:t>11/21/2023</a:t>
             </a:fld>
             <a:endParaRPr lang="en-US" sz="1200" b="0" strike="noStrike" spc="-1">
               <a:latin typeface="DejaVu Serif"/>
@@ -2573,6 +2579,269 @@
 </p:sld>
 </file>
 
+<file path=ppt/slides/slide3.xml><?xml version="1.0" encoding="utf-8"?>
+<p:sld xmlns:a="http://schemas.openxmlformats.org/drawingml/2006/main" xmlns:r="http://schemas.openxmlformats.org/officeDocument/2006/relationships" xmlns:p="http://schemas.openxmlformats.org/presentationml/2006/main">
+  <p:cSld>
+    <p:spTree>
+      <p:nvGrpSpPr>
+        <p:cNvPr id="1" name=""/>
+        <p:cNvGrpSpPr/>
+        <p:nvPr/>
+      </p:nvGrpSpPr>
+      <p:grpSpPr>
+        <a:xfrm>
+          <a:off x="0" y="0"/>
+          <a:ext cx="0" cy="0"/>
+          <a:chOff x="0" y="0"/>
+          <a:chExt cx="0" cy="0"/>
+        </a:xfrm>
+      </p:grpSpPr>
+      <p:sp>
+        <p:nvSpPr>
+          <p:cNvPr id="4" name="文本框 3"/>
+          <p:cNvSpPr txBox="1"/>
+          <p:nvPr/>
+        </p:nvSpPr>
+        <p:spPr>
+          <a:xfrm>
+            <a:off x="239697" y="301841"/>
+            <a:ext cx="7340471" cy="2031325"/>
+          </a:xfrm>
+          <a:prstGeom prst="rect">
+            <a:avLst/>
+          </a:prstGeom>
+          <a:noFill/>
+        </p:spPr>
+        <p:txBody>
+          <a:bodyPr wrap="none" rtlCol="0">
+            <a:spAutoFit/>
+          </a:bodyPr>
+          <a:lstStyle/>
+          <a:p>
+            <a:r>
+              <a:rPr lang="en-US" altLang="zh-CN" dirty="0" err="1" smtClean="0"/>
+              <a:t>HashCode</a:t>
+            </a:r>
+            <a:r>
+              <a:rPr lang="zh-CN" altLang="en-US" dirty="0" smtClean="0"/>
+              <a:t>的讲解</a:t>
+            </a:r>
+            <a:endParaRPr lang="en-US" altLang="zh-CN" dirty="0" smtClean="0"/>
+          </a:p>
+          <a:p>
+            <a:endParaRPr lang="en-US" altLang="zh-CN" dirty="0"/>
+          </a:p>
+          <a:p>
+            <a:r>
+              <a:rPr lang="en-US" altLang="zh-CN" dirty="0" smtClean="0"/>
+              <a:t>       </a:t>
+            </a:r>
+            <a:r>
+              <a:rPr lang="en-US" altLang="zh-CN" dirty="0" err="1" smtClean="0">
+                <a:hlinkClick r:id="rId2"/>
+              </a:rPr>
+              <a:t>Hashset</a:t>
+            </a:r>
+            <a:endParaRPr lang="en-US" altLang="zh-CN" dirty="0" smtClean="0"/>
+          </a:p>
+          <a:p>
+            <a:r>
+              <a:rPr lang="en-US" altLang="zh-CN" dirty="0"/>
+              <a:t> </a:t>
+            </a:r>
+            <a:r>
+              <a:rPr lang="en-US" altLang="zh-CN" dirty="0" smtClean="0"/>
+              <a:t>      </a:t>
+            </a:r>
+            <a:r>
+              <a:rPr lang="en-US" altLang="zh-CN" dirty="0" smtClean="0">
+                <a:hlinkClick r:id="rId3"/>
+              </a:rPr>
+              <a:t>Java</a:t>
+            </a:r>
+            <a:r>
+              <a:rPr lang="zh-CN" altLang="en-US" dirty="0" smtClean="0">
+                <a:hlinkClick r:id="rId3"/>
+              </a:rPr>
+              <a:t>集合源码系列之</a:t>
+            </a:r>
+            <a:r>
+              <a:rPr lang="en-US" altLang="zh-CN" dirty="0" err="1" smtClean="0">
+                <a:hlinkClick r:id="rId3"/>
+              </a:rPr>
+              <a:t>HashMap</a:t>
+            </a:r>
+            <a:r>
+              <a:rPr lang="zh-CN" altLang="en-US" dirty="0" smtClean="0">
+                <a:hlinkClick r:id="rId3"/>
+              </a:rPr>
+              <a:t>添加元素的流程</a:t>
+            </a:r>
+            <a:endParaRPr lang="en-US" altLang="zh-CN" dirty="0" smtClean="0"/>
+          </a:p>
+          <a:p>
+            <a:r>
+              <a:rPr lang="en-US" altLang="zh-CN" dirty="0"/>
+              <a:t> </a:t>
+            </a:r>
+            <a:r>
+              <a:rPr lang="en-US" altLang="zh-CN" dirty="0" smtClean="0"/>
+              <a:t>      </a:t>
+            </a:r>
+            <a:r>
+              <a:rPr lang="en-US" altLang="zh-CN" dirty="0" smtClean="0">
+                <a:hlinkClick r:id="rId4"/>
+              </a:rPr>
+              <a:t>Java</a:t>
+            </a:r>
+            <a:r>
+              <a:rPr lang="zh-CN" altLang="en-US" dirty="0" smtClean="0">
+                <a:hlinkClick r:id="rId4"/>
+              </a:rPr>
+              <a:t>基础篇：什么是</a:t>
+            </a:r>
+            <a:r>
+              <a:rPr lang="en-US" altLang="zh-CN" dirty="0" err="1" smtClean="0">
+                <a:hlinkClick r:id="rId4"/>
+              </a:rPr>
+              <a:t>hashCode</a:t>
+            </a:r>
+            <a:r>
+              <a:rPr lang="en-US" altLang="zh-CN" dirty="0" smtClean="0">
+                <a:hlinkClick r:id="rId4"/>
+              </a:rPr>
+              <a:t> </a:t>
+            </a:r>
+            <a:r>
+              <a:rPr lang="zh-CN" altLang="en-US" dirty="0" smtClean="0">
+                <a:hlinkClick r:id="rId4"/>
+              </a:rPr>
+              <a:t>以及 </a:t>
+            </a:r>
+            <a:r>
+              <a:rPr lang="en-US" altLang="zh-CN" dirty="0" err="1" smtClean="0">
+                <a:hlinkClick r:id="rId4"/>
+              </a:rPr>
+              <a:t>hashCode</a:t>
+            </a:r>
+            <a:r>
+              <a:rPr lang="en-US" altLang="zh-CN" dirty="0" smtClean="0">
+                <a:hlinkClick r:id="rId4"/>
+              </a:rPr>
+              <a:t>()</a:t>
+            </a:r>
+            <a:r>
+              <a:rPr lang="zh-CN" altLang="en-US" dirty="0" smtClean="0">
+                <a:hlinkClick r:id="rId4"/>
+              </a:rPr>
+              <a:t>与</a:t>
+            </a:r>
+            <a:r>
+              <a:rPr lang="en-US" altLang="zh-CN" dirty="0" smtClean="0">
+                <a:hlinkClick r:id="rId4"/>
+              </a:rPr>
+              <a:t>equals()</a:t>
+            </a:r>
+            <a:r>
+              <a:rPr lang="zh-CN" altLang="en-US" dirty="0" smtClean="0">
+                <a:hlinkClick r:id="rId4"/>
+              </a:rPr>
+              <a:t>的联系</a:t>
+            </a:r>
+            <a:endParaRPr lang="en-US" altLang="zh-CN" dirty="0" smtClean="0"/>
+          </a:p>
+          <a:p>
+            <a:r>
+              <a:rPr lang="en-US" altLang="zh-CN" dirty="0"/>
+              <a:t> </a:t>
+            </a:r>
+            <a:r>
+              <a:rPr lang="en-US" altLang="zh-CN" dirty="0" smtClean="0"/>
+              <a:t>      </a:t>
+            </a:r>
+            <a:r>
+              <a:rPr lang="en-US" altLang="zh-CN" dirty="0" smtClean="0">
+                <a:hlinkClick r:id="rId5"/>
+              </a:rPr>
+              <a:t>Java</a:t>
+            </a:r>
+            <a:r>
+              <a:rPr lang="zh-CN" altLang="en-US" dirty="0" smtClean="0">
+                <a:hlinkClick r:id="rId5"/>
+              </a:rPr>
+              <a:t>基础之</a:t>
+            </a:r>
+            <a:r>
+              <a:rPr lang="en-US" altLang="zh-CN" dirty="0" err="1" smtClean="0">
+                <a:hlinkClick r:id="rId5"/>
+              </a:rPr>
+              <a:t>hashcode</a:t>
+            </a:r>
+            <a:r>
+              <a:rPr lang="zh-CN" altLang="en-US" dirty="0" smtClean="0">
+                <a:hlinkClick r:id="rId5"/>
+              </a:rPr>
+              <a:t>剖析</a:t>
+            </a:r>
+            <a:endParaRPr lang="en-US" altLang="zh-CN" dirty="0" smtClean="0"/>
+          </a:p>
+          <a:p>
+            <a:r>
+              <a:rPr lang="en-US" altLang="zh-CN" dirty="0"/>
+              <a:t> </a:t>
+            </a:r>
+            <a:r>
+              <a:rPr lang="en-US" altLang="zh-CN" dirty="0" smtClean="0"/>
+              <a:t>      </a:t>
+            </a:r>
+            <a:r>
+              <a:rPr lang="zh-CN" altLang="en-US" dirty="0" smtClean="0">
+                <a:hlinkClick r:id="rId6"/>
+              </a:rPr>
+              <a:t>深入理解 </a:t>
+            </a:r>
+            <a:r>
+              <a:rPr lang="en-US" altLang="zh-CN" dirty="0" smtClean="0">
+                <a:hlinkClick r:id="rId6"/>
+              </a:rPr>
+              <a:t>Java </a:t>
+            </a:r>
+            <a:r>
+              <a:rPr lang="zh-CN" altLang="en-US" dirty="0" smtClean="0">
+                <a:hlinkClick r:id="rId6"/>
+              </a:rPr>
+              <a:t>中的 </a:t>
+            </a:r>
+            <a:r>
+              <a:rPr lang="en-US" altLang="zh-CN" dirty="0" err="1" smtClean="0">
+                <a:hlinkClick r:id="rId6"/>
+              </a:rPr>
+              <a:t>hashCode</a:t>
+            </a:r>
+            <a:endParaRPr lang="zh-CN" altLang="en-US" dirty="0"/>
+          </a:p>
+        </p:txBody>
+      </p:sp>
+    </p:spTree>
+    <p:extLst>
+      <p:ext uri="{BB962C8B-B14F-4D97-AF65-F5344CB8AC3E}">
+        <p14:creationId xmlns:p14="http://schemas.microsoft.com/office/powerpoint/2010/main" val="1390115636"/>
+      </p:ext>
+    </p:extLst>
+  </p:cSld>
+  <p:clrMapOvr>
+    <a:masterClrMapping/>
+  </p:clrMapOvr>
+  <p:timing>
+    <p:tnLst>
+      <p:par>
+        <p:cTn id="1" dur="indefinite" restart="never" nodeType="tmRoot"/>
+      </p:par>
+    </p:tnLst>
+  </p:timing>
+</p:sld>
+</file>
+
 <file path=ppt/theme/theme1.xml><?xml version="1.0" encoding="utf-8"?>
 <a:theme xmlns:a="http://schemas.openxmlformats.org/drawingml/2006/main" name="Office Theme">
   <a:themeElements>

</xml_diff>

<commit_message>
Record more study information
</commit_message>
<xml_diff>
--- a/JavaStudyRecord/JavaStudyRecord.pptx
+++ b/JavaStudyRecord/JavaStudyRecord.pptx
@@ -8,6 +8,7 @@
     <p:sldId id="256" r:id="rId2"/>
     <p:sldId id="257" r:id="rId3"/>
     <p:sldId id="258" r:id="rId4"/>
+    <p:sldId id="259" r:id="rId5"/>
   </p:sldIdLst>
   <p:sldSz cx="12192000" cy="6858000"/>
   <p:notesSz cx="7559675" cy="10691813"/>
@@ -2619,201 +2620,185 @@
           <a:lstStyle/>
           <a:p>
             <a:r>
-              <a:rPr lang="en-US" altLang="zh-CN" dirty="0" err="1" smtClean="0"/>
+              <a:rPr lang="en-US" altLang="zh-CN" dirty="0" err="1"/>
               <a:t>HashCode</a:t>
             </a:r>
             <a:r>
-              <a:rPr lang="zh-CN" altLang="en-US" dirty="0" smtClean="0"/>
+              <a:rPr lang="zh-CN" altLang="en-US" dirty="0"/>
               <a:t>的讲解</a:t>
             </a:r>
-            <a:endParaRPr lang="en-US" altLang="zh-CN" dirty="0" smtClean="0"/>
-          </a:p>
-          <a:p>
             <a:endParaRPr lang="en-US" altLang="zh-CN" dirty="0"/>
           </a:p>
           <a:p>
-            <a:r>
-              <a:rPr lang="en-US" altLang="zh-CN" dirty="0" smtClean="0"/>
+            <a:endParaRPr lang="en-US" altLang="zh-CN" dirty="0"/>
+          </a:p>
+          <a:p>
+            <a:r>
+              <a:rPr lang="en-US" altLang="zh-CN" dirty="0"/>
               <a:t>       </a:t>
             </a:r>
             <a:r>
-              <a:rPr lang="en-US" altLang="zh-CN" dirty="0" err="1" smtClean="0">
+              <a:rPr lang="en-US" altLang="zh-CN" dirty="0" err="1">
                 <a:hlinkClick r:id="rId2"/>
               </a:rPr>
               <a:t>Hashset</a:t>
             </a:r>
-            <a:endParaRPr lang="en-US" altLang="zh-CN" dirty="0" smtClean="0"/>
+            <a:endParaRPr lang="en-US" altLang="zh-CN" dirty="0"/>
           </a:p>
           <a:p>
             <a:r>
               <a:rPr lang="en-US" altLang="zh-CN" dirty="0"/>
+              <a:t>       </a:t>
+            </a:r>
+            <a:r>
+              <a:rPr lang="en-US" altLang="zh-CN" dirty="0">
+                <a:hlinkClick r:id="rId3"/>
+              </a:rPr>
+              <a:t>Java</a:t>
+            </a:r>
+            <a:r>
+              <a:rPr lang="zh-CN" altLang="en-US" dirty="0">
+                <a:hlinkClick r:id="rId3"/>
+              </a:rPr>
+              <a:t>集合源码系列之</a:t>
+            </a:r>
+            <a:r>
+              <a:rPr lang="en-US" altLang="zh-CN" dirty="0" err="1">
+                <a:hlinkClick r:id="rId3"/>
+              </a:rPr>
+              <a:t>HashMap</a:t>
+            </a:r>
+            <a:r>
+              <a:rPr lang="zh-CN" altLang="en-US" dirty="0">
+                <a:hlinkClick r:id="rId3"/>
+              </a:rPr>
+              <a:t>添加元素的流程</a:t>
+            </a:r>
+            <a:endParaRPr lang="en-US" altLang="zh-CN" dirty="0"/>
+          </a:p>
+          <a:p>
+            <a:r>
+              <a:rPr lang="en-US" altLang="zh-CN" dirty="0"/>
+              <a:t>       </a:t>
+            </a:r>
+            <a:r>
+              <a:rPr lang="en-US" altLang="zh-CN" dirty="0">
+                <a:hlinkClick r:id="rId4"/>
+              </a:rPr>
+              <a:t>Java</a:t>
+            </a:r>
+            <a:r>
+              <a:rPr lang="zh-CN" altLang="en-US" dirty="0">
+                <a:hlinkClick r:id="rId4"/>
+              </a:rPr>
+              <a:t>基础篇：什么是</a:t>
+            </a:r>
+            <a:r>
+              <a:rPr lang="en-US" altLang="zh-CN" dirty="0" err="1">
+                <a:hlinkClick r:id="rId4"/>
+              </a:rPr>
+              <a:t>hashCode</a:t>
+            </a:r>
+            <a:r>
+              <a:rPr lang="en-US" altLang="zh-CN" dirty="0">
+                <a:hlinkClick r:id="rId4"/>
+              </a:rPr>
               <a:t> </a:t>
             </a:r>
             <a:r>
-              <a:rPr lang="en-US" altLang="zh-CN" dirty="0" smtClean="0"/>
-              <a:t>      </a:t>
-            </a:r>
-            <a:r>
-              <a:rPr lang="en-US" altLang="zh-CN" dirty="0" smtClean="0">
-                <a:hlinkClick r:id="rId3"/>
+              <a:rPr lang="zh-CN" altLang="en-US" dirty="0">
+                <a:hlinkClick r:id="rId4"/>
+              </a:rPr>
+              <a:t>以及 </a:t>
+            </a:r>
+            <a:r>
+              <a:rPr lang="en-US" altLang="zh-CN" dirty="0" err="1">
+                <a:hlinkClick r:id="rId4"/>
+              </a:rPr>
+              <a:t>hashCode</a:t>
+            </a:r>
+            <a:r>
+              <a:rPr lang="en-US" altLang="zh-CN" dirty="0">
+                <a:hlinkClick r:id="rId4"/>
+              </a:rPr>
+              <a:t>()</a:t>
+            </a:r>
+            <a:r>
+              <a:rPr lang="zh-CN" altLang="en-US" dirty="0">
+                <a:hlinkClick r:id="rId4"/>
+              </a:rPr>
+              <a:t>与</a:t>
+            </a:r>
+            <a:r>
+              <a:rPr lang="en-US" altLang="zh-CN" dirty="0">
+                <a:hlinkClick r:id="rId4"/>
+              </a:rPr>
+              <a:t>equals()</a:t>
+            </a:r>
+            <a:r>
+              <a:rPr lang="zh-CN" altLang="en-US" dirty="0">
+                <a:hlinkClick r:id="rId4"/>
+              </a:rPr>
+              <a:t>的联系</a:t>
+            </a:r>
+            <a:endParaRPr lang="en-US" altLang="zh-CN" dirty="0"/>
+          </a:p>
+          <a:p>
+            <a:r>
+              <a:rPr lang="en-US" altLang="zh-CN" dirty="0"/>
+              <a:t>       </a:t>
+            </a:r>
+            <a:r>
+              <a:rPr lang="en-US" altLang="zh-CN" dirty="0">
+                <a:hlinkClick r:id="rId5"/>
               </a:rPr>
               <a:t>Java</a:t>
             </a:r>
             <a:r>
-              <a:rPr lang="zh-CN" altLang="en-US" dirty="0" smtClean="0">
-                <a:hlinkClick r:id="rId3"/>
-              </a:rPr>
-              <a:t>集合源码系列之</a:t>
-            </a:r>
-            <a:r>
-              <a:rPr lang="en-US" altLang="zh-CN" dirty="0" err="1" smtClean="0">
-                <a:hlinkClick r:id="rId3"/>
-              </a:rPr>
-              <a:t>HashMap</a:t>
-            </a:r>
-            <a:r>
-              <a:rPr lang="zh-CN" altLang="en-US" dirty="0" smtClean="0">
-                <a:hlinkClick r:id="rId3"/>
-              </a:rPr>
-              <a:t>添加元素的流程</a:t>
-            </a:r>
-            <a:endParaRPr lang="en-US" altLang="zh-CN" dirty="0" smtClean="0"/>
+              <a:rPr lang="zh-CN" altLang="en-US" dirty="0">
+                <a:hlinkClick r:id="rId5"/>
+              </a:rPr>
+              <a:t>基础之</a:t>
+            </a:r>
+            <a:r>
+              <a:rPr lang="en-US" altLang="zh-CN" dirty="0" err="1">
+                <a:hlinkClick r:id="rId5"/>
+              </a:rPr>
+              <a:t>hashcode</a:t>
+            </a:r>
+            <a:r>
+              <a:rPr lang="zh-CN" altLang="en-US" dirty="0">
+                <a:hlinkClick r:id="rId5"/>
+              </a:rPr>
+              <a:t>剖析</a:t>
+            </a:r>
+            <a:endParaRPr lang="en-US" altLang="zh-CN" dirty="0"/>
           </a:p>
           <a:p>
             <a:r>
               <a:rPr lang="en-US" altLang="zh-CN" dirty="0"/>
-              <a:t> </a:t>
-            </a:r>
-            <a:r>
-              <a:rPr lang="en-US" altLang="zh-CN" dirty="0" smtClean="0"/>
-              <a:t>      </a:t>
-            </a:r>
-            <a:r>
-              <a:rPr lang="en-US" altLang="zh-CN" dirty="0" smtClean="0">
-                <a:hlinkClick r:id="rId4"/>
-              </a:rPr>
-              <a:t>Java</a:t>
-            </a:r>
-            <a:r>
-              <a:rPr lang="zh-CN" altLang="en-US" dirty="0" smtClean="0">
-                <a:hlinkClick r:id="rId4"/>
-              </a:rPr>
-              <a:t>基础篇：什么是</a:t>
-            </a:r>
-            <a:r>
-              <a:rPr lang="en-US" altLang="zh-CN" dirty="0" err="1" smtClean="0">
-                <a:hlinkClick r:id="rId4"/>
-              </a:rPr>
-              <a:t>hashCode</a:t>
-            </a:r>
-            <a:r>
-              <a:rPr lang="en-US" altLang="zh-CN" dirty="0" smtClean="0">
-                <a:hlinkClick r:id="rId4"/>
-              </a:rPr>
-              <a:t> </a:t>
-            </a:r>
-            <a:r>
-              <a:rPr lang="zh-CN" altLang="en-US" dirty="0" smtClean="0">
-                <a:hlinkClick r:id="rId4"/>
-              </a:rPr>
-              <a:t>以及 </a:t>
-            </a:r>
-            <a:r>
-              <a:rPr lang="en-US" altLang="zh-CN" dirty="0" err="1" smtClean="0">
-                <a:hlinkClick r:id="rId4"/>
-              </a:rPr>
-              <a:t>hashCode</a:t>
-            </a:r>
-            <a:r>
-              <a:rPr lang="en-US" altLang="zh-CN" dirty="0" smtClean="0">
-                <a:hlinkClick r:id="rId4"/>
-              </a:rPr>
-              <a:t>()</a:t>
-            </a:r>
-            <a:r>
-              <a:rPr lang="zh-CN" altLang="en-US" dirty="0" smtClean="0">
-                <a:hlinkClick r:id="rId4"/>
-              </a:rPr>
-              <a:t>与</a:t>
-            </a:r>
-            <a:r>
-              <a:rPr lang="en-US" altLang="zh-CN" dirty="0" smtClean="0">
-                <a:hlinkClick r:id="rId4"/>
-              </a:rPr>
-              <a:t>equals()</a:t>
-            </a:r>
-            <a:r>
-              <a:rPr lang="zh-CN" altLang="en-US" dirty="0" smtClean="0">
-                <a:hlinkClick r:id="rId4"/>
-              </a:rPr>
-              <a:t>的联系</a:t>
-            </a:r>
-            <a:endParaRPr lang="en-US" altLang="zh-CN" dirty="0" smtClean="0"/>
-          </a:p>
-          <a:p>
-            <a:r>
-              <a:rPr lang="en-US" altLang="zh-CN" dirty="0"/>
-              <a:t> </a:t>
-            </a:r>
-            <a:r>
-              <a:rPr lang="en-US" altLang="zh-CN" dirty="0" smtClean="0"/>
-              <a:t>      </a:t>
-            </a:r>
-            <a:r>
-              <a:rPr lang="en-US" altLang="zh-CN" dirty="0" smtClean="0">
-                <a:hlinkClick r:id="rId5"/>
-              </a:rPr>
-              <a:t>Java</a:t>
-            </a:r>
-            <a:r>
-              <a:rPr lang="zh-CN" altLang="en-US" dirty="0" smtClean="0">
-                <a:hlinkClick r:id="rId5"/>
-              </a:rPr>
-              <a:t>基础之</a:t>
-            </a:r>
-            <a:r>
-              <a:rPr lang="en-US" altLang="zh-CN" dirty="0" err="1" smtClean="0">
-                <a:hlinkClick r:id="rId5"/>
-              </a:rPr>
-              <a:t>hashcode</a:t>
-            </a:r>
-            <a:r>
-              <a:rPr lang="zh-CN" altLang="en-US" dirty="0" smtClean="0">
-                <a:hlinkClick r:id="rId5"/>
-              </a:rPr>
-              <a:t>剖析</a:t>
-            </a:r>
-            <a:endParaRPr lang="en-US" altLang="zh-CN" dirty="0" smtClean="0"/>
-          </a:p>
-          <a:p>
-            <a:r>
-              <a:rPr lang="en-US" altLang="zh-CN" dirty="0"/>
-              <a:t> </a:t>
-            </a:r>
-            <a:r>
-              <a:rPr lang="en-US" altLang="zh-CN" dirty="0" smtClean="0"/>
-              <a:t>      </a:t>
-            </a:r>
-            <a:r>
-              <a:rPr lang="zh-CN" altLang="en-US" dirty="0" smtClean="0">
+              <a:t>       </a:t>
+            </a:r>
+            <a:r>
+              <a:rPr lang="zh-CN" altLang="en-US" dirty="0">
                 <a:hlinkClick r:id="rId6"/>
               </a:rPr>
               <a:t>深入理解 </a:t>
             </a:r>
             <a:r>
-              <a:rPr lang="en-US" altLang="zh-CN" dirty="0" smtClean="0">
+              <a:rPr lang="en-US" altLang="zh-CN" dirty="0">
                 <a:hlinkClick r:id="rId6"/>
               </a:rPr>
               <a:t>Java </a:t>
             </a:r>
             <a:r>
-              <a:rPr lang="zh-CN" altLang="en-US" dirty="0" smtClean="0">
+              <a:rPr lang="zh-CN" altLang="en-US" dirty="0">
                 <a:hlinkClick r:id="rId6"/>
               </a:rPr>
               <a:t>中的 </a:t>
             </a:r>
             <a:r>
-              <a:rPr lang="en-US" altLang="zh-CN" dirty="0" err="1" smtClean="0">
+              <a:rPr lang="en-US" altLang="zh-CN" dirty="0" err="1">
                 <a:hlinkClick r:id="rId6"/>
               </a:rPr>
               <a:t>hashCode</a:t>
@@ -2832,13 +2817,107 @@
   <p:clrMapOvr>
     <a:masterClrMapping/>
   </p:clrMapOvr>
-  <p:timing>
-    <p:tnLst>
-      <p:par>
-        <p:cTn id="1" dur="indefinite" restart="never" nodeType="tmRoot"/>
-      </p:par>
-    </p:tnLst>
-  </p:timing>
+</p:sld>
+</file>
+
+<file path=ppt/slides/slide4.xml><?xml version="1.0" encoding="utf-8"?>
+<p:sld xmlns:a="http://schemas.openxmlformats.org/drawingml/2006/main" xmlns:r="http://schemas.openxmlformats.org/officeDocument/2006/relationships" xmlns:p="http://schemas.openxmlformats.org/presentationml/2006/main">
+  <p:cSld>
+    <p:spTree>
+      <p:nvGrpSpPr>
+        <p:cNvPr id="1" name=""/>
+        <p:cNvGrpSpPr/>
+        <p:nvPr/>
+      </p:nvGrpSpPr>
+      <p:grpSpPr>
+        <a:xfrm>
+          <a:off x="0" y="0"/>
+          <a:ext cx="0" cy="0"/>
+          <a:chOff x="0" y="0"/>
+          <a:chExt cx="0" cy="0"/>
+        </a:xfrm>
+      </p:grpSpPr>
+      <p:sp>
+        <p:nvSpPr>
+          <p:cNvPr id="4" name="文字方塊 3">
+            <a:extLst>
+              <a:ext uri="{FF2B5EF4-FFF2-40B4-BE49-F238E27FC236}">
+                <a16:creationId xmlns:a16="http://schemas.microsoft.com/office/drawing/2014/main" id="{37C4D5D8-0DAE-414D-8FD1-9F5B5DF26D02}"/>
+              </a:ext>
+            </a:extLst>
+          </p:cNvPr>
+          <p:cNvSpPr txBox="1"/>
+          <p:nvPr/>
+        </p:nvSpPr>
+        <p:spPr>
+          <a:xfrm>
+            <a:off x="355600" y="406400"/>
+            <a:ext cx="1967205" cy="1200329"/>
+          </a:xfrm>
+          <a:prstGeom prst="rect">
+            <a:avLst/>
+          </a:prstGeom>
+          <a:noFill/>
+        </p:spPr>
+        <p:txBody>
+          <a:bodyPr wrap="none" rtlCol="0">
+            <a:spAutoFit/>
+          </a:bodyPr>
+          <a:lstStyle/>
+          <a:p>
+            <a:r>
+              <a:rPr lang="zh-CN" altLang="en-US" dirty="0"/>
+              <a:t>紅黑樹</a:t>
+            </a:r>
+            <a:endParaRPr lang="en-US" altLang="zh-CN" dirty="0"/>
+          </a:p>
+          <a:p>
+            <a:endParaRPr lang="en-US" altLang="zh-TW" dirty="0"/>
+          </a:p>
+          <a:p>
+            <a:r>
+              <a:rPr lang="en-US" altLang="zh-TW" dirty="0"/>
+              <a:t>	</a:t>
+            </a:r>
+            <a:r>
+              <a:rPr lang="zh-TW" altLang="en-US" dirty="0">
+                <a:hlinkClick r:id="rId2"/>
+              </a:rPr>
+              <a:t>紅黑樹</a:t>
+            </a:r>
+            <a:endParaRPr lang="en-US" altLang="zh-TW" dirty="0"/>
+          </a:p>
+          <a:p>
+            <a:r>
+              <a:rPr lang="en-US" altLang="zh-TW" dirty="0"/>
+              <a:t>               </a:t>
+            </a:r>
+            <a:r>
+              <a:rPr lang="zh-TW" altLang="en-US" dirty="0">
+                <a:hlinkClick r:id="rId3"/>
+              </a:rPr>
+              <a:t>紅黑樹</a:t>
+            </a:r>
+            <a:r>
+              <a:rPr lang="en-US" altLang="zh-TW">
+                <a:hlinkClick r:id="rId3"/>
+              </a:rPr>
+              <a:t>2</a:t>
+            </a:r>
+            <a:endParaRPr lang="zh-TW" altLang="en-US" dirty="0"/>
+          </a:p>
+        </p:txBody>
+      </p:sp>
+    </p:spTree>
+    <p:extLst>
+      <p:ext uri="{BB962C8B-B14F-4D97-AF65-F5344CB8AC3E}">
+        <p14:creationId xmlns:p14="http://schemas.microsoft.com/office/powerpoint/2010/main" val="267808836"/>
+      </p:ext>
+    </p:extLst>
+  </p:cSld>
+  <p:clrMapOvr>
+    <a:masterClrMapping/>
+  </p:clrMapOvr>
 </p:sld>
 </file>
 

</xml_diff>

<commit_message>
Add the idea code comment study website
</commit_message>
<xml_diff>
--- a/JavaStudyRecord/JavaStudyRecord.pptx
+++ b/JavaStudyRecord/JavaStudyRecord.pptx
@@ -1,24 +1,134 @@
 
 <file path=ppt/presentation.xml><?xml version="1.0" encoding="utf-8"?>
-<p:presentation xmlns:a="http://schemas.openxmlformats.org/drawingml/2006/main" xmlns:p="http://schemas.openxmlformats.org/presentationml/2006/main" xmlns:r="http://schemas.openxmlformats.org/officeDocument/2006/relationships" xmlns:p14="http://schemas.microsoft.com/office/powerpoint/2010/main" xmlns:p15="http://schemas.microsoft.com/office/powerpoint/2012/main" xmlns:mc="http://schemas.openxmlformats.org/markup-compatibility/2006">
+<p:presentation xmlns:a="http://schemas.openxmlformats.org/drawingml/2006/main" xmlns:r="http://schemas.openxmlformats.org/officeDocument/2006/relationships" xmlns:p="http://schemas.openxmlformats.org/presentationml/2006/main">
   <p:sldMasterIdLst>
-    <p:sldMasterId id="2147483648" r:id="rId2"/>
-    <p:sldMasterId id="2147483661" r:id="rId3"/>
+    <p:sldMasterId id="2147483648" r:id="rId1"/>
+    <p:sldMasterId id="2147483661" r:id="rId2"/>
   </p:sldMasterIdLst>
   <p:sldIdLst>
-    <p:sldId id="256" r:id="rId4"/>
-    <p:sldId id="257" r:id="rId5"/>
-    <p:sldId id="258" r:id="rId6"/>
-    <p:sldId id="259" r:id="rId7"/>
-    <p:sldId id="260" r:id="rId8"/>
+    <p:sldId id="256" r:id="rId3"/>
+    <p:sldId id="257" r:id="rId4"/>
+    <p:sldId id="258" r:id="rId5"/>
+    <p:sldId id="260" r:id="rId6"/>
   </p:sldIdLst>
   <p:sldSz cx="12192000" cy="6858000"/>
-  <p:notesSz cx="7559675" cy="10691812"/>
+  <p:notesSz cx="7559675" cy="10691813"/>
+  <p:defaultTextStyle>
+    <a:defPPr>
+      <a:defRPr lang="zh-CN"/>
+    </a:defPPr>
+    <a:lvl1pPr marL="0" algn="l" defTabSz="914400" rtl="0" eaLnBrk="1" latinLnBrk="0" hangingPunct="1">
+      <a:defRPr sz="1800" kern="1200">
+        <a:solidFill>
+          <a:schemeClr val="tx1"/>
+        </a:solidFill>
+        <a:latin typeface="+mn-lt"/>
+        <a:ea typeface="+mn-ea"/>
+        <a:cs typeface="+mn-cs"/>
+      </a:defRPr>
+    </a:lvl1pPr>
+    <a:lvl2pPr marL="457200" algn="l" defTabSz="914400" rtl="0" eaLnBrk="1" latinLnBrk="0" hangingPunct="1">
+      <a:defRPr sz="1800" kern="1200">
+        <a:solidFill>
+          <a:schemeClr val="tx1"/>
+        </a:solidFill>
+        <a:latin typeface="+mn-lt"/>
+        <a:ea typeface="+mn-ea"/>
+        <a:cs typeface="+mn-cs"/>
+      </a:defRPr>
+    </a:lvl2pPr>
+    <a:lvl3pPr marL="914400" algn="l" defTabSz="914400" rtl="0" eaLnBrk="1" latinLnBrk="0" hangingPunct="1">
+      <a:defRPr sz="1800" kern="1200">
+        <a:solidFill>
+          <a:schemeClr val="tx1"/>
+        </a:solidFill>
+        <a:latin typeface="+mn-lt"/>
+        <a:ea typeface="+mn-ea"/>
+        <a:cs typeface="+mn-cs"/>
+      </a:defRPr>
+    </a:lvl3pPr>
+    <a:lvl4pPr marL="1371600" algn="l" defTabSz="914400" rtl="0" eaLnBrk="1" latinLnBrk="0" hangingPunct="1">
+      <a:defRPr sz="1800" kern="1200">
+        <a:solidFill>
+          <a:schemeClr val="tx1"/>
+        </a:solidFill>
+        <a:latin typeface="+mn-lt"/>
+        <a:ea typeface="+mn-ea"/>
+        <a:cs typeface="+mn-cs"/>
+      </a:defRPr>
+    </a:lvl4pPr>
+    <a:lvl5pPr marL="1828800" algn="l" defTabSz="914400" rtl="0" eaLnBrk="1" latinLnBrk="0" hangingPunct="1">
+      <a:defRPr sz="1800" kern="1200">
+        <a:solidFill>
+          <a:schemeClr val="tx1"/>
+        </a:solidFill>
+        <a:latin typeface="+mn-lt"/>
+        <a:ea typeface="+mn-ea"/>
+        <a:cs typeface="+mn-cs"/>
+      </a:defRPr>
+    </a:lvl5pPr>
+    <a:lvl6pPr marL="2286000" algn="l" defTabSz="914400" rtl="0" eaLnBrk="1" latinLnBrk="0" hangingPunct="1">
+      <a:defRPr sz="1800" kern="1200">
+        <a:solidFill>
+          <a:schemeClr val="tx1"/>
+        </a:solidFill>
+        <a:latin typeface="+mn-lt"/>
+        <a:ea typeface="+mn-ea"/>
+        <a:cs typeface="+mn-cs"/>
+      </a:defRPr>
+    </a:lvl6pPr>
+    <a:lvl7pPr marL="2743200" algn="l" defTabSz="914400" rtl="0" eaLnBrk="1" latinLnBrk="0" hangingPunct="1">
+      <a:defRPr sz="1800" kern="1200">
+        <a:solidFill>
+          <a:schemeClr val="tx1"/>
+        </a:solidFill>
+        <a:latin typeface="+mn-lt"/>
+        <a:ea typeface="+mn-ea"/>
+        <a:cs typeface="+mn-cs"/>
+      </a:defRPr>
+    </a:lvl7pPr>
+    <a:lvl8pPr marL="3200400" algn="l" defTabSz="914400" rtl="0" eaLnBrk="1" latinLnBrk="0" hangingPunct="1">
+      <a:defRPr sz="1800" kern="1200">
+        <a:solidFill>
+          <a:schemeClr val="tx1"/>
+        </a:solidFill>
+        <a:latin typeface="+mn-lt"/>
+        <a:ea typeface="+mn-ea"/>
+        <a:cs typeface="+mn-cs"/>
+      </a:defRPr>
+    </a:lvl8pPr>
+    <a:lvl9pPr marL="3657600" algn="l" defTabSz="914400" rtl="0" eaLnBrk="1" latinLnBrk="0" hangingPunct="1">
+      <a:defRPr sz="1800" kern="1200">
+        <a:solidFill>
+          <a:schemeClr val="tx1"/>
+        </a:solidFill>
+        <a:latin typeface="+mn-lt"/>
+        <a:ea typeface="+mn-ea"/>
+        <a:cs typeface="+mn-cs"/>
+      </a:defRPr>
+    </a:lvl9pPr>
+  </p:defaultTextStyle>
+  <p:extLst>
+    <p:ext uri="{EFAFB233-063F-42B5-8137-9DF3F51BA10A}">
+      <p15:sldGuideLst xmlns:p15="http://schemas.microsoft.com/office/powerpoint/2012/main">
+        <p15:guide id="1" orient="horz" pos="2160" userDrawn="1">
+          <p15:clr>
+            <a:srgbClr val="A4A3A4"/>
+          </p15:clr>
+        </p15:guide>
+        <p15:guide id="2" pos="3840" userDrawn="1">
+          <p15:clr>
+            <a:srgbClr val="A4A3A4"/>
+          </p15:clr>
+        </p15:guide>
+      </p15:sldGuideLst>
+    </p:ext>
+  </p:extLst>
 </p:presentation>
 </file>
 
 <file path=ppt/slideLayouts/slideLayout1.xml><?xml version="1.0" encoding="utf-8"?>
-<p:sldLayout xmlns:a="http://schemas.openxmlformats.org/drawingml/2006/main" xmlns:p="http://schemas.openxmlformats.org/presentationml/2006/main" xmlns:r="http://schemas.openxmlformats.org/officeDocument/2006/relationships" xmlns:p14="http://schemas.microsoft.com/office/powerpoint/2010/main" xmlns:p15="http://schemas.microsoft.com/office/powerpoint/2012/main" xmlns:mc="http://schemas.openxmlformats.org/markup-compatibility/2006" type="blank" preserve="1">
+<p:sldLayout xmlns:a="http://schemas.openxmlformats.org/drawingml/2006/main" xmlns:r="http://schemas.openxmlformats.org/officeDocument/2006/relationships" xmlns:p="http://schemas.openxmlformats.org/presentationml/2006/main" type="blank" preserve="1">
   <p:cSld name="Blank Slide">
     <p:spTree>
       <p:nvGrpSpPr>
@@ -36,11 +146,14 @@
       </p:grpSpPr>
     </p:spTree>
   </p:cSld>
+  <p:clrMapOvr>
+    <a:masterClrMapping/>
+  </p:clrMapOvr>
 </p:sldLayout>
 </file>
 
 <file path=ppt/slideLayouts/slideLayout10.xml><?xml version="1.0" encoding="utf-8"?>
-<p:sldLayout xmlns:a="http://schemas.openxmlformats.org/drawingml/2006/main" xmlns:p="http://schemas.openxmlformats.org/presentationml/2006/main" xmlns:r="http://schemas.openxmlformats.org/officeDocument/2006/relationships" xmlns:p14="http://schemas.microsoft.com/office/powerpoint/2010/main" xmlns:p15="http://schemas.microsoft.com/office/powerpoint/2012/main" xmlns:mc="http://schemas.openxmlformats.org/markup-compatibility/2006" type="objOverTx" preserve="1">
+<p:sldLayout xmlns:a="http://schemas.openxmlformats.org/drawingml/2006/main" xmlns:r="http://schemas.openxmlformats.org/officeDocument/2006/relationships" xmlns:p="http://schemas.openxmlformats.org/presentationml/2006/main" type="objOverTx" preserve="1">
   <p:cSld name="Title, Content over Content">
     <p:spTree>
       <p:nvGrpSpPr>
@@ -76,11 +189,12 @@
           </a:prstGeom>
         </p:spPr>
         <p:txBody>
-          <a:bodyPr lIns="0" rIns="0" tIns="0" bIns="0" anchor="ctr">
+          <a:bodyPr lIns="0" tIns="0" rIns="0" bIns="0" anchor="ctr">
             <a:spAutoFit/>
           </a:bodyPr>
-          <a:p>
-            <a:endParaRPr b="0" lang="zh-TW" sz="1800" spc="-1" strike="noStrike">
+          <a:lstStyle/>
+          <a:p>
+            <a:endParaRPr lang="zh-TW" sz="1800" b="0" strike="noStrike" spc="-1">
               <a:solidFill>
                 <a:srgbClr val="000000"/>
               </a:solidFill>
@@ -109,11 +223,12 @@
           </a:prstGeom>
         </p:spPr>
         <p:txBody>
-          <a:bodyPr lIns="0" rIns="0" tIns="0" bIns="0">
+          <a:bodyPr lIns="0" tIns="0" rIns="0" bIns="0">
             <a:normAutofit/>
           </a:bodyPr>
-          <a:p>
-            <a:endParaRPr b="0" lang="zh-TW" sz="2800" spc="-1" strike="noStrike">
+          <a:lstStyle/>
+          <a:p>
+            <a:endParaRPr lang="zh-TW" sz="2800" b="0" strike="noStrike" spc="-1">
               <a:solidFill>
                 <a:srgbClr val="000000"/>
               </a:solidFill>
@@ -142,11 +257,12 @@
           </a:prstGeom>
         </p:spPr>
         <p:txBody>
-          <a:bodyPr lIns="0" rIns="0" tIns="0" bIns="0">
+          <a:bodyPr lIns="0" tIns="0" rIns="0" bIns="0">
             <a:normAutofit/>
           </a:bodyPr>
-          <a:p>
-            <a:endParaRPr b="0" lang="zh-TW" sz="2800" spc="-1" strike="noStrike">
+          <a:lstStyle/>
+          <a:p>
+            <a:endParaRPr lang="zh-TW" sz="2800" b="0" strike="noStrike" spc="-1">
               <a:solidFill>
                 <a:srgbClr val="000000"/>
               </a:solidFill>
@@ -157,11 +273,14 @@
       </p:sp>
     </p:spTree>
   </p:cSld>
+  <p:clrMapOvr>
+    <a:masterClrMapping/>
+  </p:clrMapOvr>
 </p:sldLayout>
 </file>
 
 <file path=ppt/slideLayouts/slideLayout11.xml><?xml version="1.0" encoding="utf-8"?>
-<p:sldLayout xmlns:a="http://schemas.openxmlformats.org/drawingml/2006/main" xmlns:p="http://schemas.openxmlformats.org/presentationml/2006/main" xmlns:r="http://schemas.openxmlformats.org/officeDocument/2006/relationships" xmlns:p14="http://schemas.microsoft.com/office/powerpoint/2010/main" xmlns:p15="http://schemas.microsoft.com/office/powerpoint/2012/main" xmlns:mc="http://schemas.openxmlformats.org/markup-compatibility/2006" type="fourObj" preserve="1">
+<p:sldLayout xmlns:a="http://schemas.openxmlformats.org/drawingml/2006/main" xmlns:r="http://schemas.openxmlformats.org/officeDocument/2006/relationships" xmlns:p="http://schemas.openxmlformats.org/presentationml/2006/main" type="fourObj" preserve="1">
   <p:cSld name="Title, 4 Content">
     <p:spTree>
       <p:nvGrpSpPr>
@@ -197,11 +316,12 @@
           </a:prstGeom>
         </p:spPr>
         <p:txBody>
-          <a:bodyPr lIns="0" rIns="0" tIns="0" bIns="0" anchor="ctr">
+          <a:bodyPr lIns="0" tIns="0" rIns="0" bIns="0" anchor="ctr">
             <a:spAutoFit/>
           </a:bodyPr>
-          <a:p>
-            <a:endParaRPr b="0" lang="zh-TW" sz="1800" spc="-1" strike="noStrike">
+          <a:lstStyle/>
+          <a:p>
+            <a:endParaRPr lang="zh-TW" sz="1800" b="0" strike="noStrike" spc="-1">
               <a:solidFill>
                 <a:srgbClr val="000000"/>
               </a:solidFill>
@@ -230,11 +350,12 @@
           </a:prstGeom>
         </p:spPr>
         <p:txBody>
-          <a:bodyPr lIns="0" rIns="0" tIns="0" bIns="0">
+          <a:bodyPr lIns="0" tIns="0" rIns="0" bIns="0">
             <a:normAutofit/>
           </a:bodyPr>
-          <a:p>
-            <a:endParaRPr b="0" lang="zh-TW" sz="2800" spc="-1" strike="noStrike">
+          <a:lstStyle/>
+          <a:p>
+            <a:endParaRPr lang="zh-TW" sz="2800" b="0" strike="noStrike" spc="-1">
               <a:solidFill>
                 <a:srgbClr val="000000"/>
               </a:solidFill>
@@ -263,11 +384,12 @@
           </a:prstGeom>
         </p:spPr>
         <p:txBody>
-          <a:bodyPr lIns="0" rIns="0" tIns="0" bIns="0">
+          <a:bodyPr lIns="0" tIns="0" rIns="0" bIns="0">
             <a:normAutofit/>
           </a:bodyPr>
-          <a:p>
-            <a:endParaRPr b="0" lang="zh-TW" sz="2800" spc="-1" strike="noStrike">
+          <a:lstStyle/>
+          <a:p>
+            <a:endParaRPr lang="zh-TW" sz="2800" b="0" strike="noStrike" spc="-1">
               <a:solidFill>
                 <a:srgbClr val="000000"/>
               </a:solidFill>
@@ -296,11 +418,12 @@
           </a:prstGeom>
         </p:spPr>
         <p:txBody>
-          <a:bodyPr lIns="0" rIns="0" tIns="0" bIns="0">
+          <a:bodyPr lIns="0" tIns="0" rIns="0" bIns="0">
             <a:normAutofit/>
           </a:bodyPr>
-          <a:p>
-            <a:endParaRPr b="0" lang="zh-TW" sz="2800" spc="-1" strike="noStrike">
+          <a:lstStyle/>
+          <a:p>
+            <a:endParaRPr lang="zh-TW" sz="2800" b="0" strike="noStrike" spc="-1">
               <a:solidFill>
                 <a:srgbClr val="000000"/>
               </a:solidFill>
@@ -329,11 +452,12 @@
           </a:prstGeom>
         </p:spPr>
         <p:txBody>
-          <a:bodyPr lIns="0" rIns="0" tIns="0" bIns="0">
+          <a:bodyPr lIns="0" tIns="0" rIns="0" bIns="0">
             <a:normAutofit/>
           </a:bodyPr>
-          <a:p>
-            <a:endParaRPr b="0" lang="zh-TW" sz="2800" spc="-1" strike="noStrike">
+          <a:lstStyle/>
+          <a:p>
+            <a:endParaRPr lang="zh-TW" sz="2800" b="0" strike="noStrike" spc="-1">
               <a:solidFill>
                 <a:srgbClr val="000000"/>
               </a:solidFill>
@@ -344,11 +468,14 @@
       </p:sp>
     </p:spTree>
   </p:cSld>
+  <p:clrMapOvr>
+    <a:masterClrMapping/>
+  </p:clrMapOvr>
 </p:sldLayout>
 </file>
 
 <file path=ppt/slideLayouts/slideLayout12.xml><?xml version="1.0" encoding="utf-8"?>
-<p:sldLayout xmlns:a="http://schemas.openxmlformats.org/drawingml/2006/main" xmlns:p="http://schemas.openxmlformats.org/presentationml/2006/main" xmlns:r="http://schemas.openxmlformats.org/officeDocument/2006/relationships" xmlns:p14="http://schemas.microsoft.com/office/powerpoint/2010/main" xmlns:p15="http://schemas.microsoft.com/office/powerpoint/2012/main" xmlns:mc="http://schemas.openxmlformats.org/markup-compatibility/2006" type="blank" preserve="1">
+<p:sldLayout xmlns:a="http://schemas.openxmlformats.org/drawingml/2006/main" xmlns:r="http://schemas.openxmlformats.org/officeDocument/2006/relationships" xmlns:p="http://schemas.openxmlformats.org/presentationml/2006/main" type="blank" preserve="1">
   <p:cSld name="Title, 6 Content">
     <p:spTree>
       <p:nvGrpSpPr>
@@ -384,11 +511,12 @@
           </a:prstGeom>
         </p:spPr>
         <p:txBody>
-          <a:bodyPr lIns="0" rIns="0" tIns="0" bIns="0" anchor="ctr">
+          <a:bodyPr lIns="0" tIns="0" rIns="0" bIns="0" anchor="ctr">
             <a:spAutoFit/>
           </a:bodyPr>
-          <a:p>
-            <a:endParaRPr b="0" lang="zh-TW" sz="1800" spc="-1" strike="noStrike">
+          <a:lstStyle/>
+          <a:p>
+            <a:endParaRPr lang="zh-TW" sz="1800" b="0" strike="noStrike" spc="-1">
               <a:solidFill>
                 <a:srgbClr val="000000"/>
               </a:solidFill>
@@ -417,11 +545,12 @@
           </a:prstGeom>
         </p:spPr>
         <p:txBody>
-          <a:bodyPr lIns="0" rIns="0" tIns="0" bIns="0">
+          <a:bodyPr lIns="0" tIns="0" rIns="0" bIns="0">
             <a:normAutofit/>
           </a:bodyPr>
-          <a:p>
-            <a:endParaRPr b="0" lang="zh-TW" sz="2800" spc="-1" strike="noStrike">
+          <a:lstStyle/>
+          <a:p>
+            <a:endParaRPr lang="zh-TW" sz="2800" b="0" strike="noStrike" spc="-1">
               <a:solidFill>
                 <a:srgbClr val="000000"/>
               </a:solidFill>
@@ -450,11 +579,12 @@
           </a:prstGeom>
         </p:spPr>
         <p:txBody>
-          <a:bodyPr lIns="0" rIns="0" tIns="0" bIns="0">
+          <a:bodyPr lIns="0" tIns="0" rIns="0" bIns="0">
             <a:normAutofit/>
           </a:bodyPr>
-          <a:p>
-            <a:endParaRPr b="0" lang="zh-TW" sz="2800" spc="-1" strike="noStrike">
+          <a:lstStyle/>
+          <a:p>
+            <a:endParaRPr lang="zh-TW" sz="2800" b="0" strike="noStrike" spc="-1">
               <a:solidFill>
                 <a:srgbClr val="000000"/>
               </a:solidFill>
@@ -483,11 +613,12 @@
           </a:prstGeom>
         </p:spPr>
         <p:txBody>
-          <a:bodyPr lIns="0" rIns="0" tIns="0" bIns="0">
+          <a:bodyPr lIns="0" tIns="0" rIns="0" bIns="0">
             <a:normAutofit/>
           </a:bodyPr>
-          <a:p>
-            <a:endParaRPr b="0" lang="zh-TW" sz="2800" spc="-1" strike="noStrike">
+          <a:lstStyle/>
+          <a:p>
+            <a:endParaRPr lang="zh-TW" sz="2800" b="0" strike="noStrike" spc="-1">
               <a:solidFill>
                 <a:srgbClr val="000000"/>
               </a:solidFill>
@@ -516,11 +647,12 @@
           </a:prstGeom>
         </p:spPr>
         <p:txBody>
-          <a:bodyPr lIns="0" rIns="0" tIns="0" bIns="0">
+          <a:bodyPr lIns="0" tIns="0" rIns="0" bIns="0">
             <a:normAutofit/>
           </a:bodyPr>
-          <a:p>
-            <a:endParaRPr b="0" lang="zh-TW" sz="2800" spc="-1" strike="noStrike">
+          <a:lstStyle/>
+          <a:p>
+            <a:endParaRPr lang="zh-TW" sz="2800" b="0" strike="noStrike" spc="-1">
               <a:solidFill>
                 <a:srgbClr val="000000"/>
               </a:solidFill>
@@ -549,11 +681,12 @@
           </a:prstGeom>
         </p:spPr>
         <p:txBody>
-          <a:bodyPr lIns="0" rIns="0" tIns="0" bIns="0">
+          <a:bodyPr lIns="0" tIns="0" rIns="0" bIns="0">
             <a:normAutofit/>
           </a:bodyPr>
-          <a:p>
-            <a:endParaRPr b="0" lang="zh-TW" sz="2800" spc="-1" strike="noStrike">
+          <a:lstStyle/>
+          <a:p>
+            <a:endParaRPr lang="zh-TW" sz="2800" b="0" strike="noStrike" spc="-1">
               <a:solidFill>
                 <a:srgbClr val="000000"/>
               </a:solidFill>
@@ -582,11 +715,12 @@
           </a:prstGeom>
         </p:spPr>
         <p:txBody>
-          <a:bodyPr lIns="0" rIns="0" tIns="0" bIns="0">
+          <a:bodyPr lIns="0" tIns="0" rIns="0" bIns="0">
             <a:normAutofit/>
           </a:bodyPr>
-          <a:p>
-            <a:endParaRPr b="0" lang="zh-TW" sz="2800" spc="-1" strike="noStrike">
+          <a:lstStyle/>
+          <a:p>
+            <a:endParaRPr lang="zh-TW" sz="2800" b="0" strike="noStrike" spc="-1">
               <a:solidFill>
                 <a:srgbClr val="000000"/>
               </a:solidFill>
@@ -597,11 +731,14 @@
       </p:sp>
     </p:spTree>
   </p:cSld>
+  <p:clrMapOvr>
+    <a:masterClrMapping/>
+  </p:clrMapOvr>
 </p:sldLayout>
 </file>
 
 <file path=ppt/slideLayouts/slideLayout13.xml><?xml version="1.0" encoding="utf-8"?>
-<p:sldLayout xmlns:a="http://schemas.openxmlformats.org/drawingml/2006/main" xmlns:p="http://schemas.openxmlformats.org/presentationml/2006/main" xmlns:r="http://schemas.openxmlformats.org/officeDocument/2006/relationships" xmlns:p14="http://schemas.microsoft.com/office/powerpoint/2010/main" xmlns:p15="http://schemas.microsoft.com/office/powerpoint/2012/main" xmlns:mc="http://schemas.openxmlformats.org/markup-compatibility/2006" type="blank" preserve="1">
+<p:sldLayout xmlns:a="http://schemas.openxmlformats.org/drawingml/2006/main" xmlns:r="http://schemas.openxmlformats.org/officeDocument/2006/relationships" xmlns:p="http://schemas.openxmlformats.org/presentationml/2006/main" type="blank" preserve="1">
   <p:cSld name="Blank Slide">
     <p:spTree>
       <p:nvGrpSpPr>
@@ -619,11 +756,14 @@
       </p:grpSpPr>
     </p:spTree>
   </p:cSld>
+  <p:clrMapOvr>
+    <a:masterClrMapping/>
+  </p:clrMapOvr>
 </p:sldLayout>
 </file>
 
 <file path=ppt/slideLayouts/slideLayout14.xml><?xml version="1.0" encoding="utf-8"?>
-<p:sldLayout xmlns:a="http://schemas.openxmlformats.org/drawingml/2006/main" xmlns:p="http://schemas.openxmlformats.org/presentationml/2006/main" xmlns:r="http://schemas.openxmlformats.org/officeDocument/2006/relationships" xmlns:p14="http://schemas.microsoft.com/office/powerpoint/2010/main" xmlns:p15="http://schemas.microsoft.com/office/powerpoint/2012/main" xmlns:mc="http://schemas.openxmlformats.org/markup-compatibility/2006" type="tx" preserve="1">
+<p:sldLayout xmlns:a="http://schemas.openxmlformats.org/drawingml/2006/main" xmlns:r="http://schemas.openxmlformats.org/officeDocument/2006/relationships" xmlns:p="http://schemas.openxmlformats.org/presentationml/2006/main" type="tx" preserve="1">
   <p:cSld name="Title Slide">
     <p:spTree>
       <p:nvGrpSpPr>
@@ -659,11 +799,12 @@
           </a:prstGeom>
         </p:spPr>
         <p:txBody>
-          <a:bodyPr lIns="0" rIns="0" tIns="0" bIns="0" anchor="ctr">
+          <a:bodyPr lIns="0" tIns="0" rIns="0" bIns="0" anchor="ctr">
             <a:spAutoFit/>
           </a:bodyPr>
-          <a:p>
-            <a:endParaRPr b="0" lang="zh-TW" sz="1800" spc="-1" strike="noStrike">
+          <a:lstStyle/>
+          <a:p>
+            <a:endParaRPr lang="zh-TW" sz="1800" b="0" strike="noStrike" spc="-1">
               <a:solidFill>
                 <a:srgbClr val="000000"/>
               </a:solidFill>
@@ -692,12 +833,13 @@
           </a:prstGeom>
         </p:spPr>
         <p:txBody>
-          <a:bodyPr lIns="0" rIns="0" tIns="0" bIns="0" anchor="ctr">
+          <a:bodyPr lIns="0" tIns="0" rIns="0" bIns="0" anchor="ctr">
             <a:spAutoFit/>
           </a:bodyPr>
+          <a:lstStyle/>
           <a:p>
             <a:pPr algn="ctr"/>
-            <a:endParaRPr b="0" lang="en-US" sz="3200" spc="-1" strike="noStrike">
+            <a:endParaRPr lang="en-US" sz="3200" b="0" strike="noStrike" spc="-1">
               <a:latin typeface="DejaVu Sans"/>
             </a:endParaRPr>
           </a:p>
@@ -705,11 +847,14 @@
       </p:sp>
     </p:spTree>
   </p:cSld>
+  <p:clrMapOvr>
+    <a:masterClrMapping/>
+  </p:clrMapOvr>
 </p:sldLayout>
 </file>
 
 <file path=ppt/slideLayouts/slideLayout15.xml><?xml version="1.0" encoding="utf-8"?>
-<p:sldLayout xmlns:a="http://schemas.openxmlformats.org/drawingml/2006/main" xmlns:p="http://schemas.openxmlformats.org/presentationml/2006/main" xmlns:r="http://schemas.openxmlformats.org/officeDocument/2006/relationships" xmlns:p14="http://schemas.microsoft.com/office/powerpoint/2010/main" xmlns:p15="http://schemas.microsoft.com/office/powerpoint/2012/main" xmlns:mc="http://schemas.openxmlformats.org/markup-compatibility/2006" type="obj" preserve="1">
+<p:sldLayout xmlns:a="http://schemas.openxmlformats.org/drawingml/2006/main" xmlns:r="http://schemas.openxmlformats.org/officeDocument/2006/relationships" xmlns:p="http://schemas.openxmlformats.org/presentationml/2006/main" type="obj" preserve="1">
   <p:cSld name="Title, Content">
     <p:spTree>
       <p:nvGrpSpPr>
@@ -745,11 +890,12 @@
           </a:prstGeom>
         </p:spPr>
         <p:txBody>
-          <a:bodyPr lIns="0" rIns="0" tIns="0" bIns="0" anchor="ctr">
+          <a:bodyPr lIns="0" tIns="0" rIns="0" bIns="0" anchor="ctr">
             <a:spAutoFit/>
           </a:bodyPr>
-          <a:p>
-            <a:endParaRPr b="0" lang="zh-TW" sz="1800" spc="-1" strike="noStrike">
+          <a:lstStyle/>
+          <a:p>
+            <a:endParaRPr lang="zh-TW" sz="1800" b="0" strike="noStrike" spc="-1">
               <a:solidFill>
                 <a:srgbClr val="000000"/>
               </a:solidFill>
@@ -778,11 +924,12 @@
           </a:prstGeom>
         </p:spPr>
         <p:txBody>
-          <a:bodyPr lIns="0" rIns="0" tIns="0" bIns="0">
+          <a:bodyPr lIns="0" tIns="0" rIns="0" bIns="0">
             <a:normAutofit/>
           </a:bodyPr>
-          <a:p>
-            <a:endParaRPr b="0" lang="zh-TW" sz="2800" spc="-1" strike="noStrike">
+          <a:lstStyle/>
+          <a:p>
+            <a:endParaRPr lang="zh-TW" sz="2800" b="0" strike="noStrike" spc="-1">
               <a:solidFill>
                 <a:srgbClr val="000000"/>
               </a:solidFill>
@@ -793,11 +940,14 @@
       </p:sp>
     </p:spTree>
   </p:cSld>
+  <p:clrMapOvr>
+    <a:masterClrMapping/>
+  </p:clrMapOvr>
 </p:sldLayout>
 </file>
 
 <file path=ppt/slideLayouts/slideLayout16.xml><?xml version="1.0" encoding="utf-8"?>
-<p:sldLayout xmlns:a="http://schemas.openxmlformats.org/drawingml/2006/main" xmlns:p="http://schemas.openxmlformats.org/presentationml/2006/main" xmlns:r="http://schemas.openxmlformats.org/officeDocument/2006/relationships" xmlns:p14="http://schemas.microsoft.com/office/powerpoint/2010/main" xmlns:p15="http://schemas.microsoft.com/office/powerpoint/2012/main" xmlns:mc="http://schemas.openxmlformats.org/markup-compatibility/2006" type="twoObj" preserve="1">
+<p:sldLayout xmlns:a="http://schemas.openxmlformats.org/drawingml/2006/main" xmlns:r="http://schemas.openxmlformats.org/officeDocument/2006/relationships" xmlns:p="http://schemas.openxmlformats.org/presentationml/2006/main" type="twoObj" preserve="1">
   <p:cSld name="Title, 2 Content">
     <p:spTree>
       <p:nvGrpSpPr>
@@ -833,11 +983,12 @@
           </a:prstGeom>
         </p:spPr>
         <p:txBody>
-          <a:bodyPr lIns="0" rIns="0" tIns="0" bIns="0" anchor="ctr">
+          <a:bodyPr lIns="0" tIns="0" rIns="0" bIns="0" anchor="ctr">
             <a:spAutoFit/>
           </a:bodyPr>
-          <a:p>
-            <a:endParaRPr b="0" lang="zh-TW" sz="1800" spc="-1" strike="noStrike">
+          <a:lstStyle/>
+          <a:p>
+            <a:endParaRPr lang="zh-TW" sz="1800" b="0" strike="noStrike" spc="-1">
               <a:solidFill>
                 <a:srgbClr val="000000"/>
               </a:solidFill>
@@ -866,11 +1017,12 @@
           </a:prstGeom>
         </p:spPr>
         <p:txBody>
-          <a:bodyPr lIns="0" rIns="0" tIns="0" bIns="0">
+          <a:bodyPr lIns="0" tIns="0" rIns="0" bIns="0">
             <a:normAutofit/>
           </a:bodyPr>
-          <a:p>
-            <a:endParaRPr b="0" lang="zh-TW" sz="2800" spc="-1" strike="noStrike">
+          <a:lstStyle/>
+          <a:p>
+            <a:endParaRPr lang="zh-TW" sz="2800" b="0" strike="noStrike" spc="-1">
               <a:solidFill>
                 <a:srgbClr val="000000"/>
               </a:solidFill>
@@ -899,11 +1051,12 @@
           </a:prstGeom>
         </p:spPr>
         <p:txBody>
-          <a:bodyPr lIns="0" rIns="0" tIns="0" bIns="0">
+          <a:bodyPr lIns="0" tIns="0" rIns="0" bIns="0">
             <a:normAutofit/>
           </a:bodyPr>
-          <a:p>
-            <a:endParaRPr b="0" lang="zh-TW" sz="2800" spc="-1" strike="noStrike">
+          <a:lstStyle/>
+          <a:p>
+            <a:endParaRPr lang="zh-TW" sz="2800" b="0" strike="noStrike" spc="-1">
               <a:solidFill>
                 <a:srgbClr val="000000"/>
               </a:solidFill>
@@ -914,11 +1067,14 @@
       </p:sp>
     </p:spTree>
   </p:cSld>
+  <p:clrMapOvr>
+    <a:masterClrMapping/>
+  </p:clrMapOvr>
 </p:sldLayout>
 </file>
 
 <file path=ppt/slideLayouts/slideLayout17.xml><?xml version="1.0" encoding="utf-8"?>
-<p:sldLayout xmlns:a="http://schemas.openxmlformats.org/drawingml/2006/main" xmlns:p="http://schemas.openxmlformats.org/presentationml/2006/main" xmlns:r="http://schemas.openxmlformats.org/officeDocument/2006/relationships" xmlns:p14="http://schemas.microsoft.com/office/powerpoint/2010/main" xmlns:p15="http://schemas.microsoft.com/office/powerpoint/2012/main" xmlns:mc="http://schemas.openxmlformats.org/markup-compatibility/2006" type="titleOnly" preserve="1">
+<p:sldLayout xmlns:a="http://schemas.openxmlformats.org/drawingml/2006/main" xmlns:r="http://schemas.openxmlformats.org/officeDocument/2006/relationships" xmlns:p="http://schemas.openxmlformats.org/presentationml/2006/main" type="titleOnly" preserve="1">
   <p:cSld name="Title Only">
     <p:spTree>
       <p:nvGrpSpPr>
@@ -954,11 +1110,12 @@
           </a:prstGeom>
         </p:spPr>
         <p:txBody>
-          <a:bodyPr lIns="0" rIns="0" tIns="0" bIns="0" anchor="ctr">
+          <a:bodyPr lIns="0" tIns="0" rIns="0" bIns="0" anchor="ctr">
             <a:spAutoFit/>
           </a:bodyPr>
-          <a:p>
-            <a:endParaRPr b="0" lang="zh-TW" sz="1800" spc="-1" strike="noStrike">
+          <a:lstStyle/>
+          <a:p>
+            <a:endParaRPr lang="zh-TW" sz="1800" b="0" strike="noStrike" spc="-1">
               <a:solidFill>
                 <a:srgbClr val="000000"/>
               </a:solidFill>
@@ -969,11 +1126,14 @@
       </p:sp>
     </p:spTree>
   </p:cSld>
+  <p:clrMapOvr>
+    <a:masterClrMapping/>
+  </p:clrMapOvr>
 </p:sldLayout>
 </file>
 
 <file path=ppt/slideLayouts/slideLayout18.xml><?xml version="1.0" encoding="utf-8"?>
-<p:sldLayout xmlns:a="http://schemas.openxmlformats.org/drawingml/2006/main" xmlns:p="http://schemas.openxmlformats.org/presentationml/2006/main" xmlns:r="http://schemas.openxmlformats.org/officeDocument/2006/relationships" xmlns:p14="http://schemas.microsoft.com/office/powerpoint/2010/main" xmlns:p15="http://schemas.microsoft.com/office/powerpoint/2012/main" xmlns:mc="http://schemas.openxmlformats.org/markup-compatibility/2006" type="objOnly" preserve="1">
+<p:sldLayout xmlns:a="http://schemas.openxmlformats.org/drawingml/2006/main" xmlns:r="http://schemas.openxmlformats.org/officeDocument/2006/relationships" xmlns:p="http://schemas.openxmlformats.org/presentationml/2006/main" type="objOnly" preserve="1">
   <p:cSld name="Centered Text">
     <p:spTree>
       <p:nvGrpSpPr>
@@ -1009,12 +1169,13 @@
           </a:prstGeom>
         </p:spPr>
         <p:txBody>
-          <a:bodyPr lIns="0" rIns="0" tIns="0" bIns="0" anchor="ctr">
+          <a:bodyPr lIns="0" tIns="0" rIns="0" bIns="0" anchor="ctr">
             <a:spAutoFit/>
           </a:bodyPr>
+          <a:lstStyle/>
           <a:p>
             <a:pPr algn="ctr"/>
-            <a:endParaRPr b="0" lang="en-US" sz="3200" spc="-1" strike="noStrike">
+            <a:endParaRPr lang="en-US" sz="3200" b="0" strike="noStrike" spc="-1">
               <a:latin typeface="DejaVu Sans"/>
             </a:endParaRPr>
           </a:p>
@@ -1022,11 +1183,14 @@
       </p:sp>
     </p:spTree>
   </p:cSld>
+  <p:clrMapOvr>
+    <a:masterClrMapping/>
+  </p:clrMapOvr>
 </p:sldLayout>
 </file>
 
 <file path=ppt/slideLayouts/slideLayout19.xml><?xml version="1.0" encoding="utf-8"?>
-<p:sldLayout xmlns:a="http://schemas.openxmlformats.org/drawingml/2006/main" xmlns:p="http://schemas.openxmlformats.org/presentationml/2006/main" xmlns:r="http://schemas.openxmlformats.org/officeDocument/2006/relationships" xmlns:p14="http://schemas.microsoft.com/office/powerpoint/2010/main" xmlns:p15="http://schemas.microsoft.com/office/powerpoint/2012/main" xmlns:mc="http://schemas.openxmlformats.org/markup-compatibility/2006" type="twoObjAndObj" preserve="1">
+<p:sldLayout xmlns:a="http://schemas.openxmlformats.org/drawingml/2006/main" xmlns:r="http://schemas.openxmlformats.org/officeDocument/2006/relationships" xmlns:p="http://schemas.openxmlformats.org/presentationml/2006/main" type="twoObjAndObj" preserve="1">
   <p:cSld name="Title, 2 Content and Content">
     <p:spTree>
       <p:nvGrpSpPr>
@@ -1062,11 +1226,12 @@
           </a:prstGeom>
         </p:spPr>
         <p:txBody>
-          <a:bodyPr lIns="0" rIns="0" tIns="0" bIns="0" anchor="ctr">
+          <a:bodyPr lIns="0" tIns="0" rIns="0" bIns="0" anchor="ctr">
             <a:spAutoFit/>
           </a:bodyPr>
-          <a:p>
-            <a:endParaRPr b="0" lang="zh-TW" sz="1800" spc="-1" strike="noStrike">
+          <a:lstStyle/>
+          <a:p>
+            <a:endParaRPr lang="zh-TW" sz="1800" b="0" strike="noStrike" spc="-1">
               <a:solidFill>
                 <a:srgbClr val="000000"/>
               </a:solidFill>
@@ -1095,11 +1260,12 @@
           </a:prstGeom>
         </p:spPr>
         <p:txBody>
-          <a:bodyPr lIns="0" rIns="0" tIns="0" bIns="0">
+          <a:bodyPr lIns="0" tIns="0" rIns="0" bIns="0">
             <a:normAutofit/>
           </a:bodyPr>
-          <a:p>
-            <a:endParaRPr b="0" lang="zh-TW" sz="2800" spc="-1" strike="noStrike">
+          <a:lstStyle/>
+          <a:p>
+            <a:endParaRPr lang="zh-TW" sz="2800" b="0" strike="noStrike" spc="-1">
               <a:solidFill>
                 <a:srgbClr val="000000"/>
               </a:solidFill>
@@ -1128,11 +1294,12 @@
           </a:prstGeom>
         </p:spPr>
         <p:txBody>
-          <a:bodyPr lIns="0" rIns="0" tIns="0" bIns="0">
+          <a:bodyPr lIns="0" tIns="0" rIns="0" bIns="0">
             <a:normAutofit/>
           </a:bodyPr>
-          <a:p>
-            <a:endParaRPr b="0" lang="zh-TW" sz="2800" spc="-1" strike="noStrike">
+          <a:lstStyle/>
+          <a:p>
+            <a:endParaRPr lang="zh-TW" sz="2800" b="0" strike="noStrike" spc="-1">
               <a:solidFill>
                 <a:srgbClr val="000000"/>
               </a:solidFill>
@@ -1161,11 +1328,12 @@
           </a:prstGeom>
         </p:spPr>
         <p:txBody>
-          <a:bodyPr lIns="0" rIns="0" tIns="0" bIns="0">
+          <a:bodyPr lIns="0" tIns="0" rIns="0" bIns="0">
             <a:normAutofit/>
           </a:bodyPr>
-          <a:p>
-            <a:endParaRPr b="0" lang="zh-TW" sz="2800" spc="-1" strike="noStrike">
+          <a:lstStyle/>
+          <a:p>
+            <a:endParaRPr lang="zh-TW" sz="2800" b="0" strike="noStrike" spc="-1">
               <a:solidFill>
                 <a:srgbClr val="000000"/>
               </a:solidFill>
@@ -1176,11 +1344,14 @@
       </p:sp>
     </p:spTree>
   </p:cSld>
+  <p:clrMapOvr>
+    <a:masterClrMapping/>
+  </p:clrMapOvr>
 </p:sldLayout>
 </file>
 
 <file path=ppt/slideLayouts/slideLayout2.xml><?xml version="1.0" encoding="utf-8"?>
-<p:sldLayout xmlns:a="http://schemas.openxmlformats.org/drawingml/2006/main" xmlns:p="http://schemas.openxmlformats.org/presentationml/2006/main" xmlns:r="http://schemas.openxmlformats.org/officeDocument/2006/relationships" xmlns:p14="http://schemas.microsoft.com/office/powerpoint/2010/main" xmlns:p15="http://schemas.microsoft.com/office/powerpoint/2012/main" xmlns:mc="http://schemas.openxmlformats.org/markup-compatibility/2006" type="tx" preserve="1">
+<p:sldLayout xmlns:a="http://schemas.openxmlformats.org/drawingml/2006/main" xmlns:r="http://schemas.openxmlformats.org/officeDocument/2006/relationships" xmlns:p="http://schemas.openxmlformats.org/presentationml/2006/main" type="tx" preserve="1">
   <p:cSld name="Title Slide">
     <p:spTree>
       <p:nvGrpSpPr>
@@ -1216,11 +1387,12 @@
           </a:prstGeom>
         </p:spPr>
         <p:txBody>
-          <a:bodyPr lIns="0" rIns="0" tIns="0" bIns="0" anchor="ctr">
+          <a:bodyPr lIns="0" tIns="0" rIns="0" bIns="0" anchor="ctr">
             <a:spAutoFit/>
           </a:bodyPr>
-          <a:p>
-            <a:endParaRPr b="0" lang="zh-TW" sz="1800" spc="-1" strike="noStrike">
+          <a:lstStyle/>
+          <a:p>
+            <a:endParaRPr lang="zh-TW" sz="1800" b="0" strike="noStrike" spc="-1">
               <a:solidFill>
                 <a:srgbClr val="000000"/>
               </a:solidFill>
@@ -1249,12 +1421,13 @@
           </a:prstGeom>
         </p:spPr>
         <p:txBody>
-          <a:bodyPr lIns="0" rIns="0" tIns="0" bIns="0" anchor="ctr">
+          <a:bodyPr lIns="0" tIns="0" rIns="0" bIns="0" anchor="ctr">
             <a:spAutoFit/>
           </a:bodyPr>
+          <a:lstStyle/>
           <a:p>
             <a:pPr algn="ctr"/>
-            <a:endParaRPr b="0" lang="en-US" sz="3200" spc="-1" strike="noStrike">
+            <a:endParaRPr lang="en-US" sz="3200" b="0" strike="noStrike" spc="-1">
               <a:latin typeface="DejaVu Sans"/>
             </a:endParaRPr>
           </a:p>
@@ -1262,11 +1435,14 @@
       </p:sp>
     </p:spTree>
   </p:cSld>
+  <p:clrMapOvr>
+    <a:masterClrMapping/>
+  </p:clrMapOvr>
 </p:sldLayout>
 </file>
 
 <file path=ppt/slideLayouts/slideLayout20.xml><?xml version="1.0" encoding="utf-8"?>
-<p:sldLayout xmlns:a="http://schemas.openxmlformats.org/drawingml/2006/main" xmlns:p="http://schemas.openxmlformats.org/presentationml/2006/main" xmlns:r="http://schemas.openxmlformats.org/officeDocument/2006/relationships" xmlns:p14="http://schemas.microsoft.com/office/powerpoint/2010/main" xmlns:p15="http://schemas.microsoft.com/office/powerpoint/2012/main" xmlns:mc="http://schemas.openxmlformats.org/markup-compatibility/2006" type="objAndTwoObj" preserve="1">
+<p:sldLayout xmlns:a="http://schemas.openxmlformats.org/drawingml/2006/main" xmlns:r="http://schemas.openxmlformats.org/officeDocument/2006/relationships" xmlns:p="http://schemas.openxmlformats.org/presentationml/2006/main" type="objAndTwoObj" preserve="1">
   <p:cSld name="Title Content and 2 Content">
     <p:spTree>
       <p:nvGrpSpPr>
@@ -1302,11 +1478,12 @@
           </a:prstGeom>
         </p:spPr>
         <p:txBody>
-          <a:bodyPr lIns="0" rIns="0" tIns="0" bIns="0" anchor="ctr">
+          <a:bodyPr lIns="0" tIns="0" rIns="0" bIns="0" anchor="ctr">
             <a:spAutoFit/>
           </a:bodyPr>
-          <a:p>
-            <a:endParaRPr b="0" lang="zh-TW" sz="1800" spc="-1" strike="noStrike">
+          <a:lstStyle/>
+          <a:p>
+            <a:endParaRPr lang="zh-TW" sz="1800" b="0" strike="noStrike" spc="-1">
               <a:solidFill>
                 <a:srgbClr val="000000"/>
               </a:solidFill>
@@ -1335,11 +1512,12 @@
           </a:prstGeom>
         </p:spPr>
         <p:txBody>
-          <a:bodyPr lIns="0" rIns="0" tIns="0" bIns="0">
+          <a:bodyPr lIns="0" tIns="0" rIns="0" bIns="0">
             <a:normAutofit/>
           </a:bodyPr>
-          <a:p>
-            <a:endParaRPr b="0" lang="zh-TW" sz="2800" spc="-1" strike="noStrike">
+          <a:lstStyle/>
+          <a:p>
+            <a:endParaRPr lang="zh-TW" sz="2800" b="0" strike="noStrike" spc="-1">
               <a:solidFill>
                 <a:srgbClr val="000000"/>
               </a:solidFill>
@@ -1368,11 +1546,12 @@
           </a:prstGeom>
         </p:spPr>
         <p:txBody>
-          <a:bodyPr lIns="0" rIns="0" tIns="0" bIns="0">
+          <a:bodyPr lIns="0" tIns="0" rIns="0" bIns="0">
             <a:normAutofit/>
           </a:bodyPr>
-          <a:p>
-            <a:endParaRPr b="0" lang="zh-TW" sz="2800" spc="-1" strike="noStrike">
+          <a:lstStyle/>
+          <a:p>
+            <a:endParaRPr lang="zh-TW" sz="2800" b="0" strike="noStrike" spc="-1">
               <a:solidFill>
                 <a:srgbClr val="000000"/>
               </a:solidFill>
@@ -1401,11 +1580,12 @@
           </a:prstGeom>
         </p:spPr>
         <p:txBody>
-          <a:bodyPr lIns="0" rIns="0" tIns="0" bIns="0">
+          <a:bodyPr lIns="0" tIns="0" rIns="0" bIns="0">
             <a:normAutofit/>
           </a:bodyPr>
-          <a:p>
-            <a:endParaRPr b="0" lang="zh-TW" sz="2800" spc="-1" strike="noStrike">
+          <a:lstStyle/>
+          <a:p>
+            <a:endParaRPr lang="zh-TW" sz="2800" b="0" strike="noStrike" spc="-1">
               <a:solidFill>
                 <a:srgbClr val="000000"/>
               </a:solidFill>
@@ -1416,11 +1596,14 @@
       </p:sp>
     </p:spTree>
   </p:cSld>
+  <p:clrMapOvr>
+    <a:masterClrMapping/>
+  </p:clrMapOvr>
 </p:sldLayout>
 </file>
 
 <file path=ppt/slideLayouts/slideLayout21.xml><?xml version="1.0" encoding="utf-8"?>
-<p:sldLayout xmlns:a="http://schemas.openxmlformats.org/drawingml/2006/main" xmlns:p="http://schemas.openxmlformats.org/presentationml/2006/main" xmlns:r="http://schemas.openxmlformats.org/officeDocument/2006/relationships" xmlns:p14="http://schemas.microsoft.com/office/powerpoint/2010/main" xmlns:p15="http://schemas.microsoft.com/office/powerpoint/2012/main" xmlns:mc="http://schemas.openxmlformats.org/markup-compatibility/2006" type="twoObjOverTx" preserve="1">
+<p:sldLayout xmlns:a="http://schemas.openxmlformats.org/drawingml/2006/main" xmlns:r="http://schemas.openxmlformats.org/officeDocument/2006/relationships" xmlns:p="http://schemas.openxmlformats.org/presentationml/2006/main" type="twoObjOverTx" preserve="1">
   <p:cSld name="Title, 2 Content over Content">
     <p:spTree>
       <p:nvGrpSpPr>
@@ -1456,11 +1639,12 @@
           </a:prstGeom>
         </p:spPr>
         <p:txBody>
-          <a:bodyPr lIns="0" rIns="0" tIns="0" bIns="0" anchor="ctr">
+          <a:bodyPr lIns="0" tIns="0" rIns="0" bIns="0" anchor="ctr">
             <a:spAutoFit/>
           </a:bodyPr>
-          <a:p>
-            <a:endParaRPr b="0" lang="zh-TW" sz="1800" spc="-1" strike="noStrike">
+          <a:lstStyle/>
+          <a:p>
+            <a:endParaRPr lang="zh-TW" sz="1800" b="0" strike="noStrike" spc="-1">
               <a:solidFill>
                 <a:srgbClr val="000000"/>
               </a:solidFill>
@@ -1489,11 +1673,12 @@
           </a:prstGeom>
         </p:spPr>
         <p:txBody>
-          <a:bodyPr lIns="0" rIns="0" tIns="0" bIns="0">
+          <a:bodyPr lIns="0" tIns="0" rIns="0" bIns="0">
             <a:normAutofit/>
           </a:bodyPr>
-          <a:p>
-            <a:endParaRPr b="0" lang="zh-TW" sz="2800" spc="-1" strike="noStrike">
+          <a:lstStyle/>
+          <a:p>
+            <a:endParaRPr lang="zh-TW" sz="2800" b="0" strike="noStrike" spc="-1">
               <a:solidFill>
                 <a:srgbClr val="000000"/>
               </a:solidFill>
@@ -1522,11 +1707,12 @@
           </a:prstGeom>
         </p:spPr>
         <p:txBody>
-          <a:bodyPr lIns="0" rIns="0" tIns="0" bIns="0">
+          <a:bodyPr lIns="0" tIns="0" rIns="0" bIns="0">
             <a:normAutofit/>
           </a:bodyPr>
-          <a:p>
-            <a:endParaRPr b="0" lang="zh-TW" sz="2800" spc="-1" strike="noStrike">
+          <a:lstStyle/>
+          <a:p>
+            <a:endParaRPr lang="zh-TW" sz="2800" b="0" strike="noStrike" spc="-1">
               <a:solidFill>
                 <a:srgbClr val="000000"/>
               </a:solidFill>
@@ -1555,11 +1741,12 @@
           </a:prstGeom>
         </p:spPr>
         <p:txBody>
-          <a:bodyPr lIns="0" rIns="0" tIns="0" bIns="0">
+          <a:bodyPr lIns="0" tIns="0" rIns="0" bIns="0">
             <a:normAutofit/>
           </a:bodyPr>
-          <a:p>
-            <a:endParaRPr b="0" lang="zh-TW" sz="2800" spc="-1" strike="noStrike">
+          <a:lstStyle/>
+          <a:p>
+            <a:endParaRPr lang="zh-TW" sz="2800" b="0" strike="noStrike" spc="-1">
               <a:solidFill>
                 <a:srgbClr val="000000"/>
               </a:solidFill>
@@ -1570,11 +1757,14 @@
       </p:sp>
     </p:spTree>
   </p:cSld>
+  <p:clrMapOvr>
+    <a:masterClrMapping/>
+  </p:clrMapOvr>
 </p:sldLayout>
 </file>
 
 <file path=ppt/slideLayouts/slideLayout22.xml><?xml version="1.0" encoding="utf-8"?>
-<p:sldLayout xmlns:a="http://schemas.openxmlformats.org/drawingml/2006/main" xmlns:p="http://schemas.openxmlformats.org/presentationml/2006/main" xmlns:r="http://schemas.openxmlformats.org/officeDocument/2006/relationships" xmlns:p14="http://schemas.microsoft.com/office/powerpoint/2010/main" xmlns:p15="http://schemas.microsoft.com/office/powerpoint/2012/main" xmlns:mc="http://schemas.openxmlformats.org/markup-compatibility/2006" type="objOverTx" preserve="1">
+<p:sldLayout xmlns:a="http://schemas.openxmlformats.org/drawingml/2006/main" xmlns:r="http://schemas.openxmlformats.org/officeDocument/2006/relationships" xmlns:p="http://schemas.openxmlformats.org/presentationml/2006/main" type="objOverTx" preserve="1">
   <p:cSld name="Title, Content over Content">
     <p:spTree>
       <p:nvGrpSpPr>
@@ -1610,11 +1800,12 @@
           </a:prstGeom>
         </p:spPr>
         <p:txBody>
-          <a:bodyPr lIns="0" rIns="0" tIns="0" bIns="0" anchor="ctr">
+          <a:bodyPr lIns="0" tIns="0" rIns="0" bIns="0" anchor="ctr">
             <a:spAutoFit/>
           </a:bodyPr>
-          <a:p>
-            <a:endParaRPr b="0" lang="zh-TW" sz="1800" spc="-1" strike="noStrike">
+          <a:lstStyle/>
+          <a:p>
+            <a:endParaRPr lang="zh-TW" sz="1800" b="0" strike="noStrike" spc="-1">
               <a:solidFill>
                 <a:srgbClr val="000000"/>
               </a:solidFill>
@@ -1643,11 +1834,12 @@
           </a:prstGeom>
         </p:spPr>
         <p:txBody>
-          <a:bodyPr lIns="0" rIns="0" tIns="0" bIns="0">
+          <a:bodyPr lIns="0" tIns="0" rIns="0" bIns="0">
             <a:normAutofit/>
           </a:bodyPr>
-          <a:p>
-            <a:endParaRPr b="0" lang="zh-TW" sz="2800" spc="-1" strike="noStrike">
+          <a:lstStyle/>
+          <a:p>
+            <a:endParaRPr lang="zh-TW" sz="2800" b="0" strike="noStrike" spc="-1">
               <a:solidFill>
                 <a:srgbClr val="000000"/>
               </a:solidFill>
@@ -1676,11 +1868,12 @@
           </a:prstGeom>
         </p:spPr>
         <p:txBody>
-          <a:bodyPr lIns="0" rIns="0" tIns="0" bIns="0">
+          <a:bodyPr lIns="0" tIns="0" rIns="0" bIns="0">
             <a:normAutofit/>
           </a:bodyPr>
-          <a:p>
-            <a:endParaRPr b="0" lang="zh-TW" sz="2800" spc="-1" strike="noStrike">
+          <a:lstStyle/>
+          <a:p>
+            <a:endParaRPr lang="zh-TW" sz="2800" b="0" strike="noStrike" spc="-1">
               <a:solidFill>
                 <a:srgbClr val="000000"/>
               </a:solidFill>
@@ -1691,11 +1884,14 @@
       </p:sp>
     </p:spTree>
   </p:cSld>
+  <p:clrMapOvr>
+    <a:masterClrMapping/>
+  </p:clrMapOvr>
 </p:sldLayout>
 </file>
 
 <file path=ppt/slideLayouts/slideLayout23.xml><?xml version="1.0" encoding="utf-8"?>
-<p:sldLayout xmlns:a="http://schemas.openxmlformats.org/drawingml/2006/main" xmlns:p="http://schemas.openxmlformats.org/presentationml/2006/main" xmlns:r="http://schemas.openxmlformats.org/officeDocument/2006/relationships" xmlns:p14="http://schemas.microsoft.com/office/powerpoint/2010/main" xmlns:p15="http://schemas.microsoft.com/office/powerpoint/2012/main" xmlns:mc="http://schemas.openxmlformats.org/markup-compatibility/2006" type="fourObj" preserve="1">
+<p:sldLayout xmlns:a="http://schemas.openxmlformats.org/drawingml/2006/main" xmlns:r="http://schemas.openxmlformats.org/officeDocument/2006/relationships" xmlns:p="http://schemas.openxmlformats.org/presentationml/2006/main" type="fourObj" preserve="1">
   <p:cSld name="Title, 4 Content">
     <p:spTree>
       <p:nvGrpSpPr>
@@ -1731,11 +1927,12 @@
           </a:prstGeom>
         </p:spPr>
         <p:txBody>
-          <a:bodyPr lIns="0" rIns="0" tIns="0" bIns="0" anchor="ctr">
+          <a:bodyPr lIns="0" tIns="0" rIns="0" bIns="0" anchor="ctr">
             <a:spAutoFit/>
           </a:bodyPr>
-          <a:p>
-            <a:endParaRPr b="0" lang="zh-TW" sz="1800" spc="-1" strike="noStrike">
+          <a:lstStyle/>
+          <a:p>
+            <a:endParaRPr lang="zh-TW" sz="1800" b="0" strike="noStrike" spc="-1">
               <a:solidFill>
                 <a:srgbClr val="000000"/>
               </a:solidFill>
@@ -1764,11 +1961,12 @@
           </a:prstGeom>
         </p:spPr>
         <p:txBody>
-          <a:bodyPr lIns="0" rIns="0" tIns="0" bIns="0">
+          <a:bodyPr lIns="0" tIns="0" rIns="0" bIns="0">
             <a:normAutofit/>
           </a:bodyPr>
-          <a:p>
-            <a:endParaRPr b="0" lang="zh-TW" sz="2800" spc="-1" strike="noStrike">
+          <a:lstStyle/>
+          <a:p>
+            <a:endParaRPr lang="zh-TW" sz="2800" b="0" strike="noStrike" spc="-1">
               <a:solidFill>
                 <a:srgbClr val="000000"/>
               </a:solidFill>
@@ -1797,11 +1995,12 @@
           </a:prstGeom>
         </p:spPr>
         <p:txBody>
-          <a:bodyPr lIns="0" rIns="0" tIns="0" bIns="0">
+          <a:bodyPr lIns="0" tIns="0" rIns="0" bIns="0">
             <a:normAutofit/>
           </a:bodyPr>
-          <a:p>
-            <a:endParaRPr b="0" lang="zh-TW" sz="2800" spc="-1" strike="noStrike">
+          <a:lstStyle/>
+          <a:p>
+            <a:endParaRPr lang="zh-TW" sz="2800" b="0" strike="noStrike" spc="-1">
               <a:solidFill>
                 <a:srgbClr val="000000"/>
               </a:solidFill>
@@ -1830,11 +2029,12 @@
           </a:prstGeom>
         </p:spPr>
         <p:txBody>
-          <a:bodyPr lIns="0" rIns="0" tIns="0" bIns="0">
+          <a:bodyPr lIns="0" tIns="0" rIns="0" bIns="0">
             <a:normAutofit/>
           </a:bodyPr>
-          <a:p>
-            <a:endParaRPr b="0" lang="zh-TW" sz="2800" spc="-1" strike="noStrike">
+          <a:lstStyle/>
+          <a:p>
+            <a:endParaRPr lang="zh-TW" sz="2800" b="0" strike="noStrike" spc="-1">
               <a:solidFill>
                 <a:srgbClr val="000000"/>
               </a:solidFill>
@@ -1863,11 +2063,12 @@
           </a:prstGeom>
         </p:spPr>
         <p:txBody>
-          <a:bodyPr lIns="0" rIns="0" tIns="0" bIns="0">
+          <a:bodyPr lIns="0" tIns="0" rIns="0" bIns="0">
             <a:normAutofit/>
           </a:bodyPr>
-          <a:p>
-            <a:endParaRPr b="0" lang="zh-TW" sz="2800" spc="-1" strike="noStrike">
+          <a:lstStyle/>
+          <a:p>
+            <a:endParaRPr lang="zh-TW" sz="2800" b="0" strike="noStrike" spc="-1">
               <a:solidFill>
                 <a:srgbClr val="000000"/>
               </a:solidFill>
@@ -1878,11 +2079,14 @@
       </p:sp>
     </p:spTree>
   </p:cSld>
+  <p:clrMapOvr>
+    <a:masterClrMapping/>
+  </p:clrMapOvr>
 </p:sldLayout>
 </file>
 
 <file path=ppt/slideLayouts/slideLayout24.xml><?xml version="1.0" encoding="utf-8"?>
-<p:sldLayout xmlns:a="http://schemas.openxmlformats.org/drawingml/2006/main" xmlns:p="http://schemas.openxmlformats.org/presentationml/2006/main" xmlns:r="http://schemas.openxmlformats.org/officeDocument/2006/relationships" xmlns:p14="http://schemas.microsoft.com/office/powerpoint/2010/main" xmlns:p15="http://schemas.microsoft.com/office/powerpoint/2012/main" xmlns:mc="http://schemas.openxmlformats.org/markup-compatibility/2006" type="blank" preserve="1">
+<p:sldLayout xmlns:a="http://schemas.openxmlformats.org/drawingml/2006/main" xmlns:r="http://schemas.openxmlformats.org/officeDocument/2006/relationships" xmlns:p="http://schemas.openxmlformats.org/presentationml/2006/main" type="blank" preserve="1">
   <p:cSld name="Title, 6 Content">
     <p:spTree>
       <p:nvGrpSpPr>
@@ -1918,11 +2122,12 @@
           </a:prstGeom>
         </p:spPr>
         <p:txBody>
-          <a:bodyPr lIns="0" rIns="0" tIns="0" bIns="0" anchor="ctr">
+          <a:bodyPr lIns="0" tIns="0" rIns="0" bIns="0" anchor="ctr">
             <a:spAutoFit/>
           </a:bodyPr>
-          <a:p>
-            <a:endParaRPr b="0" lang="zh-TW" sz="1800" spc="-1" strike="noStrike">
+          <a:lstStyle/>
+          <a:p>
+            <a:endParaRPr lang="zh-TW" sz="1800" b="0" strike="noStrike" spc="-1">
               <a:solidFill>
                 <a:srgbClr val="000000"/>
               </a:solidFill>
@@ -1951,11 +2156,12 @@
           </a:prstGeom>
         </p:spPr>
         <p:txBody>
-          <a:bodyPr lIns="0" rIns="0" tIns="0" bIns="0">
+          <a:bodyPr lIns="0" tIns="0" rIns="0" bIns="0">
             <a:normAutofit/>
           </a:bodyPr>
-          <a:p>
-            <a:endParaRPr b="0" lang="zh-TW" sz="2800" spc="-1" strike="noStrike">
+          <a:lstStyle/>
+          <a:p>
+            <a:endParaRPr lang="zh-TW" sz="2800" b="0" strike="noStrike" spc="-1">
               <a:solidFill>
                 <a:srgbClr val="000000"/>
               </a:solidFill>
@@ -1984,11 +2190,12 @@
           </a:prstGeom>
         </p:spPr>
         <p:txBody>
-          <a:bodyPr lIns="0" rIns="0" tIns="0" bIns="0">
+          <a:bodyPr lIns="0" tIns="0" rIns="0" bIns="0">
             <a:normAutofit/>
           </a:bodyPr>
-          <a:p>
-            <a:endParaRPr b="0" lang="zh-TW" sz="2800" spc="-1" strike="noStrike">
+          <a:lstStyle/>
+          <a:p>
+            <a:endParaRPr lang="zh-TW" sz="2800" b="0" strike="noStrike" spc="-1">
               <a:solidFill>
                 <a:srgbClr val="000000"/>
               </a:solidFill>
@@ -2017,11 +2224,12 @@
           </a:prstGeom>
         </p:spPr>
         <p:txBody>
-          <a:bodyPr lIns="0" rIns="0" tIns="0" bIns="0">
+          <a:bodyPr lIns="0" tIns="0" rIns="0" bIns="0">
             <a:normAutofit/>
           </a:bodyPr>
-          <a:p>
-            <a:endParaRPr b="0" lang="zh-TW" sz="2800" spc="-1" strike="noStrike">
+          <a:lstStyle/>
+          <a:p>
+            <a:endParaRPr lang="zh-TW" sz="2800" b="0" strike="noStrike" spc="-1">
               <a:solidFill>
                 <a:srgbClr val="000000"/>
               </a:solidFill>
@@ -2050,11 +2258,12 @@
           </a:prstGeom>
         </p:spPr>
         <p:txBody>
-          <a:bodyPr lIns="0" rIns="0" tIns="0" bIns="0">
+          <a:bodyPr lIns="0" tIns="0" rIns="0" bIns="0">
             <a:normAutofit/>
           </a:bodyPr>
-          <a:p>
-            <a:endParaRPr b="0" lang="zh-TW" sz="2800" spc="-1" strike="noStrike">
+          <a:lstStyle/>
+          <a:p>
+            <a:endParaRPr lang="zh-TW" sz="2800" b="0" strike="noStrike" spc="-1">
               <a:solidFill>
                 <a:srgbClr val="000000"/>
               </a:solidFill>
@@ -2083,11 +2292,12 @@
           </a:prstGeom>
         </p:spPr>
         <p:txBody>
-          <a:bodyPr lIns="0" rIns="0" tIns="0" bIns="0">
+          <a:bodyPr lIns="0" tIns="0" rIns="0" bIns="0">
             <a:normAutofit/>
           </a:bodyPr>
-          <a:p>
-            <a:endParaRPr b="0" lang="zh-TW" sz="2800" spc="-1" strike="noStrike">
+          <a:lstStyle/>
+          <a:p>
+            <a:endParaRPr lang="zh-TW" sz="2800" b="0" strike="noStrike" spc="-1">
               <a:solidFill>
                 <a:srgbClr val="000000"/>
               </a:solidFill>
@@ -2116,11 +2326,12 @@
           </a:prstGeom>
         </p:spPr>
         <p:txBody>
-          <a:bodyPr lIns="0" rIns="0" tIns="0" bIns="0">
+          <a:bodyPr lIns="0" tIns="0" rIns="0" bIns="0">
             <a:normAutofit/>
           </a:bodyPr>
-          <a:p>
-            <a:endParaRPr b="0" lang="zh-TW" sz="2800" spc="-1" strike="noStrike">
+          <a:lstStyle/>
+          <a:p>
+            <a:endParaRPr lang="zh-TW" sz="2800" b="0" strike="noStrike" spc="-1">
               <a:solidFill>
                 <a:srgbClr val="000000"/>
               </a:solidFill>
@@ -2131,11 +2342,14 @@
       </p:sp>
     </p:spTree>
   </p:cSld>
+  <p:clrMapOvr>
+    <a:masterClrMapping/>
+  </p:clrMapOvr>
 </p:sldLayout>
 </file>
 
 <file path=ppt/slideLayouts/slideLayout3.xml><?xml version="1.0" encoding="utf-8"?>
-<p:sldLayout xmlns:a="http://schemas.openxmlformats.org/drawingml/2006/main" xmlns:p="http://schemas.openxmlformats.org/presentationml/2006/main" xmlns:r="http://schemas.openxmlformats.org/officeDocument/2006/relationships" xmlns:p14="http://schemas.microsoft.com/office/powerpoint/2010/main" xmlns:p15="http://schemas.microsoft.com/office/powerpoint/2012/main" xmlns:mc="http://schemas.openxmlformats.org/markup-compatibility/2006" type="obj" preserve="1">
+<p:sldLayout xmlns:a="http://schemas.openxmlformats.org/drawingml/2006/main" xmlns:r="http://schemas.openxmlformats.org/officeDocument/2006/relationships" xmlns:p="http://schemas.openxmlformats.org/presentationml/2006/main" type="obj" preserve="1">
   <p:cSld name="Title, Content">
     <p:spTree>
       <p:nvGrpSpPr>
@@ -2171,11 +2385,12 @@
           </a:prstGeom>
         </p:spPr>
         <p:txBody>
-          <a:bodyPr lIns="0" rIns="0" tIns="0" bIns="0" anchor="ctr">
+          <a:bodyPr lIns="0" tIns="0" rIns="0" bIns="0" anchor="ctr">
             <a:spAutoFit/>
           </a:bodyPr>
-          <a:p>
-            <a:endParaRPr b="0" lang="zh-TW" sz="1800" spc="-1" strike="noStrike">
+          <a:lstStyle/>
+          <a:p>
+            <a:endParaRPr lang="zh-TW" sz="1800" b="0" strike="noStrike" spc="-1">
               <a:solidFill>
                 <a:srgbClr val="000000"/>
               </a:solidFill>
@@ -2204,11 +2419,12 @@
           </a:prstGeom>
         </p:spPr>
         <p:txBody>
-          <a:bodyPr lIns="0" rIns="0" tIns="0" bIns="0">
+          <a:bodyPr lIns="0" tIns="0" rIns="0" bIns="0">
             <a:normAutofit/>
           </a:bodyPr>
-          <a:p>
-            <a:endParaRPr b="0" lang="zh-TW" sz="2800" spc="-1" strike="noStrike">
+          <a:lstStyle/>
+          <a:p>
+            <a:endParaRPr lang="zh-TW" sz="2800" b="0" strike="noStrike" spc="-1">
               <a:solidFill>
                 <a:srgbClr val="000000"/>
               </a:solidFill>
@@ -2219,11 +2435,14 @@
       </p:sp>
     </p:spTree>
   </p:cSld>
+  <p:clrMapOvr>
+    <a:masterClrMapping/>
+  </p:clrMapOvr>
 </p:sldLayout>
 </file>
 
 <file path=ppt/slideLayouts/slideLayout4.xml><?xml version="1.0" encoding="utf-8"?>
-<p:sldLayout xmlns:a="http://schemas.openxmlformats.org/drawingml/2006/main" xmlns:p="http://schemas.openxmlformats.org/presentationml/2006/main" xmlns:r="http://schemas.openxmlformats.org/officeDocument/2006/relationships" xmlns:p14="http://schemas.microsoft.com/office/powerpoint/2010/main" xmlns:p15="http://schemas.microsoft.com/office/powerpoint/2012/main" xmlns:mc="http://schemas.openxmlformats.org/markup-compatibility/2006" type="twoObj" preserve="1">
+<p:sldLayout xmlns:a="http://schemas.openxmlformats.org/drawingml/2006/main" xmlns:r="http://schemas.openxmlformats.org/officeDocument/2006/relationships" xmlns:p="http://schemas.openxmlformats.org/presentationml/2006/main" type="twoObj" preserve="1">
   <p:cSld name="Title, 2 Content">
     <p:spTree>
       <p:nvGrpSpPr>
@@ -2259,11 +2478,12 @@
           </a:prstGeom>
         </p:spPr>
         <p:txBody>
-          <a:bodyPr lIns="0" rIns="0" tIns="0" bIns="0" anchor="ctr">
+          <a:bodyPr lIns="0" tIns="0" rIns="0" bIns="0" anchor="ctr">
             <a:spAutoFit/>
           </a:bodyPr>
-          <a:p>
-            <a:endParaRPr b="0" lang="zh-TW" sz="1800" spc="-1" strike="noStrike">
+          <a:lstStyle/>
+          <a:p>
+            <a:endParaRPr lang="zh-TW" sz="1800" b="0" strike="noStrike" spc="-1">
               <a:solidFill>
                 <a:srgbClr val="000000"/>
               </a:solidFill>
@@ -2292,11 +2512,12 @@
           </a:prstGeom>
         </p:spPr>
         <p:txBody>
-          <a:bodyPr lIns="0" rIns="0" tIns="0" bIns="0">
+          <a:bodyPr lIns="0" tIns="0" rIns="0" bIns="0">
             <a:normAutofit/>
           </a:bodyPr>
-          <a:p>
-            <a:endParaRPr b="0" lang="zh-TW" sz="2800" spc="-1" strike="noStrike">
+          <a:lstStyle/>
+          <a:p>
+            <a:endParaRPr lang="zh-TW" sz="2800" b="0" strike="noStrike" spc="-1">
               <a:solidFill>
                 <a:srgbClr val="000000"/>
               </a:solidFill>
@@ -2325,11 +2546,12 @@
           </a:prstGeom>
         </p:spPr>
         <p:txBody>
-          <a:bodyPr lIns="0" rIns="0" tIns="0" bIns="0">
+          <a:bodyPr lIns="0" tIns="0" rIns="0" bIns="0">
             <a:normAutofit/>
           </a:bodyPr>
-          <a:p>
-            <a:endParaRPr b="0" lang="zh-TW" sz="2800" spc="-1" strike="noStrike">
+          <a:lstStyle/>
+          <a:p>
+            <a:endParaRPr lang="zh-TW" sz="2800" b="0" strike="noStrike" spc="-1">
               <a:solidFill>
                 <a:srgbClr val="000000"/>
               </a:solidFill>
@@ -2340,11 +2562,14 @@
       </p:sp>
     </p:spTree>
   </p:cSld>
+  <p:clrMapOvr>
+    <a:masterClrMapping/>
+  </p:clrMapOvr>
 </p:sldLayout>
 </file>
 
 <file path=ppt/slideLayouts/slideLayout5.xml><?xml version="1.0" encoding="utf-8"?>
-<p:sldLayout xmlns:a="http://schemas.openxmlformats.org/drawingml/2006/main" xmlns:p="http://schemas.openxmlformats.org/presentationml/2006/main" xmlns:r="http://schemas.openxmlformats.org/officeDocument/2006/relationships" xmlns:p14="http://schemas.microsoft.com/office/powerpoint/2010/main" xmlns:p15="http://schemas.microsoft.com/office/powerpoint/2012/main" xmlns:mc="http://schemas.openxmlformats.org/markup-compatibility/2006" type="titleOnly" preserve="1">
+<p:sldLayout xmlns:a="http://schemas.openxmlformats.org/drawingml/2006/main" xmlns:r="http://schemas.openxmlformats.org/officeDocument/2006/relationships" xmlns:p="http://schemas.openxmlformats.org/presentationml/2006/main" type="titleOnly" preserve="1">
   <p:cSld name="Title Only">
     <p:spTree>
       <p:nvGrpSpPr>
@@ -2380,11 +2605,12 @@
           </a:prstGeom>
         </p:spPr>
         <p:txBody>
-          <a:bodyPr lIns="0" rIns="0" tIns="0" bIns="0" anchor="ctr">
+          <a:bodyPr lIns="0" tIns="0" rIns="0" bIns="0" anchor="ctr">
             <a:spAutoFit/>
           </a:bodyPr>
-          <a:p>
-            <a:endParaRPr b="0" lang="zh-TW" sz="1800" spc="-1" strike="noStrike">
+          <a:lstStyle/>
+          <a:p>
+            <a:endParaRPr lang="zh-TW" sz="1800" b="0" strike="noStrike" spc="-1">
               <a:solidFill>
                 <a:srgbClr val="000000"/>
               </a:solidFill>
@@ -2395,11 +2621,14 @@
       </p:sp>
     </p:spTree>
   </p:cSld>
+  <p:clrMapOvr>
+    <a:masterClrMapping/>
+  </p:clrMapOvr>
 </p:sldLayout>
 </file>
 
 <file path=ppt/slideLayouts/slideLayout6.xml><?xml version="1.0" encoding="utf-8"?>
-<p:sldLayout xmlns:a="http://schemas.openxmlformats.org/drawingml/2006/main" xmlns:p="http://schemas.openxmlformats.org/presentationml/2006/main" xmlns:r="http://schemas.openxmlformats.org/officeDocument/2006/relationships" xmlns:p14="http://schemas.microsoft.com/office/powerpoint/2010/main" xmlns:p15="http://schemas.microsoft.com/office/powerpoint/2012/main" xmlns:mc="http://schemas.openxmlformats.org/markup-compatibility/2006" type="objOnly" preserve="1">
+<p:sldLayout xmlns:a="http://schemas.openxmlformats.org/drawingml/2006/main" xmlns:r="http://schemas.openxmlformats.org/officeDocument/2006/relationships" xmlns:p="http://schemas.openxmlformats.org/presentationml/2006/main" type="objOnly" preserve="1">
   <p:cSld name="Centered Text">
     <p:spTree>
       <p:nvGrpSpPr>
@@ -2435,12 +2664,13 @@
           </a:prstGeom>
         </p:spPr>
         <p:txBody>
-          <a:bodyPr lIns="0" rIns="0" tIns="0" bIns="0" anchor="ctr">
+          <a:bodyPr lIns="0" tIns="0" rIns="0" bIns="0" anchor="ctr">
             <a:spAutoFit/>
           </a:bodyPr>
+          <a:lstStyle/>
           <a:p>
             <a:pPr algn="ctr"/>
-            <a:endParaRPr b="0" lang="en-US" sz="3200" spc="-1" strike="noStrike">
+            <a:endParaRPr lang="en-US" sz="3200" b="0" strike="noStrike" spc="-1">
               <a:latin typeface="DejaVu Sans"/>
             </a:endParaRPr>
           </a:p>
@@ -2448,11 +2678,14 @@
       </p:sp>
     </p:spTree>
   </p:cSld>
+  <p:clrMapOvr>
+    <a:masterClrMapping/>
+  </p:clrMapOvr>
 </p:sldLayout>
 </file>
 
 <file path=ppt/slideLayouts/slideLayout7.xml><?xml version="1.0" encoding="utf-8"?>
-<p:sldLayout xmlns:a="http://schemas.openxmlformats.org/drawingml/2006/main" xmlns:p="http://schemas.openxmlformats.org/presentationml/2006/main" xmlns:r="http://schemas.openxmlformats.org/officeDocument/2006/relationships" xmlns:p14="http://schemas.microsoft.com/office/powerpoint/2010/main" xmlns:p15="http://schemas.microsoft.com/office/powerpoint/2012/main" xmlns:mc="http://schemas.openxmlformats.org/markup-compatibility/2006" type="twoObjAndObj" preserve="1">
+<p:sldLayout xmlns:a="http://schemas.openxmlformats.org/drawingml/2006/main" xmlns:r="http://schemas.openxmlformats.org/officeDocument/2006/relationships" xmlns:p="http://schemas.openxmlformats.org/presentationml/2006/main" type="twoObjAndObj" preserve="1">
   <p:cSld name="Title, 2 Content and Content">
     <p:spTree>
       <p:nvGrpSpPr>
@@ -2488,11 +2721,12 @@
           </a:prstGeom>
         </p:spPr>
         <p:txBody>
-          <a:bodyPr lIns="0" rIns="0" tIns="0" bIns="0" anchor="ctr">
+          <a:bodyPr lIns="0" tIns="0" rIns="0" bIns="0" anchor="ctr">
             <a:spAutoFit/>
           </a:bodyPr>
-          <a:p>
-            <a:endParaRPr b="0" lang="zh-TW" sz="1800" spc="-1" strike="noStrike">
+          <a:lstStyle/>
+          <a:p>
+            <a:endParaRPr lang="zh-TW" sz="1800" b="0" strike="noStrike" spc="-1">
               <a:solidFill>
                 <a:srgbClr val="000000"/>
               </a:solidFill>
@@ -2521,11 +2755,12 @@
           </a:prstGeom>
         </p:spPr>
         <p:txBody>
-          <a:bodyPr lIns="0" rIns="0" tIns="0" bIns="0">
+          <a:bodyPr lIns="0" tIns="0" rIns="0" bIns="0">
             <a:normAutofit/>
           </a:bodyPr>
-          <a:p>
-            <a:endParaRPr b="0" lang="zh-TW" sz="2800" spc="-1" strike="noStrike">
+          <a:lstStyle/>
+          <a:p>
+            <a:endParaRPr lang="zh-TW" sz="2800" b="0" strike="noStrike" spc="-1">
               <a:solidFill>
                 <a:srgbClr val="000000"/>
               </a:solidFill>
@@ -2554,11 +2789,12 @@
           </a:prstGeom>
         </p:spPr>
         <p:txBody>
-          <a:bodyPr lIns="0" rIns="0" tIns="0" bIns="0">
+          <a:bodyPr lIns="0" tIns="0" rIns="0" bIns="0">
             <a:normAutofit/>
           </a:bodyPr>
-          <a:p>
-            <a:endParaRPr b="0" lang="zh-TW" sz="2800" spc="-1" strike="noStrike">
+          <a:lstStyle/>
+          <a:p>
+            <a:endParaRPr lang="zh-TW" sz="2800" b="0" strike="noStrike" spc="-1">
               <a:solidFill>
                 <a:srgbClr val="000000"/>
               </a:solidFill>
@@ -2587,11 +2823,12 @@
           </a:prstGeom>
         </p:spPr>
         <p:txBody>
-          <a:bodyPr lIns="0" rIns="0" tIns="0" bIns="0">
+          <a:bodyPr lIns="0" tIns="0" rIns="0" bIns="0">
             <a:normAutofit/>
           </a:bodyPr>
-          <a:p>
-            <a:endParaRPr b="0" lang="zh-TW" sz="2800" spc="-1" strike="noStrike">
+          <a:lstStyle/>
+          <a:p>
+            <a:endParaRPr lang="zh-TW" sz="2800" b="0" strike="noStrike" spc="-1">
               <a:solidFill>
                 <a:srgbClr val="000000"/>
               </a:solidFill>
@@ -2602,11 +2839,14 @@
       </p:sp>
     </p:spTree>
   </p:cSld>
+  <p:clrMapOvr>
+    <a:masterClrMapping/>
+  </p:clrMapOvr>
 </p:sldLayout>
 </file>
 
 <file path=ppt/slideLayouts/slideLayout8.xml><?xml version="1.0" encoding="utf-8"?>
-<p:sldLayout xmlns:a="http://schemas.openxmlformats.org/drawingml/2006/main" xmlns:p="http://schemas.openxmlformats.org/presentationml/2006/main" xmlns:r="http://schemas.openxmlformats.org/officeDocument/2006/relationships" xmlns:p14="http://schemas.microsoft.com/office/powerpoint/2010/main" xmlns:p15="http://schemas.microsoft.com/office/powerpoint/2012/main" xmlns:mc="http://schemas.openxmlformats.org/markup-compatibility/2006" type="objAndTwoObj" preserve="1">
+<p:sldLayout xmlns:a="http://schemas.openxmlformats.org/drawingml/2006/main" xmlns:r="http://schemas.openxmlformats.org/officeDocument/2006/relationships" xmlns:p="http://schemas.openxmlformats.org/presentationml/2006/main" type="objAndTwoObj" preserve="1">
   <p:cSld name="Title Content and 2 Content">
     <p:spTree>
       <p:nvGrpSpPr>
@@ -2642,11 +2882,12 @@
           </a:prstGeom>
         </p:spPr>
         <p:txBody>
-          <a:bodyPr lIns="0" rIns="0" tIns="0" bIns="0" anchor="ctr">
+          <a:bodyPr lIns="0" tIns="0" rIns="0" bIns="0" anchor="ctr">
             <a:spAutoFit/>
           </a:bodyPr>
-          <a:p>
-            <a:endParaRPr b="0" lang="zh-TW" sz="1800" spc="-1" strike="noStrike">
+          <a:lstStyle/>
+          <a:p>
+            <a:endParaRPr lang="zh-TW" sz="1800" b="0" strike="noStrike" spc="-1">
               <a:solidFill>
                 <a:srgbClr val="000000"/>
               </a:solidFill>
@@ -2675,11 +2916,12 @@
           </a:prstGeom>
         </p:spPr>
         <p:txBody>
-          <a:bodyPr lIns="0" rIns="0" tIns="0" bIns="0">
+          <a:bodyPr lIns="0" tIns="0" rIns="0" bIns="0">
             <a:normAutofit/>
           </a:bodyPr>
-          <a:p>
-            <a:endParaRPr b="0" lang="zh-TW" sz="2800" spc="-1" strike="noStrike">
+          <a:lstStyle/>
+          <a:p>
+            <a:endParaRPr lang="zh-TW" sz="2800" b="0" strike="noStrike" spc="-1">
               <a:solidFill>
                 <a:srgbClr val="000000"/>
               </a:solidFill>
@@ -2708,11 +2950,12 @@
           </a:prstGeom>
         </p:spPr>
         <p:txBody>
-          <a:bodyPr lIns="0" rIns="0" tIns="0" bIns="0">
+          <a:bodyPr lIns="0" tIns="0" rIns="0" bIns="0">
             <a:normAutofit/>
           </a:bodyPr>
-          <a:p>
-            <a:endParaRPr b="0" lang="zh-TW" sz="2800" spc="-1" strike="noStrike">
+          <a:lstStyle/>
+          <a:p>
+            <a:endParaRPr lang="zh-TW" sz="2800" b="0" strike="noStrike" spc="-1">
               <a:solidFill>
                 <a:srgbClr val="000000"/>
               </a:solidFill>
@@ -2741,11 +2984,12 @@
           </a:prstGeom>
         </p:spPr>
         <p:txBody>
-          <a:bodyPr lIns="0" rIns="0" tIns="0" bIns="0">
+          <a:bodyPr lIns="0" tIns="0" rIns="0" bIns="0">
             <a:normAutofit/>
           </a:bodyPr>
-          <a:p>
-            <a:endParaRPr b="0" lang="zh-TW" sz="2800" spc="-1" strike="noStrike">
+          <a:lstStyle/>
+          <a:p>
+            <a:endParaRPr lang="zh-TW" sz="2800" b="0" strike="noStrike" spc="-1">
               <a:solidFill>
                 <a:srgbClr val="000000"/>
               </a:solidFill>
@@ -2756,11 +3000,14 @@
       </p:sp>
     </p:spTree>
   </p:cSld>
+  <p:clrMapOvr>
+    <a:masterClrMapping/>
+  </p:clrMapOvr>
 </p:sldLayout>
 </file>
 
 <file path=ppt/slideLayouts/slideLayout9.xml><?xml version="1.0" encoding="utf-8"?>
-<p:sldLayout xmlns:a="http://schemas.openxmlformats.org/drawingml/2006/main" xmlns:p="http://schemas.openxmlformats.org/presentationml/2006/main" xmlns:r="http://schemas.openxmlformats.org/officeDocument/2006/relationships" xmlns:p14="http://schemas.microsoft.com/office/powerpoint/2010/main" xmlns:p15="http://schemas.microsoft.com/office/powerpoint/2012/main" xmlns:mc="http://schemas.openxmlformats.org/markup-compatibility/2006" type="twoObjOverTx" preserve="1">
+<p:sldLayout xmlns:a="http://schemas.openxmlformats.org/drawingml/2006/main" xmlns:r="http://schemas.openxmlformats.org/officeDocument/2006/relationships" xmlns:p="http://schemas.openxmlformats.org/presentationml/2006/main" type="twoObjOverTx" preserve="1">
   <p:cSld name="Title, 2 Content over Content">
     <p:spTree>
       <p:nvGrpSpPr>
@@ -2796,11 +3043,12 @@
           </a:prstGeom>
         </p:spPr>
         <p:txBody>
-          <a:bodyPr lIns="0" rIns="0" tIns="0" bIns="0" anchor="ctr">
+          <a:bodyPr lIns="0" tIns="0" rIns="0" bIns="0" anchor="ctr">
             <a:spAutoFit/>
           </a:bodyPr>
-          <a:p>
-            <a:endParaRPr b="0" lang="zh-TW" sz="1800" spc="-1" strike="noStrike">
+          <a:lstStyle/>
+          <a:p>
+            <a:endParaRPr lang="zh-TW" sz="1800" b="0" strike="noStrike" spc="-1">
               <a:solidFill>
                 <a:srgbClr val="000000"/>
               </a:solidFill>
@@ -2829,11 +3077,12 @@
           </a:prstGeom>
         </p:spPr>
         <p:txBody>
-          <a:bodyPr lIns="0" rIns="0" tIns="0" bIns="0">
+          <a:bodyPr lIns="0" tIns="0" rIns="0" bIns="0">
             <a:normAutofit/>
           </a:bodyPr>
-          <a:p>
-            <a:endParaRPr b="0" lang="zh-TW" sz="2800" spc="-1" strike="noStrike">
+          <a:lstStyle/>
+          <a:p>
+            <a:endParaRPr lang="zh-TW" sz="2800" b="0" strike="noStrike" spc="-1">
               <a:solidFill>
                 <a:srgbClr val="000000"/>
               </a:solidFill>
@@ -2862,11 +3111,12 @@
           </a:prstGeom>
         </p:spPr>
         <p:txBody>
-          <a:bodyPr lIns="0" rIns="0" tIns="0" bIns="0">
+          <a:bodyPr lIns="0" tIns="0" rIns="0" bIns="0">
             <a:normAutofit/>
           </a:bodyPr>
-          <a:p>
-            <a:endParaRPr b="0" lang="zh-TW" sz="2800" spc="-1" strike="noStrike">
+          <a:lstStyle/>
+          <a:p>
+            <a:endParaRPr lang="zh-TW" sz="2800" b="0" strike="noStrike" spc="-1">
               <a:solidFill>
                 <a:srgbClr val="000000"/>
               </a:solidFill>
@@ -2895,11 +3145,12 @@
           </a:prstGeom>
         </p:spPr>
         <p:txBody>
-          <a:bodyPr lIns="0" rIns="0" tIns="0" bIns="0">
+          <a:bodyPr lIns="0" tIns="0" rIns="0" bIns="0">
             <a:normAutofit/>
           </a:bodyPr>
-          <a:p>
-            <a:endParaRPr b="0" lang="zh-TW" sz="2800" spc="-1" strike="noStrike">
+          <a:lstStyle/>
+          <a:p>
+            <a:endParaRPr lang="zh-TW" sz="2800" b="0" strike="noStrike" spc="-1">
               <a:solidFill>
                 <a:srgbClr val="000000"/>
               </a:solidFill>
@@ -2910,17 +3161,21 @@
       </p:sp>
     </p:spTree>
   </p:cSld>
+  <p:clrMapOvr>
+    <a:masterClrMapping/>
+  </p:clrMapOvr>
 </p:sldLayout>
 </file>
 
 <file path=ppt/slideMasters/slideMaster1.xml><?xml version="1.0" encoding="utf-8"?>
-<p:sldMaster xmlns:a="http://schemas.openxmlformats.org/drawingml/2006/main" xmlns:p="http://schemas.openxmlformats.org/presentationml/2006/main" xmlns:r="http://schemas.openxmlformats.org/officeDocument/2006/relationships" xmlns:p14="http://schemas.microsoft.com/office/powerpoint/2010/main" xmlns:p15="http://schemas.microsoft.com/office/powerpoint/2012/main" xmlns:mc="http://schemas.openxmlformats.org/markup-compatibility/2006">
+<p:sldMaster xmlns:a="http://schemas.openxmlformats.org/drawingml/2006/main" xmlns:r="http://schemas.openxmlformats.org/officeDocument/2006/relationships" xmlns:p="http://schemas.openxmlformats.org/presentationml/2006/main">
   <p:cSld>
     <p:bg>
       <p:bgPr>
         <a:solidFill>
-          <a:srgbClr val="ffffff"/>
+          <a:srgbClr val="FFFFFF"/>
         </a:solidFill>
+        <a:effectLst/>
       </p:bgPr>
     </p:bg>
     <p:spTree>
@@ -2939,7 +3194,7 @@
       </p:grpSpPr>
       <p:sp>
         <p:nvSpPr>
-          <p:cNvPr id="0" name="PlaceHolder 1"/>
+          <p:cNvPr id="2" name="PlaceHolder 1"/>
           <p:cNvSpPr>
             <a:spLocks noGrp="1"/>
           </p:cNvSpPr>
@@ -2957,12 +3212,13 @@
           </a:prstGeom>
         </p:spPr>
         <p:txBody>
-          <a:bodyPr lIns="0" rIns="0" tIns="0" bIns="0" anchor="ctr">
+          <a:bodyPr lIns="0" tIns="0" rIns="0" bIns="0" anchor="ctr">
             <a:spAutoFit/>
           </a:bodyPr>
+          <a:lstStyle/>
           <a:p>
             <a:r>
-              <a:rPr b="0" lang="zh-TW" sz="4400" spc="-1" strike="noStrike">
+              <a:rPr lang="zh-TW" sz="4400" b="0" strike="noStrike" spc="-1">
                 <a:solidFill>
                   <a:srgbClr val="000000"/>
                 </a:solidFill>
@@ -2970,18 +3226,12 @@
               </a:rPr>
               <a:t>单击鼠标编辑标题文字格式</a:t>
             </a:r>
-            <a:endParaRPr b="0" lang="zh-TW" sz="4400" spc="-1" strike="noStrike">
-              <a:solidFill>
-                <a:srgbClr val="000000"/>
-              </a:solidFill>
-              <a:latin typeface="Arial"/>
-            </a:endParaRPr>
-          </a:p>
-        </p:txBody>
-      </p:sp>
-      <p:sp>
-        <p:nvSpPr>
-          <p:cNvPr id="1" name="PlaceHolder 2"/>
+          </a:p>
+        </p:txBody>
+      </p:sp>
+      <p:sp>
+        <p:nvSpPr>
+          <p:cNvPr id="3" name="PlaceHolder 2"/>
           <p:cNvSpPr>
             <a:spLocks noGrp="1"/>
           </p:cNvSpPr>
@@ -2999,9 +3249,10 @@
           </a:prstGeom>
         </p:spPr>
         <p:txBody>
-          <a:bodyPr lIns="0" rIns="0" tIns="0" bIns="0">
+          <a:bodyPr lIns="0" tIns="0" rIns="0" bIns="0">
             <a:normAutofit/>
           </a:bodyPr>
+          <a:lstStyle/>
           <a:p>
             <a:pPr marL="432000" indent="-324000">
               <a:spcBef>
@@ -3015,7 +3266,7 @@
               <a:buChar char=""/>
             </a:pPr>
             <a:r>
-              <a:rPr b="0" lang="zh-TW" sz="2800" spc="-1" strike="noStrike">
+              <a:rPr lang="zh-TW" sz="2800" b="0" strike="noStrike" spc="-1">
                 <a:solidFill>
                   <a:srgbClr val="000000"/>
                 </a:solidFill>
@@ -3023,15 +3274,9 @@
               </a:rPr>
               <a:t>单击鼠标编辑大纲文字格式</a:t>
             </a:r>
-            <a:endParaRPr b="0" lang="zh-TW" sz="2800" spc="-1" strike="noStrike">
-              <a:solidFill>
-                <a:srgbClr val="000000"/>
-              </a:solidFill>
-              <a:latin typeface="Arial"/>
-            </a:endParaRPr>
-          </a:p>
-          <a:p>
-            <a:pPr lvl="1" marL="864000" indent="-324000">
+          </a:p>
+          <a:p>
+            <a:pPr marL="864000" lvl="1" indent="-324000">
               <a:spcBef>
                 <a:spcPts val="1134"/>
               </a:spcBef>
@@ -3043,7 +3288,7 @@
               <a:buChar char=""/>
             </a:pPr>
             <a:r>
-              <a:rPr b="0" lang="zh-TW" sz="2000" spc="-1" strike="noStrike">
+              <a:rPr lang="zh-TW" sz="2000" b="0" strike="noStrike" spc="-1">
                 <a:solidFill>
                   <a:srgbClr val="000000"/>
                 </a:solidFill>
@@ -3051,15 +3296,9 @@
               </a:rPr>
               <a:t>第二个大纲级</a:t>
             </a:r>
-            <a:endParaRPr b="0" lang="zh-TW" sz="2000" spc="-1" strike="noStrike">
-              <a:solidFill>
-                <a:srgbClr val="000000"/>
-              </a:solidFill>
-              <a:latin typeface="Arial"/>
-            </a:endParaRPr>
-          </a:p>
-          <a:p>
-            <a:pPr lvl="2" marL="1296000" indent="-288000">
+          </a:p>
+          <a:p>
+            <a:pPr marL="1296000" lvl="2" indent="-288000">
               <a:spcBef>
                 <a:spcPts val="850"/>
               </a:spcBef>
@@ -3071,7 +3310,7 @@
               <a:buChar char=""/>
             </a:pPr>
             <a:r>
-              <a:rPr b="0" lang="zh-TW" sz="1800" spc="-1" strike="noStrike">
+              <a:rPr lang="zh-TW" sz="1800" b="0" strike="noStrike" spc="-1">
                 <a:solidFill>
                   <a:srgbClr val="000000"/>
                 </a:solidFill>
@@ -3079,15 +3318,9 @@
               </a:rPr>
               <a:t>第三大纲级别</a:t>
             </a:r>
-            <a:endParaRPr b="0" lang="zh-TW" sz="1800" spc="-1" strike="noStrike">
-              <a:solidFill>
-                <a:srgbClr val="000000"/>
-              </a:solidFill>
-              <a:latin typeface="Arial"/>
-            </a:endParaRPr>
-          </a:p>
-          <a:p>
-            <a:pPr lvl="3" marL="1728000" indent="-216000">
+          </a:p>
+          <a:p>
+            <a:pPr marL="1728000" lvl="3" indent="-216000">
               <a:spcBef>
                 <a:spcPts val="567"/>
               </a:spcBef>
@@ -3099,7 +3332,7 @@
               <a:buChar char=""/>
             </a:pPr>
             <a:r>
-              <a:rPr b="0" lang="zh-TW" sz="1800" spc="-1" strike="noStrike">
+              <a:rPr lang="zh-TW" sz="1800" b="0" strike="noStrike" spc="-1">
                 <a:solidFill>
                   <a:srgbClr val="000000"/>
                 </a:solidFill>
@@ -3107,15 +3340,9 @@
               </a:rPr>
               <a:t>第四大纲级别</a:t>
             </a:r>
-            <a:endParaRPr b="0" lang="zh-TW" sz="1800" spc="-1" strike="noStrike">
-              <a:solidFill>
-                <a:srgbClr val="000000"/>
-              </a:solidFill>
-              <a:latin typeface="Arial"/>
-            </a:endParaRPr>
-          </a:p>
-          <a:p>
-            <a:pPr lvl="4" marL="2160000" indent="-216000">
+          </a:p>
+          <a:p>
+            <a:pPr marL="2160000" lvl="4" indent="-216000">
               <a:spcBef>
                 <a:spcPts val="283"/>
               </a:spcBef>
@@ -3127,7 +3354,7 @@
               <a:buChar char=""/>
             </a:pPr>
             <a:r>
-              <a:rPr b="0" lang="zh-TW" sz="2000" spc="-1" strike="noStrike">
+              <a:rPr lang="zh-TW" sz="2000" b="0" strike="noStrike" spc="-1">
                 <a:solidFill>
                   <a:srgbClr val="000000"/>
                 </a:solidFill>
@@ -3135,15 +3362,9 @@
               </a:rPr>
               <a:t>第五大纲级别</a:t>
             </a:r>
-            <a:endParaRPr b="0" lang="zh-TW" sz="2000" spc="-1" strike="noStrike">
-              <a:solidFill>
-                <a:srgbClr val="000000"/>
-              </a:solidFill>
-              <a:latin typeface="Arial"/>
-            </a:endParaRPr>
-          </a:p>
-          <a:p>
-            <a:pPr lvl="5" marL="2592000" indent="-216000">
+          </a:p>
+          <a:p>
+            <a:pPr marL="2592000" lvl="5" indent="-216000">
               <a:spcBef>
                 <a:spcPts val="283"/>
               </a:spcBef>
@@ -3155,7 +3376,7 @@
               <a:buChar char=""/>
             </a:pPr>
             <a:r>
-              <a:rPr b="0" lang="zh-TW" sz="2000" spc="-1" strike="noStrike">
+              <a:rPr lang="zh-TW" sz="2000" b="0" strike="noStrike" spc="-1">
                 <a:solidFill>
                   <a:srgbClr val="000000"/>
                 </a:solidFill>
@@ -3163,15 +3384,9 @@
               </a:rPr>
               <a:t>第六大纲级别</a:t>
             </a:r>
-            <a:endParaRPr b="0" lang="zh-TW" sz="2000" spc="-1" strike="noStrike">
-              <a:solidFill>
-                <a:srgbClr val="000000"/>
-              </a:solidFill>
-              <a:latin typeface="Arial"/>
-            </a:endParaRPr>
-          </a:p>
-          <a:p>
-            <a:pPr lvl="6" marL="3024000" indent="-216000">
+          </a:p>
+          <a:p>
+            <a:pPr marL="3024000" lvl="6" indent="-216000">
               <a:spcBef>
                 <a:spcPts val="283"/>
               </a:spcBef>
@@ -3183,7 +3398,7 @@
               <a:buChar char=""/>
             </a:pPr>
             <a:r>
-              <a:rPr b="0" lang="zh-TW" sz="2000" spc="-1" strike="noStrike">
+              <a:rPr lang="zh-TW" sz="2000" b="0" strike="noStrike" spc="-1">
                 <a:solidFill>
                   <a:srgbClr val="000000"/>
                 </a:solidFill>
@@ -3191,43 +3406,318 @@
               </a:rPr>
               <a:t>第七大纲级别</a:t>
             </a:r>
-            <a:endParaRPr b="0" lang="zh-TW" sz="2000" spc="-1" strike="noStrike">
-              <a:solidFill>
-                <a:srgbClr val="000000"/>
-              </a:solidFill>
-              <a:latin typeface="Arial"/>
-            </a:endParaRPr>
           </a:p>
         </p:txBody>
       </p:sp>
     </p:spTree>
   </p:cSld>
-  <p:clrMap bg1="lt1" bg2="lt2" tx1="dk1" tx2="dk2" accent1="accent1" accent2="accent2" accent3="accent3" accent4="accent4" accent5="accent5" accent6="accent6" hlink="hlink" folHlink="folHlink"/>
+  <p:clrMap bg1="lt1" tx1="dk1" bg2="lt2" tx2="dk2" accent1="accent1" accent2="accent2" accent3="accent3" accent4="accent4" accent5="accent5" accent6="accent6" hlink="hlink" folHlink="folHlink"/>
   <p:sldLayoutIdLst>
-    <p:sldLayoutId id="2147483649" r:id="rId2"/>
-    <p:sldLayoutId id="2147483650" r:id="rId3"/>
-    <p:sldLayoutId id="2147483651" r:id="rId4"/>
-    <p:sldLayoutId id="2147483652" r:id="rId5"/>
-    <p:sldLayoutId id="2147483653" r:id="rId6"/>
-    <p:sldLayoutId id="2147483654" r:id="rId7"/>
-    <p:sldLayoutId id="2147483655" r:id="rId8"/>
-    <p:sldLayoutId id="2147483656" r:id="rId9"/>
-    <p:sldLayoutId id="2147483657" r:id="rId10"/>
-    <p:sldLayoutId id="2147483658" r:id="rId11"/>
-    <p:sldLayoutId id="2147483659" r:id="rId12"/>
-    <p:sldLayoutId id="2147483660" r:id="rId13"/>
+    <p:sldLayoutId id="2147483649" r:id="rId1"/>
+    <p:sldLayoutId id="2147483650" r:id="rId2"/>
+    <p:sldLayoutId id="2147483651" r:id="rId3"/>
+    <p:sldLayoutId id="2147483652" r:id="rId4"/>
+    <p:sldLayoutId id="2147483653" r:id="rId5"/>
+    <p:sldLayoutId id="2147483654" r:id="rId6"/>
+    <p:sldLayoutId id="2147483655" r:id="rId7"/>
+    <p:sldLayoutId id="2147483656" r:id="rId8"/>
+    <p:sldLayoutId id="2147483657" r:id="rId9"/>
+    <p:sldLayoutId id="2147483658" r:id="rId10"/>
+    <p:sldLayoutId id="2147483659" r:id="rId11"/>
+    <p:sldLayoutId id="2147483660" r:id="rId12"/>
   </p:sldLayoutIdLst>
+  <p:txStyles>
+    <p:titleStyle>
+      <a:lvl1pPr algn="l" defTabSz="914400" rtl="0" eaLnBrk="1" latinLnBrk="0" hangingPunct="1">
+        <a:lnSpc>
+          <a:spcPct val="90000"/>
+        </a:lnSpc>
+        <a:spcBef>
+          <a:spcPct val="0"/>
+        </a:spcBef>
+        <a:buNone/>
+        <a:defRPr sz="4400" kern="1200">
+          <a:solidFill>
+            <a:schemeClr val="tx1"/>
+          </a:solidFill>
+          <a:latin typeface="+mj-lt"/>
+          <a:ea typeface="+mj-ea"/>
+          <a:cs typeface="+mj-cs"/>
+        </a:defRPr>
+      </a:lvl1pPr>
+    </p:titleStyle>
+    <p:bodyStyle>
+      <a:lvl1pPr marL="228600" indent="-228600" algn="l" defTabSz="914400" rtl="0" eaLnBrk="1" latinLnBrk="0" hangingPunct="1">
+        <a:lnSpc>
+          <a:spcPct val="90000"/>
+        </a:lnSpc>
+        <a:spcBef>
+          <a:spcPts val="1000"/>
+        </a:spcBef>
+        <a:buFont typeface="Arial" panose="020B0604020202020204" pitchFamily="34" charset="0"/>
+        <a:buChar char="•"/>
+        <a:defRPr sz="2800" kern="1200">
+          <a:solidFill>
+            <a:schemeClr val="tx1"/>
+          </a:solidFill>
+          <a:latin typeface="+mn-lt"/>
+          <a:ea typeface="+mn-ea"/>
+          <a:cs typeface="+mn-cs"/>
+        </a:defRPr>
+      </a:lvl1pPr>
+      <a:lvl2pPr marL="685800" indent="-228600" algn="l" defTabSz="914400" rtl="0" eaLnBrk="1" latinLnBrk="0" hangingPunct="1">
+        <a:lnSpc>
+          <a:spcPct val="90000"/>
+        </a:lnSpc>
+        <a:spcBef>
+          <a:spcPts val="500"/>
+        </a:spcBef>
+        <a:buFont typeface="Arial" panose="020B0604020202020204" pitchFamily="34" charset="0"/>
+        <a:buChar char="•"/>
+        <a:defRPr sz="2400" kern="1200">
+          <a:solidFill>
+            <a:schemeClr val="tx1"/>
+          </a:solidFill>
+          <a:latin typeface="+mn-lt"/>
+          <a:ea typeface="+mn-ea"/>
+          <a:cs typeface="+mn-cs"/>
+        </a:defRPr>
+      </a:lvl2pPr>
+      <a:lvl3pPr marL="1143000" indent="-228600" algn="l" defTabSz="914400" rtl="0" eaLnBrk="1" latinLnBrk="0" hangingPunct="1">
+        <a:lnSpc>
+          <a:spcPct val="90000"/>
+        </a:lnSpc>
+        <a:spcBef>
+          <a:spcPts val="500"/>
+        </a:spcBef>
+        <a:buFont typeface="Arial" panose="020B0604020202020204" pitchFamily="34" charset="0"/>
+        <a:buChar char="•"/>
+        <a:defRPr sz="2000" kern="1200">
+          <a:solidFill>
+            <a:schemeClr val="tx1"/>
+          </a:solidFill>
+          <a:latin typeface="+mn-lt"/>
+          <a:ea typeface="+mn-ea"/>
+          <a:cs typeface="+mn-cs"/>
+        </a:defRPr>
+      </a:lvl3pPr>
+      <a:lvl4pPr marL="1600200" indent="-228600" algn="l" defTabSz="914400" rtl="0" eaLnBrk="1" latinLnBrk="0" hangingPunct="1">
+        <a:lnSpc>
+          <a:spcPct val="90000"/>
+        </a:lnSpc>
+        <a:spcBef>
+          <a:spcPts val="500"/>
+        </a:spcBef>
+        <a:buFont typeface="Arial" panose="020B0604020202020204" pitchFamily="34" charset="0"/>
+        <a:buChar char="•"/>
+        <a:defRPr sz="1800" kern="1200">
+          <a:solidFill>
+            <a:schemeClr val="tx1"/>
+          </a:solidFill>
+          <a:latin typeface="+mn-lt"/>
+          <a:ea typeface="+mn-ea"/>
+          <a:cs typeface="+mn-cs"/>
+        </a:defRPr>
+      </a:lvl4pPr>
+      <a:lvl5pPr marL="2057400" indent="-228600" algn="l" defTabSz="914400" rtl="0" eaLnBrk="1" latinLnBrk="0" hangingPunct="1">
+        <a:lnSpc>
+          <a:spcPct val="90000"/>
+        </a:lnSpc>
+        <a:spcBef>
+          <a:spcPts val="500"/>
+        </a:spcBef>
+        <a:buFont typeface="Arial" panose="020B0604020202020204" pitchFamily="34" charset="0"/>
+        <a:buChar char="•"/>
+        <a:defRPr sz="1800" kern="1200">
+          <a:solidFill>
+            <a:schemeClr val="tx1"/>
+          </a:solidFill>
+          <a:latin typeface="+mn-lt"/>
+          <a:ea typeface="+mn-ea"/>
+          <a:cs typeface="+mn-cs"/>
+        </a:defRPr>
+      </a:lvl5pPr>
+      <a:lvl6pPr marL="2514600" indent="-228600" algn="l" defTabSz="914400" rtl="0" eaLnBrk="1" latinLnBrk="0" hangingPunct="1">
+        <a:lnSpc>
+          <a:spcPct val="90000"/>
+        </a:lnSpc>
+        <a:spcBef>
+          <a:spcPts val="500"/>
+        </a:spcBef>
+        <a:buFont typeface="Arial" panose="020B0604020202020204" pitchFamily="34" charset="0"/>
+        <a:buChar char="•"/>
+        <a:defRPr sz="1800" kern="1200">
+          <a:solidFill>
+            <a:schemeClr val="tx1"/>
+          </a:solidFill>
+          <a:latin typeface="+mn-lt"/>
+          <a:ea typeface="+mn-ea"/>
+          <a:cs typeface="+mn-cs"/>
+        </a:defRPr>
+      </a:lvl6pPr>
+      <a:lvl7pPr marL="2971800" indent="-228600" algn="l" defTabSz="914400" rtl="0" eaLnBrk="1" latinLnBrk="0" hangingPunct="1">
+        <a:lnSpc>
+          <a:spcPct val="90000"/>
+        </a:lnSpc>
+        <a:spcBef>
+          <a:spcPts val="500"/>
+        </a:spcBef>
+        <a:buFont typeface="Arial" panose="020B0604020202020204" pitchFamily="34" charset="0"/>
+        <a:buChar char="•"/>
+        <a:defRPr sz="1800" kern="1200">
+          <a:solidFill>
+            <a:schemeClr val="tx1"/>
+          </a:solidFill>
+          <a:latin typeface="+mn-lt"/>
+          <a:ea typeface="+mn-ea"/>
+          <a:cs typeface="+mn-cs"/>
+        </a:defRPr>
+      </a:lvl7pPr>
+      <a:lvl8pPr marL="3429000" indent="-228600" algn="l" defTabSz="914400" rtl="0" eaLnBrk="1" latinLnBrk="0" hangingPunct="1">
+        <a:lnSpc>
+          <a:spcPct val="90000"/>
+        </a:lnSpc>
+        <a:spcBef>
+          <a:spcPts val="500"/>
+        </a:spcBef>
+        <a:buFont typeface="Arial" panose="020B0604020202020204" pitchFamily="34" charset="0"/>
+        <a:buChar char="•"/>
+        <a:defRPr sz="1800" kern="1200">
+          <a:solidFill>
+            <a:schemeClr val="tx1"/>
+          </a:solidFill>
+          <a:latin typeface="+mn-lt"/>
+          <a:ea typeface="+mn-ea"/>
+          <a:cs typeface="+mn-cs"/>
+        </a:defRPr>
+      </a:lvl8pPr>
+      <a:lvl9pPr marL="3886200" indent="-228600" algn="l" defTabSz="914400" rtl="0" eaLnBrk="1" latinLnBrk="0" hangingPunct="1">
+        <a:lnSpc>
+          <a:spcPct val="90000"/>
+        </a:lnSpc>
+        <a:spcBef>
+          <a:spcPts val="500"/>
+        </a:spcBef>
+        <a:buFont typeface="Arial" panose="020B0604020202020204" pitchFamily="34" charset="0"/>
+        <a:buChar char="•"/>
+        <a:defRPr sz="1800" kern="1200">
+          <a:solidFill>
+            <a:schemeClr val="tx1"/>
+          </a:solidFill>
+          <a:latin typeface="+mn-lt"/>
+          <a:ea typeface="+mn-ea"/>
+          <a:cs typeface="+mn-cs"/>
+        </a:defRPr>
+      </a:lvl9pPr>
+    </p:bodyStyle>
+    <p:otherStyle>
+      <a:defPPr>
+        <a:defRPr lang="zh-CN"/>
+      </a:defPPr>
+      <a:lvl1pPr marL="0" algn="l" defTabSz="914400" rtl="0" eaLnBrk="1" latinLnBrk="0" hangingPunct="1">
+        <a:defRPr sz="1800" kern="1200">
+          <a:solidFill>
+            <a:schemeClr val="tx1"/>
+          </a:solidFill>
+          <a:latin typeface="+mn-lt"/>
+          <a:ea typeface="+mn-ea"/>
+          <a:cs typeface="+mn-cs"/>
+        </a:defRPr>
+      </a:lvl1pPr>
+      <a:lvl2pPr marL="457200" algn="l" defTabSz="914400" rtl="0" eaLnBrk="1" latinLnBrk="0" hangingPunct="1">
+        <a:defRPr sz="1800" kern="1200">
+          <a:solidFill>
+            <a:schemeClr val="tx1"/>
+          </a:solidFill>
+          <a:latin typeface="+mn-lt"/>
+          <a:ea typeface="+mn-ea"/>
+          <a:cs typeface="+mn-cs"/>
+        </a:defRPr>
+      </a:lvl2pPr>
+      <a:lvl3pPr marL="914400" algn="l" defTabSz="914400" rtl="0" eaLnBrk="1" latinLnBrk="0" hangingPunct="1">
+        <a:defRPr sz="1800" kern="1200">
+          <a:solidFill>
+            <a:schemeClr val="tx1"/>
+          </a:solidFill>
+          <a:latin typeface="+mn-lt"/>
+          <a:ea typeface="+mn-ea"/>
+          <a:cs typeface="+mn-cs"/>
+        </a:defRPr>
+      </a:lvl3pPr>
+      <a:lvl4pPr marL="1371600" algn="l" defTabSz="914400" rtl="0" eaLnBrk="1" latinLnBrk="0" hangingPunct="1">
+        <a:defRPr sz="1800" kern="1200">
+          <a:solidFill>
+            <a:schemeClr val="tx1"/>
+          </a:solidFill>
+          <a:latin typeface="+mn-lt"/>
+          <a:ea typeface="+mn-ea"/>
+          <a:cs typeface="+mn-cs"/>
+        </a:defRPr>
+      </a:lvl4pPr>
+      <a:lvl5pPr marL="1828800" algn="l" defTabSz="914400" rtl="0" eaLnBrk="1" latinLnBrk="0" hangingPunct="1">
+        <a:defRPr sz="1800" kern="1200">
+          <a:solidFill>
+            <a:schemeClr val="tx1"/>
+          </a:solidFill>
+          <a:latin typeface="+mn-lt"/>
+          <a:ea typeface="+mn-ea"/>
+          <a:cs typeface="+mn-cs"/>
+        </a:defRPr>
+      </a:lvl5pPr>
+      <a:lvl6pPr marL="2286000" algn="l" defTabSz="914400" rtl="0" eaLnBrk="1" latinLnBrk="0" hangingPunct="1">
+        <a:defRPr sz="1800" kern="1200">
+          <a:solidFill>
+            <a:schemeClr val="tx1"/>
+          </a:solidFill>
+          <a:latin typeface="+mn-lt"/>
+          <a:ea typeface="+mn-ea"/>
+          <a:cs typeface="+mn-cs"/>
+        </a:defRPr>
+      </a:lvl6pPr>
+      <a:lvl7pPr marL="2743200" algn="l" defTabSz="914400" rtl="0" eaLnBrk="1" latinLnBrk="0" hangingPunct="1">
+        <a:defRPr sz="1800" kern="1200">
+          <a:solidFill>
+            <a:schemeClr val="tx1"/>
+          </a:solidFill>
+          <a:latin typeface="+mn-lt"/>
+          <a:ea typeface="+mn-ea"/>
+          <a:cs typeface="+mn-cs"/>
+        </a:defRPr>
+      </a:lvl7pPr>
+      <a:lvl8pPr marL="3200400" algn="l" defTabSz="914400" rtl="0" eaLnBrk="1" latinLnBrk="0" hangingPunct="1">
+        <a:defRPr sz="1800" kern="1200">
+          <a:solidFill>
+            <a:schemeClr val="tx1"/>
+          </a:solidFill>
+          <a:latin typeface="+mn-lt"/>
+          <a:ea typeface="+mn-ea"/>
+          <a:cs typeface="+mn-cs"/>
+        </a:defRPr>
+      </a:lvl8pPr>
+      <a:lvl9pPr marL="3657600" algn="l" defTabSz="914400" rtl="0" eaLnBrk="1" latinLnBrk="0" hangingPunct="1">
+        <a:defRPr sz="1800" kern="1200">
+          <a:solidFill>
+            <a:schemeClr val="tx1"/>
+          </a:solidFill>
+          <a:latin typeface="+mn-lt"/>
+          <a:ea typeface="+mn-ea"/>
+          <a:cs typeface="+mn-cs"/>
+        </a:defRPr>
+      </a:lvl9pPr>
+    </p:otherStyle>
+  </p:txStyles>
 </p:sldMaster>
 </file>
 
 <file path=ppt/slideMasters/slideMaster2.xml><?xml version="1.0" encoding="utf-8"?>
-<p:sldMaster xmlns:a="http://schemas.openxmlformats.org/drawingml/2006/main" xmlns:p="http://schemas.openxmlformats.org/presentationml/2006/main" xmlns:r="http://schemas.openxmlformats.org/officeDocument/2006/relationships" xmlns:p14="http://schemas.microsoft.com/office/powerpoint/2010/main" xmlns:p15="http://schemas.microsoft.com/office/powerpoint/2012/main" xmlns:mc="http://schemas.openxmlformats.org/markup-compatibility/2006">
+<p:sldMaster xmlns:a="http://schemas.openxmlformats.org/drawingml/2006/main" xmlns:r="http://schemas.openxmlformats.org/officeDocument/2006/relationships" xmlns:p="http://schemas.openxmlformats.org/presentationml/2006/main">
   <p:cSld>
     <p:bg>
       <p:bgPr>
         <a:solidFill>
-          <a:srgbClr val="ffffff"/>
+          <a:srgbClr val="FFFFFF"/>
         </a:solidFill>
+        <a:effectLst/>
       </p:bgPr>
     </p:bg>
     <p:spTree>
@@ -3264,12 +3754,13 @@
           </a:prstGeom>
         </p:spPr>
         <p:txBody>
-          <a:bodyPr lIns="0" rIns="0" tIns="0" bIns="0" anchor="ctr">
+          <a:bodyPr lIns="0" tIns="0" rIns="0" bIns="0" anchor="ctr">
             <a:spAutoFit/>
           </a:bodyPr>
+          <a:lstStyle/>
           <a:p>
             <a:r>
-              <a:rPr b="0" lang="zh-TW" sz="4400" spc="-1" strike="noStrike">
+              <a:rPr lang="zh-TW" sz="4400" b="0" strike="noStrike" spc="-1">
                 <a:solidFill>
                   <a:srgbClr val="000000"/>
                 </a:solidFill>
@@ -3277,12 +3768,6 @@
               </a:rPr>
               <a:t>单击鼠标编辑标题文字格式</a:t>
             </a:r>
-            <a:endParaRPr b="0" lang="zh-TW" sz="4400" spc="-1" strike="noStrike">
-              <a:solidFill>
-                <a:srgbClr val="000000"/>
-              </a:solidFill>
-              <a:latin typeface="Arial"/>
-            </a:endParaRPr>
           </a:p>
         </p:txBody>
       </p:sp>
@@ -3306,9 +3791,10 @@
           </a:prstGeom>
         </p:spPr>
         <p:txBody>
-          <a:bodyPr lIns="0" rIns="0" tIns="0" bIns="0">
+          <a:bodyPr lIns="0" tIns="0" rIns="0" bIns="0">
             <a:normAutofit/>
           </a:bodyPr>
+          <a:lstStyle/>
           <a:p>
             <a:pPr marL="432000" indent="-324000">
               <a:spcBef>
@@ -3322,7 +3808,7 @@
               <a:buChar char=""/>
             </a:pPr>
             <a:r>
-              <a:rPr b="0" lang="zh-TW" sz="2800" spc="-1" strike="noStrike">
+              <a:rPr lang="zh-TW" sz="2800" b="0" strike="noStrike" spc="-1">
                 <a:solidFill>
                   <a:srgbClr val="000000"/>
                 </a:solidFill>
@@ -3330,15 +3816,9 @@
               </a:rPr>
               <a:t>单击鼠标编辑大纲文字格式</a:t>
             </a:r>
-            <a:endParaRPr b="0" lang="zh-TW" sz="2800" spc="-1" strike="noStrike">
-              <a:solidFill>
-                <a:srgbClr val="000000"/>
-              </a:solidFill>
-              <a:latin typeface="Arial"/>
-            </a:endParaRPr>
-          </a:p>
-          <a:p>
-            <a:pPr lvl="1" marL="864000" indent="-324000">
+          </a:p>
+          <a:p>
+            <a:pPr marL="864000" lvl="1" indent="-324000">
               <a:spcBef>
                 <a:spcPts val="1134"/>
               </a:spcBef>
@@ -3350,7 +3830,7 @@
               <a:buChar char=""/>
             </a:pPr>
             <a:r>
-              <a:rPr b="0" lang="zh-TW" sz="2800" spc="-1" strike="noStrike">
+              <a:rPr lang="zh-TW" sz="2800" b="0" strike="noStrike" spc="-1">
                 <a:solidFill>
                   <a:srgbClr val="000000"/>
                 </a:solidFill>
@@ -3358,15 +3838,9 @@
               </a:rPr>
               <a:t>第二个大纲级</a:t>
             </a:r>
-            <a:endParaRPr b="0" lang="zh-TW" sz="2800" spc="-1" strike="noStrike">
-              <a:solidFill>
-                <a:srgbClr val="000000"/>
-              </a:solidFill>
-              <a:latin typeface="Arial"/>
-            </a:endParaRPr>
-          </a:p>
-          <a:p>
-            <a:pPr lvl="2" marL="1296000" indent="-288000">
+          </a:p>
+          <a:p>
+            <a:pPr marL="1296000" lvl="2" indent="-288000">
               <a:spcBef>
                 <a:spcPts val="850"/>
               </a:spcBef>
@@ -3378,7 +3852,7 @@
               <a:buChar char=""/>
             </a:pPr>
             <a:r>
-              <a:rPr b="0" lang="zh-TW" sz="2800" spc="-1" strike="noStrike">
+              <a:rPr lang="zh-TW" sz="2800" b="0" strike="noStrike" spc="-1">
                 <a:solidFill>
                   <a:srgbClr val="000000"/>
                 </a:solidFill>
@@ -3386,15 +3860,9 @@
               </a:rPr>
               <a:t>第三大纲级别</a:t>
             </a:r>
-            <a:endParaRPr b="0" lang="zh-TW" sz="2800" spc="-1" strike="noStrike">
-              <a:solidFill>
-                <a:srgbClr val="000000"/>
-              </a:solidFill>
-              <a:latin typeface="Arial"/>
-            </a:endParaRPr>
-          </a:p>
-          <a:p>
-            <a:pPr lvl="3" marL="1728000" indent="-216000">
+          </a:p>
+          <a:p>
+            <a:pPr marL="1728000" lvl="3" indent="-216000">
               <a:spcBef>
                 <a:spcPts val="567"/>
               </a:spcBef>
@@ -3406,7 +3874,7 @@
               <a:buChar char=""/>
             </a:pPr>
             <a:r>
-              <a:rPr b="0" lang="zh-TW" sz="2800" spc="-1" strike="noStrike">
+              <a:rPr lang="zh-TW" sz="2800" b="0" strike="noStrike" spc="-1">
                 <a:solidFill>
                   <a:srgbClr val="000000"/>
                 </a:solidFill>
@@ -3414,15 +3882,9 @@
               </a:rPr>
               <a:t>第四大纲级别</a:t>
             </a:r>
-            <a:endParaRPr b="0" lang="zh-TW" sz="2800" spc="-1" strike="noStrike">
-              <a:solidFill>
-                <a:srgbClr val="000000"/>
-              </a:solidFill>
-              <a:latin typeface="Arial"/>
-            </a:endParaRPr>
-          </a:p>
-          <a:p>
-            <a:pPr lvl="4" marL="2160000" indent="-216000">
+          </a:p>
+          <a:p>
+            <a:pPr marL="2160000" lvl="4" indent="-216000">
               <a:spcBef>
                 <a:spcPts val="283"/>
               </a:spcBef>
@@ -3434,7 +3896,7 @@
               <a:buChar char=""/>
             </a:pPr>
             <a:r>
-              <a:rPr b="0" lang="zh-TW" sz="2800" spc="-1" strike="noStrike">
+              <a:rPr lang="zh-TW" sz="2800" b="0" strike="noStrike" spc="-1">
                 <a:solidFill>
                   <a:srgbClr val="000000"/>
                 </a:solidFill>
@@ -3442,15 +3904,9 @@
               </a:rPr>
               <a:t>第五大纲级别</a:t>
             </a:r>
-            <a:endParaRPr b="0" lang="zh-TW" sz="2800" spc="-1" strike="noStrike">
-              <a:solidFill>
-                <a:srgbClr val="000000"/>
-              </a:solidFill>
-              <a:latin typeface="Arial"/>
-            </a:endParaRPr>
-          </a:p>
-          <a:p>
-            <a:pPr lvl="5" marL="2592000" indent="-216000">
+          </a:p>
+          <a:p>
+            <a:pPr marL="2592000" lvl="5" indent="-216000">
               <a:spcBef>
                 <a:spcPts val="283"/>
               </a:spcBef>
@@ -3462,7 +3918,7 @@
               <a:buChar char=""/>
             </a:pPr>
             <a:r>
-              <a:rPr b="0" lang="zh-TW" sz="2800" spc="-1" strike="noStrike">
+              <a:rPr lang="zh-TW" sz="2800" b="0" strike="noStrike" spc="-1">
                 <a:solidFill>
                   <a:srgbClr val="000000"/>
                 </a:solidFill>
@@ -3470,15 +3926,9 @@
               </a:rPr>
               <a:t>第六大纲级别</a:t>
             </a:r>
-            <a:endParaRPr b="0" lang="zh-TW" sz="2800" spc="-1" strike="noStrike">
-              <a:solidFill>
-                <a:srgbClr val="000000"/>
-              </a:solidFill>
-              <a:latin typeface="Arial"/>
-            </a:endParaRPr>
-          </a:p>
-          <a:p>
-            <a:pPr lvl="6" marL="3024000" indent="-216000">
+          </a:p>
+          <a:p>
+            <a:pPr marL="3024000" lvl="6" indent="-216000">
               <a:spcBef>
                 <a:spcPts val="283"/>
               </a:spcBef>
@@ -3490,7 +3940,7 @@
               <a:buChar char=""/>
             </a:pPr>
             <a:r>
-              <a:rPr b="0" lang="zh-TW" sz="2800" spc="-1" strike="noStrike">
+              <a:rPr lang="zh-TW" sz="2800" b="0" strike="noStrike" spc="-1">
                 <a:solidFill>
                   <a:srgbClr val="000000"/>
                 </a:solidFill>
@@ -3498,37 +3948,311 @@
               </a:rPr>
               <a:t>第七大纲级别</a:t>
             </a:r>
-            <a:endParaRPr b="0" lang="zh-TW" sz="2800" spc="-1" strike="noStrike">
-              <a:solidFill>
-                <a:srgbClr val="000000"/>
-              </a:solidFill>
-              <a:latin typeface="Arial"/>
-            </a:endParaRPr>
           </a:p>
         </p:txBody>
       </p:sp>
     </p:spTree>
   </p:cSld>
-  <p:clrMap bg1="lt1" bg2="lt2" tx1="dk1" tx2="dk2" accent1="accent1" accent2="accent2" accent3="accent3" accent4="accent4" accent5="accent5" accent6="accent6" hlink="hlink" folHlink="folHlink"/>
+  <p:clrMap bg1="lt1" tx1="dk1" bg2="lt2" tx2="dk2" accent1="accent1" accent2="accent2" accent3="accent3" accent4="accent4" accent5="accent5" accent6="accent6" hlink="hlink" folHlink="folHlink"/>
   <p:sldLayoutIdLst>
-    <p:sldLayoutId id="2147483662" r:id="rId2"/>
-    <p:sldLayoutId id="2147483663" r:id="rId3"/>
-    <p:sldLayoutId id="2147483664" r:id="rId4"/>
-    <p:sldLayoutId id="2147483665" r:id="rId5"/>
-    <p:sldLayoutId id="2147483666" r:id="rId6"/>
-    <p:sldLayoutId id="2147483667" r:id="rId7"/>
-    <p:sldLayoutId id="2147483668" r:id="rId8"/>
-    <p:sldLayoutId id="2147483669" r:id="rId9"/>
-    <p:sldLayoutId id="2147483670" r:id="rId10"/>
-    <p:sldLayoutId id="2147483671" r:id="rId11"/>
-    <p:sldLayoutId id="2147483672" r:id="rId12"/>
-    <p:sldLayoutId id="2147483673" r:id="rId13"/>
+    <p:sldLayoutId id="2147483662" r:id="rId1"/>
+    <p:sldLayoutId id="2147483663" r:id="rId2"/>
+    <p:sldLayoutId id="2147483664" r:id="rId3"/>
+    <p:sldLayoutId id="2147483665" r:id="rId4"/>
+    <p:sldLayoutId id="2147483666" r:id="rId5"/>
+    <p:sldLayoutId id="2147483667" r:id="rId6"/>
+    <p:sldLayoutId id="2147483668" r:id="rId7"/>
+    <p:sldLayoutId id="2147483669" r:id="rId8"/>
+    <p:sldLayoutId id="2147483670" r:id="rId9"/>
+    <p:sldLayoutId id="2147483671" r:id="rId10"/>
+    <p:sldLayoutId id="2147483672" r:id="rId11"/>
+    <p:sldLayoutId id="2147483673" r:id="rId12"/>
   </p:sldLayoutIdLst>
+  <p:txStyles>
+    <p:titleStyle>
+      <a:lvl1pPr algn="l" defTabSz="914400" rtl="0" eaLnBrk="1" latinLnBrk="0" hangingPunct="1">
+        <a:lnSpc>
+          <a:spcPct val="90000"/>
+        </a:lnSpc>
+        <a:spcBef>
+          <a:spcPct val="0"/>
+        </a:spcBef>
+        <a:buNone/>
+        <a:defRPr sz="4400" kern="1200">
+          <a:solidFill>
+            <a:schemeClr val="tx1"/>
+          </a:solidFill>
+          <a:latin typeface="+mj-lt"/>
+          <a:ea typeface="+mj-ea"/>
+          <a:cs typeface="+mj-cs"/>
+        </a:defRPr>
+      </a:lvl1pPr>
+    </p:titleStyle>
+    <p:bodyStyle>
+      <a:lvl1pPr marL="228600" indent="-228600" algn="l" defTabSz="914400" rtl="0" eaLnBrk="1" latinLnBrk="0" hangingPunct="1">
+        <a:lnSpc>
+          <a:spcPct val="90000"/>
+        </a:lnSpc>
+        <a:spcBef>
+          <a:spcPts val="1000"/>
+        </a:spcBef>
+        <a:buFont typeface="Arial" panose="020B0604020202020204" pitchFamily="34" charset="0"/>
+        <a:buChar char="•"/>
+        <a:defRPr sz="2800" kern="1200">
+          <a:solidFill>
+            <a:schemeClr val="tx1"/>
+          </a:solidFill>
+          <a:latin typeface="+mn-lt"/>
+          <a:ea typeface="+mn-ea"/>
+          <a:cs typeface="+mn-cs"/>
+        </a:defRPr>
+      </a:lvl1pPr>
+      <a:lvl2pPr marL="685800" indent="-228600" algn="l" defTabSz="914400" rtl="0" eaLnBrk="1" latinLnBrk="0" hangingPunct="1">
+        <a:lnSpc>
+          <a:spcPct val="90000"/>
+        </a:lnSpc>
+        <a:spcBef>
+          <a:spcPts val="500"/>
+        </a:spcBef>
+        <a:buFont typeface="Arial" panose="020B0604020202020204" pitchFamily="34" charset="0"/>
+        <a:buChar char="•"/>
+        <a:defRPr sz="2400" kern="1200">
+          <a:solidFill>
+            <a:schemeClr val="tx1"/>
+          </a:solidFill>
+          <a:latin typeface="+mn-lt"/>
+          <a:ea typeface="+mn-ea"/>
+          <a:cs typeface="+mn-cs"/>
+        </a:defRPr>
+      </a:lvl2pPr>
+      <a:lvl3pPr marL="1143000" indent="-228600" algn="l" defTabSz="914400" rtl="0" eaLnBrk="1" latinLnBrk="0" hangingPunct="1">
+        <a:lnSpc>
+          <a:spcPct val="90000"/>
+        </a:lnSpc>
+        <a:spcBef>
+          <a:spcPts val="500"/>
+        </a:spcBef>
+        <a:buFont typeface="Arial" panose="020B0604020202020204" pitchFamily="34" charset="0"/>
+        <a:buChar char="•"/>
+        <a:defRPr sz="2000" kern="1200">
+          <a:solidFill>
+            <a:schemeClr val="tx1"/>
+          </a:solidFill>
+          <a:latin typeface="+mn-lt"/>
+          <a:ea typeface="+mn-ea"/>
+          <a:cs typeface="+mn-cs"/>
+        </a:defRPr>
+      </a:lvl3pPr>
+      <a:lvl4pPr marL="1600200" indent="-228600" algn="l" defTabSz="914400" rtl="0" eaLnBrk="1" latinLnBrk="0" hangingPunct="1">
+        <a:lnSpc>
+          <a:spcPct val="90000"/>
+        </a:lnSpc>
+        <a:spcBef>
+          <a:spcPts val="500"/>
+        </a:spcBef>
+        <a:buFont typeface="Arial" panose="020B0604020202020204" pitchFamily="34" charset="0"/>
+        <a:buChar char="•"/>
+        <a:defRPr sz="1800" kern="1200">
+          <a:solidFill>
+            <a:schemeClr val="tx1"/>
+          </a:solidFill>
+          <a:latin typeface="+mn-lt"/>
+          <a:ea typeface="+mn-ea"/>
+          <a:cs typeface="+mn-cs"/>
+        </a:defRPr>
+      </a:lvl4pPr>
+      <a:lvl5pPr marL="2057400" indent="-228600" algn="l" defTabSz="914400" rtl="0" eaLnBrk="1" latinLnBrk="0" hangingPunct="1">
+        <a:lnSpc>
+          <a:spcPct val="90000"/>
+        </a:lnSpc>
+        <a:spcBef>
+          <a:spcPts val="500"/>
+        </a:spcBef>
+        <a:buFont typeface="Arial" panose="020B0604020202020204" pitchFamily="34" charset="0"/>
+        <a:buChar char="•"/>
+        <a:defRPr sz="1800" kern="1200">
+          <a:solidFill>
+            <a:schemeClr val="tx1"/>
+          </a:solidFill>
+          <a:latin typeface="+mn-lt"/>
+          <a:ea typeface="+mn-ea"/>
+          <a:cs typeface="+mn-cs"/>
+        </a:defRPr>
+      </a:lvl5pPr>
+      <a:lvl6pPr marL="2514600" indent="-228600" algn="l" defTabSz="914400" rtl="0" eaLnBrk="1" latinLnBrk="0" hangingPunct="1">
+        <a:lnSpc>
+          <a:spcPct val="90000"/>
+        </a:lnSpc>
+        <a:spcBef>
+          <a:spcPts val="500"/>
+        </a:spcBef>
+        <a:buFont typeface="Arial" panose="020B0604020202020204" pitchFamily="34" charset="0"/>
+        <a:buChar char="•"/>
+        <a:defRPr sz="1800" kern="1200">
+          <a:solidFill>
+            <a:schemeClr val="tx1"/>
+          </a:solidFill>
+          <a:latin typeface="+mn-lt"/>
+          <a:ea typeface="+mn-ea"/>
+          <a:cs typeface="+mn-cs"/>
+        </a:defRPr>
+      </a:lvl6pPr>
+      <a:lvl7pPr marL="2971800" indent="-228600" algn="l" defTabSz="914400" rtl="0" eaLnBrk="1" latinLnBrk="0" hangingPunct="1">
+        <a:lnSpc>
+          <a:spcPct val="90000"/>
+        </a:lnSpc>
+        <a:spcBef>
+          <a:spcPts val="500"/>
+        </a:spcBef>
+        <a:buFont typeface="Arial" panose="020B0604020202020204" pitchFamily="34" charset="0"/>
+        <a:buChar char="•"/>
+        <a:defRPr sz="1800" kern="1200">
+          <a:solidFill>
+            <a:schemeClr val="tx1"/>
+          </a:solidFill>
+          <a:latin typeface="+mn-lt"/>
+          <a:ea typeface="+mn-ea"/>
+          <a:cs typeface="+mn-cs"/>
+        </a:defRPr>
+      </a:lvl7pPr>
+      <a:lvl8pPr marL="3429000" indent="-228600" algn="l" defTabSz="914400" rtl="0" eaLnBrk="1" latinLnBrk="0" hangingPunct="1">
+        <a:lnSpc>
+          <a:spcPct val="90000"/>
+        </a:lnSpc>
+        <a:spcBef>
+          <a:spcPts val="500"/>
+        </a:spcBef>
+        <a:buFont typeface="Arial" panose="020B0604020202020204" pitchFamily="34" charset="0"/>
+        <a:buChar char="•"/>
+        <a:defRPr sz="1800" kern="1200">
+          <a:solidFill>
+            <a:schemeClr val="tx1"/>
+          </a:solidFill>
+          <a:latin typeface="+mn-lt"/>
+          <a:ea typeface="+mn-ea"/>
+          <a:cs typeface="+mn-cs"/>
+        </a:defRPr>
+      </a:lvl8pPr>
+      <a:lvl9pPr marL="3886200" indent="-228600" algn="l" defTabSz="914400" rtl="0" eaLnBrk="1" latinLnBrk="0" hangingPunct="1">
+        <a:lnSpc>
+          <a:spcPct val="90000"/>
+        </a:lnSpc>
+        <a:spcBef>
+          <a:spcPts val="500"/>
+        </a:spcBef>
+        <a:buFont typeface="Arial" panose="020B0604020202020204" pitchFamily="34" charset="0"/>
+        <a:buChar char="•"/>
+        <a:defRPr sz="1800" kern="1200">
+          <a:solidFill>
+            <a:schemeClr val="tx1"/>
+          </a:solidFill>
+          <a:latin typeface="+mn-lt"/>
+          <a:ea typeface="+mn-ea"/>
+          <a:cs typeface="+mn-cs"/>
+        </a:defRPr>
+      </a:lvl9pPr>
+    </p:bodyStyle>
+    <p:otherStyle>
+      <a:defPPr>
+        <a:defRPr lang="zh-CN"/>
+      </a:defPPr>
+      <a:lvl1pPr marL="0" algn="l" defTabSz="914400" rtl="0" eaLnBrk="1" latinLnBrk="0" hangingPunct="1">
+        <a:defRPr sz="1800" kern="1200">
+          <a:solidFill>
+            <a:schemeClr val="tx1"/>
+          </a:solidFill>
+          <a:latin typeface="+mn-lt"/>
+          <a:ea typeface="+mn-ea"/>
+          <a:cs typeface="+mn-cs"/>
+        </a:defRPr>
+      </a:lvl1pPr>
+      <a:lvl2pPr marL="457200" algn="l" defTabSz="914400" rtl="0" eaLnBrk="1" latinLnBrk="0" hangingPunct="1">
+        <a:defRPr sz="1800" kern="1200">
+          <a:solidFill>
+            <a:schemeClr val="tx1"/>
+          </a:solidFill>
+          <a:latin typeface="+mn-lt"/>
+          <a:ea typeface="+mn-ea"/>
+          <a:cs typeface="+mn-cs"/>
+        </a:defRPr>
+      </a:lvl2pPr>
+      <a:lvl3pPr marL="914400" algn="l" defTabSz="914400" rtl="0" eaLnBrk="1" latinLnBrk="0" hangingPunct="1">
+        <a:defRPr sz="1800" kern="1200">
+          <a:solidFill>
+            <a:schemeClr val="tx1"/>
+          </a:solidFill>
+          <a:latin typeface="+mn-lt"/>
+          <a:ea typeface="+mn-ea"/>
+          <a:cs typeface="+mn-cs"/>
+        </a:defRPr>
+      </a:lvl3pPr>
+      <a:lvl4pPr marL="1371600" algn="l" defTabSz="914400" rtl="0" eaLnBrk="1" latinLnBrk="0" hangingPunct="1">
+        <a:defRPr sz="1800" kern="1200">
+          <a:solidFill>
+            <a:schemeClr val="tx1"/>
+          </a:solidFill>
+          <a:latin typeface="+mn-lt"/>
+          <a:ea typeface="+mn-ea"/>
+          <a:cs typeface="+mn-cs"/>
+        </a:defRPr>
+      </a:lvl4pPr>
+      <a:lvl5pPr marL="1828800" algn="l" defTabSz="914400" rtl="0" eaLnBrk="1" latinLnBrk="0" hangingPunct="1">
+        <a:defRPr sz="1800" kern="1200">
+          <a:solidFill>
+            <a:schemeClr val="tx1"/>
+          </a:solidFill>
+          <a:latin typeface="+mn-lt"/>
+          <a:ea typeface="+mn-ea"/>
+          <a:cs typeface="+mn-cs"/>
+        </a:defRPr>
+      </a:lvl5pPr>
+      <a:lvl6pPr marL="2286000" algn="l" defTabSz="914400" rtl="0" eaLnBrk="1" latinLnBrk="0" hangingPunct="1">
+        <a:defRPr sz="1800" kern="1200">
+          <a:solidFill>
+            <a:schemeClr val="tx1"/>
+          </a:solidFill>
+          <a:latin typeface="+mn-lt"/>
+          <a:ea typeface="+mn-ea"/>
+          <a:cs typeface="+mn-cs"/>
+        </a:defRPr>
+      </a:lvl6pPr>
+      <a:lvl7pPr marL="2743200" algn="l" defTabSz="914400" rtl="0" eaLnBrk="1" latinLnBrk="0" hangingPunct="1">
+        <a:defRPr sz="1800" kern="1200">
+          <a:solidFill>
+            <a:schemeClr val="tx1"/>
+          </a:solidFill>
+          <a:latin typeface="+mn-lt"/>
+          <a:ea typeface="+mn-ea"/>
+          <a:cs typeface="+mn-cs"/>
+        </a:defRPr>
+      </a:lvl7pPr>
+      <a:lvl8pPr marL="3200400" algn="l" defTabSz="914400" rtl="0" eaLnBrk="1" latinLnBrk="0" hangingPunct="1">
+        <a:defRPr sz="1800" kern="1200">
+          <a:solidFill>
+            <a:schemeClr val="tx1"/>
+          </a:solidFill>
+          <a:latin typeface="+mn-lt"/>
+          <a:ea typeface="+mn-ea"/>
+          <a:cs typeface="+mn-cs"/>
+        </a:defRPr>
+      </a:lvl8pPr>
+      <a:lvl9pPr marL="3657600" algn="l" defTabSz="914400" rtl="0" eaLnBrk="1" latinLnBrk="0" hangingPunct="1">
+        <a:defRPr sz="1800" kern="1200">
+          <a:solidFill>
+            <a:schemeClr val="tx1"/>
+          </a:solidFill>
+          <a:latin typeface="+mn-lt"/>
+          <a:ea typeface="+mn-ea"/>
+          <a:cs typeface="+mn-cs"/>
+        </a:defRPr>
+      </a:lvl9pPr>
+    </p:otherStyle>
+  </p:txStyles>
 </p:sldMaster>
 </file>
 
 <file path=ppt/slides/slide1.xml><?xml version="1.0" encoding="utf-8"?>
-<p:sld xmlns:a="http://schemas.openxmlformats.org/drawingml/2006/main" xmlns:p="http://schemas.openxmlformats.org/presentationml/2006/main" xmlns:r="http://schemas.openxmlformats.org/officeDocument/2006/relationships" xmlns:p14="http://schemas.microsoft.com/office/powerpoint/2010/main" xmlns:p15="http://schemas.microsoft.com/office/powerpoint/2012/main" xmlns:mc="http://schemas.openxmlformats.org/markup-compatibility/2006">
+<p:sld xmlns:a="http://schemas.openxmlformats.org/drawingml/2006/main" xmlns:r="http://schemas.openxmlformats.org/officeDocument/2006/relationships" xmlns:p="http://schemas.openxmlformats.org/presentationml/2006/main">
   <p:cSld>
     <p:spTree>
       <p:nvGrpSpPr>
@@ -3579,9 +4303,10 @@
           <a:fontRef idx="minor"/>
         </p:style>
         <p:txBody>
-          <a:bodyPr lIns="90000" rIns="90000" tIns="45000" bIns="45000" anchor="ctr">
+          <a:bodyPr lIns="90000" tIns="45000" rIns="90000" bIns="45000" anchor="ctr">
             <a:noAutofit/>
           </a:bodyPr>
+          <a:lstStyle/>
           <a:p>
             <a:pPr algn="ctr">
               <a:lnSpc>
@@ -3589,26 +4314,16 @@
               </a:lnSpc>
             </a:pPr>
             <a:r>
-              <a:rPr b="0" lang="en-US" sz="1800" spc="-1" strike="noStrike">
+              <a:rPr lang="en-US" sz="1800" b="0" strike="noStrike" spc="-1">
                 <a:solidFill>
-                  <a:srgbClr val="ffffff"/>
+                  <a:srgbClr val="FFFFFF"/>
                 </a:solidFill>
                 <a:latin typeface="Calibri"/>
                 <a:ea typeface="DejaVu Sans"/>
               </a:rPr>
-              <a:t>XML</a:t>
+              <a:t>XML解析的四種方式</a:t>
             </a:r>
-            <a:r>
-              <a:rPr b="0" lang="en-US" sz="1800" spc="-1" strike="noStrike">
-                <a:solidFill>
-                  <a:srgbClr val="ffffff"/>
-                </a:solidFill>
-                <a:latin typeface="Calibri"/>
-                <a:ea typeface="DejaVu Sans"/>
-              </a:rPr>
-              <a:t>解析的四種方式</a:t>
-            </a:r>
-            <a:endParaRPr b="0" lang="en-US" sz="1800" spc="-1" strike="noStrike">
+            <a:endParaRPr lang="en-US" sz="1800" b="0" strike="noStrike" spc="-1">
               <a:latin typeface="DejaVu Sans"/>
             </a:endParaRPr>
           </a:p>
@@ -3616,11 +4331,14 @@
       </p:sp>
     </p:spTree>
   </p:cSld>
-  <mc:AlternateContent>
+  <p:clrMapOvr>
+    <a:masterClrMapping/>
+  </p:clrMapOvr>
+  <mc:AlternateContent xmlns:mc="http://schemas.openxmlformats.org/markup-compatibility/2006" xmlns:p14="http://schemas.microsoft.com/office/powerpoint/2010/main">
     <mc:Choice Requires="p14">
       <p:transition spd="slow" p14:dur="2000"/>
     </mc:Choice>
-    <mc:Fallback>
+    <mc:Fallback xmlns:p15="http://schemas.microsoft.com/office/powerpoint/2012/main" xmlns="">
       <p:transition spd="slow"/>
     </mc:Fallback>
   </mc:AlternateContent>
@@ -3632,14 +4350,14 @@
             <p:seq>
               <p:cTn id="2" dur="indefinite" nodeType="mainSeq"/>
               <p:prevCondLst>
-                <p:cond delay="0" evt="onPrev">
+                <p:cond evt="onPrev" delay="0">
                   <p:tgtEl>
                     <p:sldTgt/>
                   </p:tgtEl>
                 </p:cond>
               </p:prevCondLst>
               <p:nextCondLst>
-                <p:cond delay="0" evt="onNext">
+                <p:cond evt="onNext" delay="0">
                   <p:tgtEl>
                     <p:sldTgt/>
                   </p:tgtEl>
@@ -3655,7 +4373,7 @@
 </file>
 
 <file path=ppt/slides/slide2.xml><?xml version="1.0" encoding="utf-8"?>
-<p:sld xmlns:a="http://schemas.openxmlformats.org/drawingml/2006/main" xmlns:p="http://schemas.openxmlformats.org/presentationml/2006/main" xmlns:r="http://schemas.openxmlformats.org/officeDocument/2006/relationships" xmlns:p14="http://schemas.microsoft.com/office/powerpoint/2010/main" xmlns:p15="http://schemas.microsoft.com/office/powerpoint/2012/main" xmlns:mc="http://schemas.openxmlformats.org/markup-compatibility/2006">
+<p:sld xmlns:a="http://schemas.openxmlformats.org/drawingml/2006/main" xmlns:r="http://schemas.openxmlformats.org/officeDocument/2006/relationships" xmlns:p="http://schemas.openxmlformats.org/presentationml/2006/main">
   <p:cSld>
     <p:spTree>
       <p:nvGrpSpPr>
@@ -3691,15 +4409,22 @@
           </a:ln>
         </p:spPr>
         <p:style>
-          <a:lnRef idx="0"/>
-          <a:fillRef idx="0"/>
-          <a:effectRef idx="0"/>
+          <a:lnRef idx="0">
+            <a:scrgbClr r="0" g="0" b="0"/>
+          </a:lnRef>
+          <a:fillRef idx="0">
+            <a:scrgbClr r="0" g="0" b="0"/>
+          </a:fillRef>
+          <a:effectRef idx="0">
+            <a:scrgbClr r="0" g="0" b="0"/>
+          </a:effectRef>
           <a:fontRef idx="minor"/>
         </p:style>
         <p:txBody>
-          <a:bodyPr lIns="90000" rIns="90000" tIns="45000" bIns="45000">
+          <a:bodyPr lIns="90000" tIns="45000" rIns="90000" bIns="45000">
             <a:spAutoFit/>
           </a:bodyPr>
+          <a:lstStyle/>
           <a:p>
             <a:pPr>
               <a:lnSpc>
@@ -3707,7 +4432,7 @@
               </a:lnSpc>
             </a:pPr>
             <a:r>
-              <a:rPr b="0" lang="en-US" sz="1800" spc="-1" strike="noStrike">
+              <a:rPr lang="en-US" sz="1800" b="0" strike="noStrike" spc="-1">
                 <a:solidFill>
                   <a:srgbClr val="000000"/>
                 </a:solidFill>
@@ -3716,7 +4441,7 @@
               </a:rPr>
               <a:t>XML Parser Study Website:</a:t>
             </a:r>
-            <a:endParaRPr b="0" lang="en-US" sz="1800" spc="-1" strike="noStrike">
+            <a:endParaRPr lang="en-US" sz="1800" b="0" strike="noStrike" spc="-1">
               <a:latin typeface="DejaVu Sans"/>
             </a:endParaRPr>
           </a:p>
@@ -3727,7 +4452,7 @@
               </a:lnSpc>
             </a:pPr>
             <a:r>
-              <a:rPr b="0" lang="en-US" sz="1800" spc="-1" strike="noStrike">
+              <a:rPr lang="en-US" sz="1800" b="0" strike="noStrike" spc="-1">
                 <a:solidFill>
                   <a:srgbClr val="000000"/>
                 </a:solidFill>
@@ -3737,18 +4462,18 @@
               <a:t>      </a:t>
             </a:r>
             <a:r>
-              <a:rPr b="0" lang="en-US" sz="1800" spc="-1" strike="noStrike" u="sng">
+              <a:rPr lang="en-US" sz="1800" b="0" u="sng" strike="noStrike" spc="-1">
                 <a:solidFill>
-                  <a:srgbClr val="0563c1"/>
+                  <a:srgbClr val="0563C1"/>
                 </a:solidFill>
                 <a:uFillTx/>
                 <a:latin typeface="DejaVu Sans"/>
                 <a:ea typeface="DejaVu Sans"/>
-                <a:hlinkClick r:id="rId1"/>
+                <a:hlinkClick r:id="rId2"/>
               </a:rPr>
               <a:t>Xml_Parser</a:t>
             </a:r>
-            <a:endParaRPr b="0" lang="en-US" sz="1800" spc="-1" strike="noStrike">
+            <a:endParaRPr lang="en-US" sz="1800" b="0" strike="noStrike" spc="-1">
               <a:latin typeface="DejaVu Sans"/>
             </a:endParaRPr>
           </a:p>
@@ -3759,7 +4484,7 @@
               </a:lnSpc>
             </a:pPr>
             <a:r>
-              <a:rPr b="0" lang="en-US" sz="1800" spc="-1" strike="noStrike">
+              <a:rPr lang="en-US" sz="1800" b="0" strike="noStrike" spc="-1">
                 <a:solidFill>
                   <a:srgbClr val="000000"/>
                 </a:solidFill>
@@ -3769,18 +4494,18 @@
               <a:t>      </a:t>
             </a:r>
             <a:r>
-              <a:rPr b="0" lang="en-US" sz="1800" spc="-1" strike="noStrike" u="sng">
+              <a:rPr lang="en-US" sz="1800" b="0" u="sng" strike="noStrike" spc="-1">
                 <a:solidFill>
-                  <a:srgbClr val="0563c1"/>
+                  <a:srgbClr val="0563C1"/>
                 </a:solidFill>
                 <a:uFillTx/>
                 <a:latin typeface="DejaVu Sans"/>
                 <a:ea typeface="DejaVu Sans"/>
-                <a:hlinkClick r:id="rId2"/>
+                <a:hlinkClick r:id="rId3"/>
               </a:rPr>
               <a:t>Xml_Parser2</a:t>
             </a:r>
-            <a:endParaRPr b="0" lang="en-US" sz="1800" spc="-1" strike="noStrike">
+            <a:endParaRPr lang="en-US" sz="1800" b="0" strike="noStrike" spc="-1">
               <a:latin typeface="DejaVu Sans"/>
             </a:endParaRPr>
           </a:p>
@@ -3791,7 +4516,7 @@
               </a:lnSpc>
             </a:pPr>
             <a:r>
-              <a:rPr b="0" lang="en-US" sz="1800" spc="-1" strike="noStrike">
+              <a:rPr lang="en-US" sz="1800" b="0" strike="noStrike" spc="-1">
                 <a:solidFill>
                   <a:srgbClr val="000000"/>
                 </a:solidFill>
@@ -3801,18 +4526,18 @@
               <a:t>      </a:t>
             </a:r>
             <a:r>
-              <a:rPr b="0" lang="en-US" sz="1800" spc="-1" strike="noStrike" u="sng">
+              <a:rPr lang="en-US" sz="1800" b="0" u="sng" strike="noStrike" spc="-1">
                 <a:solidFill>
-                  <a:srgbClr val="0563c1"/>
+                  <a:srgbClr val="0563C1"/>
                 </a:solidFill>
                 <a:uFillTx/>
                 <a:latin typeface="DejaVu Sans"/>
                 <a:ea typeface="DejaVu Sans"/>
-                <a:hlinkClick r:id="rId3"/>
+                <a:hlinkClick r:id="rId4"/>
               </a:rPr>
               <a:t>Xml_Parser3</a:t>
             </a:r>
-            <a:endParaRPr b="0" lang="en-US" sz="1800" spc="-1" strike="noStrike">
+            <a:endParaRPr lang="en-US" sz="1800" b="0" strike="noStrike" spc="-1">
               <a:latin typeface="DejaVu Sans"/>
             </a:endParaRPr>
           </a:p>
@@ -3823,7 +4548,7 @@
               </a:lnSpc>
             </a:pPr>
             <a:r>
-              <a:rPr b="0" lang="en-US" sz="1800" spc="-1" strike="noStrike">
+              <a:rPr lang="en-US" sz="1800" b="0" strike="noStrike" spc="-1">
                 <a:solidFill>
                   <a:srgbClr val="000000"/>
                 </a:solidFill>
@@ -3833,19 +4558,19 @@
               <a:t>      </a:t>
             </a:r>
             <a:r>
-              <a:rPr b="0" lang="en-US" sz="1800" spc="-1" strike="noStrike" u="sng">
+              <a:rPr lang="en-US" sz="1800" b="0" u="sng" strike="noStrike" spc="-1">
                 <a:solidFill>
-                  <a:srgbClr val="0563c1"/>
+                  <a:srgbClr val="0563C1"/>
                 </a:solidFill>
                 <a:uFillTx/>
                 <a:latin typeface="DejaVu Sans"/>
                 <a:ea typeface="DejaVu Sans"/>
-                <a:hlinkClick r:id="rId4"/>
+                <a:hlinkClick r:id="rId5"/>
               </a:rPr>
               <a:t>Xml_Parser4</a:t>
             </a:r>
             <a:r>
-              <a:rPr b="0" lang="en-US" sz="1800" spc="-1" strike="noStrike">
+              <a:rPr lang="en-US" sz="1800" b="0" strike="noStrike" spc="-1">
                 <a:solidFill>
                   <a:srgbClr val="000000"/>
                 </a:solidFill>
@@ -3854,7 +4579,7 @@
               </a:rPr>
               <a:t>	</a:t>
             </a:r>
-            <a:endParaRPr b="0" lang="en-US" sz="1800" spc="-1" strike="noStrike">
+            <a:endParaRPr lang="en-US" sz="1800" b="0" strike="noStrike" spc="-1">
               <a:latin typeface="DejaVu Sans"/>
             </a:endParaRPr>
           </a:p>
@@ -3862,30 +4587,33 @@
       </p:sp>
     </p:spTree>
   </p:cSld>
-  <mc:AlternateContent>
+  <p:clrMapOvr>
+    <a:masterClrMapping/>
+  </p:clrMapOvr>
+  <mc:AlternateContent xmlns:mc="http://schemas.openxmlformats.org/markup-compatibility/2006" xmlns:p14="http://schemas.microsoft.com/office/powerpoint/2010/main">
     <mc:Choice Requires="p14">
       <p:transition spd="slow" p14:dur="2000"/>
     </mc:Choice>
-    <mc:Fallback>
+    <mc:Fallback xmlns:p15="http://schemas.microsoft.com/office/powerpoint/2012/main" xmlns="">
       <p:transition spd="slow"/>
     </mc:Fallback>
   </mc:AlternateContent>
   <p:timing>
     <p:tnLst>
       <p:par>
-        <p:cTn id="3" dur="indefinite" restart="never" nodeType="tmRoot">
+        <p:cTn id="1" dur="indefinite" restart="never" nodeType="tmRoot">
           <p:childTnLst>
             <p:seq>
-              <p:cTn id="4" dur="indefinite" nodeType="mainSeq"/>
+              <p:cTn id="2" dur="indefinite" nodeType="mainSeq"/>
               <p:prevCondLst>
-                <p:cond delay="0" evt="onPrev">
+                <p:cond evt="onPrev" delay="0">
                   <p:tgtEl>
                     <p:sldTgt/>
                   </p:tgtEl>
                 </p:cond>
               </p:prevCondLst>
               <p:nextCondLst>
-                <p:cond delay="0" evt="onNext">
+                <p:cond evt="onNext" delay="0">
                   <p:tgtEl>
                     <p:sldTgt/>
                   </p:tgtEl>
@@ -3901,7 +4629,7 @@
 </file>
 
 <file path=ppt/slides/slide3.xml><?xml version="1.0" encoding="utf-8"?>
-<p:sld xmlns:a="http://schemas.openxmlformats.org/drawingml/2006/main" xmlns:p="http://schemas.openxmlformats.org/presentationml/2006/main" xmlns:r="http://schemas.openxmlformats.org/officeDocument/2006/relationships" xmlns:p14="http://schemas.microsoft.com/office/powerpoint/2010/main" xmlns:p15="http://schemas.microsoft.com/office/powerpoint/2012/main" xmlns:mc="http://schemas.openxmlformats.org/markup-compatibility/2006">
+<p:sld xmlns:a="http://schemas.openxmlformats.org/drawingml/2006/main" xmlns:r="http://schemas.openxmlformats.org/officeDocument/2006/relationships" xmlns:p="http://schemas.openxmlformats.org/presentationml/2006/main">
   <p:cSld>
     <p:spTree>
       <p:nvGrpSpPr>
@@ -3937,15 +4665,22 @@
           </a:ln>
         </p:spPr>
         <p:style>
-          <a:lnRef idx="0"/>
-          <a:fillRef idx="0"/>
-          <a:effectRef idx="0"/>
+          <a:lnRef idx="0">
+            <a:scrgbClr r="0" g="0" b="0"/>
+          </a:lnRef>
+          <a:fillRef idx="0">
+            <a:scrgbClr r="0" g="0" b="0"/>
+          </a:fillRef>
+          <a:effectRef idx="0">
+            <a:scrgbClr r="0" g="0" b="0"/>
+          </a:effectRef>
           <a:fontRef idx="minor"/>
         </p:style>
         <p:txBody>
-          <a:bodyPr wrap="none" lIns="90000" rIns="90000" tIns="45000" bIns="45000">
+          <a:bodyPr wrap="none" lIns="90000" tIns="45000" rIns="90000" bIns="45000">
             <a:spAutoFit/>
           </a:bodyPr>
+          <a:lstStyle/>
           <a:p>
             <a:pPr>
               <a:lnSpc>
@@ -3953,26 +4688,16 @@
               </a:lnSpc>
             </a:pPr>
             <a:r>
-              <a:rPr b="0" lang="en-US" sz="1800" spc="-1" strike="noStrike">
+              <a:rPr lang="en-US" sz="1800" b="0" strike="noStrike" spc="-1">
                 <a:solidFill>
                   <a:srgbClr val="000000"/>
                 </a:solidFill>
                 <a:latin typeface="Arial"/>
                 <a:ea typeface="DejaVu Sans"/>
               </a:rPr>
-              <a:t>HashCode</a:t>
+              <a:t>HashCode的讲解</a:t>
             </a:r>
-            <a:r>
-              <a:rPr b="0" lang="en-US" sz="1800" spc="-1" strike="noStrike">
-                <a:solidFill>
-                  <a:srgbClr val="000000"/>
-                </a:solidFill>
-                <a:latin typeface="Arial"/>
-                <a:ea typeface="DejaVu Sans"/>
-              </a:rPr>
-              <a:t>的讲解</a:t>
-            </a:r>
-            <a:endParaRPr b="0" lang="en-US" sz="1800" spc="-1" strike="noStrike">
+            <a:endParaRPr lang="en-US" sz="1800" b="0" strike="noStrike" spc="-1">
               <a:latin typeface="DejaVu Sans"/>
             </a:endParaRPr>
           </a:p>
@@ -3982,7 +4707,7 @@
                 <a:spcPct val="100000"/>
               </a:lnSpc>
             </a:pPr>
-            <a:endParaRPr b="0" lang="en-US" sz="1800" spc="-1" strike="noStrike">
+            <a:endParaRPr lang="en-US" sz="1800" b="0" strike="noStrike" spc="-1">
               <a:latin typeface="DejaVu Sans"/>
             </a:endParaRPr>
           </a:p>
@@ -3993,21 +4718,21 @@
               </a:lnSpc>
             </a:pPr>
             <a:r>
-              <a:rPr b="0" lang="en-US" sz="1800" spc="-1" strike="noStrike" u="sng">
+              <a:rPr lang="en-US" sz="1800" b="0" u="sng" strike="noStrike" spc="-1">
                 <a:solidFill>
-                  <a:srgbClr val="0563c1"/>
+                  <a:srgbClr val="0563C1"/>
                 </a:solidFill>
                 <a:uFillTx/>
                 <a:latin typeface="Arial"/>
                 <a:ea typeface="DejaVu Sans"/>
-                <a:hlinkClick r:id="rId1"/>
+                <a:hlinkClick r:id="rId2"/>
               </a:rPr>
               <a:t>       Java</a:t>
             </a:r>
             <a:r>
-              <a:rPr b="0" lang="en-US" sz="1800" spc="-1" strike="noStrike" u="sng">
+              <a:rPr lang="en-US" sz="1800" b="0" u="sng" strike="noStrike" spc="-1">
                 <a:solidFill>
-                  <a:srgbClr val="0563c1"/>
+                  <a:srgbClr val="0563C1"/>
                 </a:solidFill>
                 <a:uFillTx/>
                 <a:latin typeface="Arial"/>
@@ -4017,30 +4742,30 @@
               <a:t>集合源码系列之</a:t>
             </a:r>
             <a:r>
-              <a:rPr b="0" lang="en-US" sz="1800" spc="-1" strike="noStrike" u="sng">
+              <a:rPr lang="en-US" sz="1800" b="0" u="sng" strike="noStrike" spc="-1">
                 <a:solidFill>
-                  <a:srgbClr val="0563c1"/>
+                  <a:srgbClr val="0563C1"/>
                 </a:solidFill>
                 <a:uFillTx/>
                 <a:latin typeface="Arial"/>
                 <a:ea typeface="DejaVu Sans"/>
-                <a:hlinkClick r:id="rId3"/>
+                <a:hlinkClick r:id="rId2"/>
               </a:rPr>
               <a:t>HashMap</a:t>
             </a:r>
             <a:r>
-              <a:rPr b="0" lang="en-US" sz="1800" spc="-1" strike="noStrike" u="sng">
+              <a:rPr lang="en-US" sz="1800" b="0" u="sng" strike="noStrike" spc="-1">
                 <a:solidFill>
-                  <a:srgbClr val="0563c1"/>
+                  <a:srgbClr val="0563C1"/>
                 </a:solidFill>
                 <a:uFillTx/>
                 <a:latin typeface="Arial"/>
                 <a:ea typeface="DejaVu Sans"/>
-                <a:hlinkClick r:id="rId4"/>
+                <a:hlinkClick r:id="rId2"/>
               </a:rPr>
               <a:t>添加元素的流程</a:t>
             </a:r>
-            <a:endParaRPr b="0" lang="en-US" sz="1800" spc="-1" strike="noStrike">
+            <a:endParaRPr lang="en-US" sz="1800" b="0" strike="noStrike" spc="-1">
               <a:latin typeface="DejaVu Sans"/>
             </a:endParaRPr>
           </a:p>
@@ -4051,7 +4776,7 @@
               </a:lnSpc>
             </a:pPr>
             <a:r>
-              <a:rPr b="0" lang="en-US" sz="1800" spc="-1" strike="noStrike">
+              <a:rPr lang="en-US" sz="1800" b="0" strike="noStrike" spc="-1">
                 <a:solidFill>
                   <a:srgbClr val="000000"/>
                 </a:solidFill>
@@ -4061,126 +4786,126 @@
               <a:t>       </a:t>
             </a:r>
             <a:r>
-              <a:rPr b="0" lang="en-US" sz="1800" spc="-1" strike="noStrike" u="sng">
+              <a:rPr lang="en-US" sz="1800" b="0" u="sng" strike="noStrike" spc="-1">
                 <a:solidFill>
-                  <a:srgbClr val="0563c1"/>
+                  <a:srgbClr val="0563C1"/>
                 </a:solidFill>
                 <a:uFillTx/>
                 <a:latin typeface="Arial"/>
                 <a:ea typeface="DejaVu Sans"/>
-                <a:hlinkClick r:id="rId5"/>
+                <a:hlinkClick r:id="rId3"/>
               </a:rPr>
               <a:t>Java</a:t>
             </a:r>
             <a:r>
-              <a:rPr b="0" lang="en-US" sz="1800" spc="-1" strike="noStrike" u="sng">
+              <a:rPr lang="en-US" sz="1800" b="0" u="sng" strike="noStrike" spc="-1">
                 <a:solidFill>
-                  <a:srgbClr val="0563c1"/>
+                  <a:srgbClr val="0563C1"/>
                 </a:solidFill>
                 <a:uFillTx/>
                 <a:latin typeface="Arial"/>
                 <a:ea typeface="DejaVu Sans"/>
-                <a:hlinkClick r:id="rId6"/>
+                <a:hlinkClick r:id="rId3"/>
               </a:rPr>
               <a:t>基础篇：什么是</a:t>
             </a:r>
             <a:r>
-              <a:rPr b="0" lang="en-US" sz="1800" spc="-1" strike="noStrike" u="sng">
+              <a:rPr lang="en-US" sz="1800" b="0" u="sng" strike="noStrike" spc="-1">
                 <a:solidFill>
-                  <a:srgbClr val="0563c1"/>
+                  <a:srgbClr val="0563C1"/>
                 </a:solidFill>
                 <a:uFillTx/>
                 <a:latin typeface="Arial"/>
                 <a:ea typeface="DejaVu Sans"/>
-                <a:hlinkClick r:id="rId7"/>
+                <a:hlinkClick r:id="rId3"/>
               </a:rPr>
               <a:t>hashCode</a:t>
             </a:r>
             <a:r>
-              <a:rPr b="0" lang="en-US" sz="1800" spc="-1" strike="noStrike" u="sng">
+              <a:rPr lang="en-US" sz="1800" b="0" u="sng" strike="noStrike" spc="-1">
                 <a:solidFill>
-                  <a:srgbClr val="0563c1"/>
+                  <a:srgbClr val="0563C1"/>
                 </a:solidFill>
                 <a:uFillTx/>
                 <a:latin typeface="Arial"/>
                 <a:ea typeface="DejaVu Sans"/>
-                <a:hlinkClick r:id="rId8"/>
+                <a:hlinkClick r:id="rId3"/>
               </a:rPr>
               <a:t> </a:t>
             </a:r>
             <a:r>
-              <a:rPr b="0" lang="en-US" sz="1800" spc="-1" strike="noStrike" u="sng">
+              <a:rPr lang="en-US" sz="1800" b="0" u="sng" strike="noStrike" spc="-1">
                 <a:solidFill>
-                  <a:srgbClr val="0563c1"/>
+                  <a:srgbClr val="0563C1"/>
                 </a:solidFill>
                 <a:uFillTx/>
                 <a:latin typeface="Arial"/>
                 <a:ea typeface="DejaVu Sans"/>
-                <a:hlinkClick r:id="rId9"/>
+                <a:hlinkClick r:id="rId3"/>
               </a:rPr>
               <a:t>以及 </a:t>
             </a:r>
             <a:r>
-              <a:rPr b="0" lang="en-US" sz="1800" spc="-1" strike="noStrike" u="sng">
+              <a:rPr lang="en-US" sz="1800" b="0" u="sng" strike="noStrike" spc="-1">
                 <a:solidFill>
-                  <a:srgbClr val="0563c1"/>
+                  <a:srgbClr val="0563C1"/>
                 </a:solidFill>
                 <a:uFillTx/>
                 <a:latin typeface="Arial"/>
                 <a:ea typeface="DejaVu Sans"/>
-                <a:hlinkClick r:id="rId10"/>
+                <a:hlinkClick r:id="rId3"/>
               </a:rPr>
               <a:t>hashCode</a:t>
             </a:r>
             <a:r>
-              <a:rPr b="0" lang="en-US" sz="1800" spc="-1" strike="noStrike" u="sng">
+              <a:rPr lang="en-US" sz="1800" b="0" u="sng" strike="noStrike" spc="-1">
                 <a:solidFill>
-                  <a:srgbClr val="0563c1"/>
+                  <a:srgbClr val="0563C1"/>
                 </a:solidFill>
                 <a:uFillTx/>
                 <a:latin typeface="Arial"/>
                 <a:ea typeface="DejaVu Sans"/>
-                <a:hlinkClick r:id="rId11"/>
+                <a:hlinkClick r:id="rId3"/>
               </a:rPr>
               <a:t>()</a:t>
             </a:r>
             <a:r>
-              <a:rPr b="0" lang="en-US" sz="1800" spc="-1" strike="noStrike" u="sng">
+              <a:rPr lang="en-US" sz="1800" b="0" u="sng" strike="noStrike" spc="-1">
                 <a:solidFill>
-                  <a:srgbClr val="0563c1"/>
+                  <a:srgbClr val="0563C1"/>
                 </a:solidFill>
                 <a:uFillTx/>
                 <a:latin typeface="Arial"/>
                 <a:ea typeface="DejaVu Sans"/>
-                <a:hlinkClick r:id="rId12"/>
+                <a:hlinkClick r:id="rId3"/>
               </a:rPr>
               <a:t>与</a:t>
             </a:r>
             <a:r>
-              <a:rPr b="0" lang="en-US" sz="1800" spc="-1" strike="noStrike" u="sng">
+              <a:rPr lang="en-US" sz="1800" b="0" u="sng" strike="noStrike" spc="-1">
                 <a:solidFill>
-                  <a:srgbClr val="0563c1"/>
+                  <a:srgbClr val="0563C1"/>
                 </a:solidFill>
                 <a:uFillTx/>
                 <a:latin typeface="Arial"/>
                 <a:ea typeface="DejaVu Sans"/>
-                <a:hlinkClick r:id="rId13"/>
+                <a:hlinkClick r:id="rId3"/>
               </a:rPr>
               <a:t>equals()</a:t>
             </a:r>
             <a:r>
-              <a:rPr b="0" lang="en-US" sz="1800" spc="-1" strike="noStrike" u="sng">
+              <a:rPr lang="en-US" sz="1800" b="0" u="sng" strike="noStrike" spc="-1">
                 <a:solidFill>
-                  <a:srgbClr val="0563c1"/>
+                  <a:srgbClr val="0563C1"/>
                 </a:solidFill>
                 <a:uFillTx/>
                 <a:latin typeface="Arial"/>
                 <a:ea typeface="DejaVu Sans"/>
-                <a:hlinkClick r:id="rId14"/>
+                <a:hlinkClick r:id="rId3"/>
               </a:rPr>
               <a:t>的联系</a:t>
             </a:r>
-            <a:endParaRPr b="0" lang="en-US" sz="1800" spc="-1" strike="noStrike">
+            <a:endParaRPr lang="en-US" sz="1800" b="0" strike="noStrike" spc="-1">
               <a:latin typeface="DejaVu Sans"/>
             </a:endParaRPr>
           </a:p>
@@ -4191,7 +4916,7 @@
               </a:lnSpc>
             </a:pPr>
             <a:r>
-              <a:rPr b="0" lang="en-US" sz="1800" spc="-1" strike="noStrike">
+              <a:rPr lang="en-US" sz="1800" b="0" strike="noStrike" spc="-1">
                 <a:solidFill>
                   <a:srgbClr val="000000"/>
                 </a:solidFill>
@@ -4201,54 +4926,54 @@
               <a:t>       </a:t>
             </a:r>
             <a:r>
-              <a:rPr b="0" lang="en-US" sz="1800" spc="-1" strike="noStrike" u="sng">
+              <a:rPr lang="en-US" sz="1800" b="0" u="sng" strike="noStrike" spc="-1">
                 <a:solidFill>
-                  <a:srgbClr val="0563c1"/>
+                  <a:srgbClr val="0563C1"/>
                 </a:solidFill>
                 <a:uFillTx/>
                 <a:latin typeface="Arial"/>
                 <a:ea typeface="DejaVu Sans"/>
-                <a:hlinkClick r:id="rId15"/>
+                <a:hlinkClick r:id="rId4"/>
               </a:rPr>
               <a:t>Java</a:t>
             </a:r>
             <a:r>
-              <a:rPr b="0" lang="en-US" sz="1800" spc="-1" strike="noStrike" u="sng">
+              <a:rPr lang="en-US" sz="1800" b="0" u="sng" strike="noStrike" spc="-1">
                 <a:solidFill>
-                  <a:srgbClr val="0563c1"/>
+                  <a:srgbClr val="0563C1"/>
                 </a:solidFill>
                 <a:uFillTx/>
                 <a:latin typeface="Arial"/>
                 <a:ea typeface="DejaVu Sans"/>
-                <a:hlinkClick r:id="rId16"/>
+                <a:hlinkClick r:id="rId4"/>
               </a:rPr>
               <a:t>基础之</a:t>
             </a:r>
             <a:r>
-              <a:rPr b="0" lang="en-US" sz="1800" spc="-1" strike="noStrike" u="sng">
+              <a:rPr lang="en-US" sz="1800" b="0" u="sng" strike="noStrike" spc="-1">
                 <a:solidFill>
-                  <a:srgbClr val="0563c1"/>
+                  <a:srgbClr val="0563C1"/>
                 </a:solidFill>
                 <a:uFillTx/>
                 <a:latin typeface="Arial"/>
                 <a:ea typeface="DejaVu Sans"/>
-                <a:hlinkClick r:id="rId17"/>
+                <a:hlinkClick r:id="rId4"/>
               </a:rPr>
               <a:t>hashcode</a:t>
             </a:r>
             <a:r>
-              <a:rPr b="0" lang="en-US" sz="1800" spc="-1" strike="noStrike" u="sng">
+              <a:rPr lang="en-US" sz="1800" b="0" u="sng" strike="noStrike" spc="-1">
                 <a:solidFill>
-                  <a:srgbClr val="0563c1"/>
+                  <a:srgbClr val="0563C1"/>
                 </a:solidFill>
                 <a:uFillTx/>
                 <a:latin typeface="Arial"/>
                 <a:ea typeface="DejaVu Sans"/>
-                <a:hlinkClick r:id="rId18"/>
+                <a:hlinkClick r:id="rId4"/>
               </a:rPr>
               <a:t>剖析</a:t>
             </a:r>
-            <a:endParaRPr b="0" lang="en-US" sz="1800" spc="-1" strike="noStrike">
+            <a:endParaRPr lang="en-US" sz="1800" b="0" strike="noStrike" spc="-1">
               <a:latin typeface="DejaVu Sans"/>
             </a:endParaRPr>
           </a:p>
@@ -4259,7 +4984,7 @@
               </a:lnSpc>
             </a:pPr>
             <a:r>
-              <a:rPr b="0" lang="en-US" sz="1800" spc="-1" strike="noStrike">
+              <a:rPr lang="en-US" sz="1800" b="0" strike="noStrike" spc="-1">
                 <a:solidFill>
                   <a:srgbClr val="000000"/>
                 </a:solidFill>
@@ -4269,54 +4994,54 @@
               <a:t>       </a:t>
             </a:r>
             <a:r>
-              <a:rPr b="0" lang="en-US" sz="1800" spc="-1" strike="noStrike" u="sng">
+              <a:rPr lang="en-US" sz="1800" b="0" u="sng" strike="noStrike" spc="-1">
                 <a:solidFill>
-                  <a:srgbClr val="0563c1"/>
+                  <a:srgbClr val="0563C1"/>
                 </a:solidFill>
                 <a:uFillTx/>
                 <a:latin typeface="Arial"/>
                 <a:ea typeface="DejaVu Sans"/>
-                <a:hlinkClick r:id="rId19"/>
+                <a:hlinkClick r:id="rId5"/>
               </a:rPr>
               <a:t>深入理解 </a:t>
             </a:r>
             <a:r>
-              <a:rPr b="0" lang="en-US" sz="1800" spc="-1" strike="noStrike" u="sng">
+              <a:rPr lang="en-US" sz="1800" b="0" u="sng" strike="noStrike" spc="-1">
                 <a:solidFill>
-                  <a:srgbClr val="0563c1"/>
+                  <a:srgbClr val="0563C1"/>
                 </a:solidFill>
                 <a:uFillTx/>
                 <a:latin typeface="Arial"/>
                 <a:ea typeface="DejaVu Sans"/>
-                <a:hlinkClick r:id="rId20"/>
+                <a:hlinkClick r:id="rId5"/>
               </a:rPr>
               <a:t>Java </a:t>
             </a:r>
             <a:r>
-              <a:rPr b="0" lang="en-US" sz="1800" spc="-1" strike="noStrike" u="sng">
+              <a:rPr lang="en-US" sz="1800" b="0" u="sng" strike="noStrike" spc="-1">
                 <a:solidFill>
-                  <a:srgbClr val="0563c1"/>
+                  <a:srgbClr val="0563C1"/>
                 </a:solidFill>
                 <a:uFillTx/>
                 <a:latin typeface="Arial"/>
                 <a:ea typeface="DejaVu Sans"/>
-                <a:hlinkClick r:id="rId21"/>
+                <a:hlinkClick r:id="rId5"/>
               </a:rPr>
               <a:t>中的 </a:t>
             </a:r>
             <a:r>
-              <a:rPr b="0" lang="en-US" sz="1800" spc="-1" strike="noStrike" u="sng">
+              <a:rPr lang="en-US" sz="1800" b="0" u="sng" strike="noStrike" spc="-1">
                 <a:solidFill>
-                  <a:srgbClr val="0563c1"/>
+                  <a:srgbClr val="0563C1"/>
                 </a:solidFill>
                 <a:uFillTx/>
                 <a:latin typeface="Arial"/>
                 <a:ea typeface="DejaVu Sans"/>
-                <a:hlinkClick r:id="rId22"/>
+                <a:hlinkClick r:id="rId5"/>
               </a:rPr>
               <a:t>hashCode</a:t>
             </a:r>
-            <a:endParaRPr b="0" lang="en-US" sz="1800" spc="-1" strike="noStrike">
+            <a:endParaRPr lang="en-US" sz="1800" b="0" strike="noStrike" spc="-1">
               <a:latin typeface="DejaVu Sans"/>
             </a:endParaRPr>
           </a:p>
@@ -4324,30 +5049,33 @@
       </p:sp>
     </p:spTree>
   </p:cSld>
-  <mc:AlternateContent>
+  <p:clrMapOvr>
+    <a:masterClrMapping/>
+  </p:clrMapOvr>
+  <mc:AlternateContent xmlns:mc="http://schemas.openxmlformats.org/markup-compatibility/2006" xmlns:p14="http://schemas.microsoft.com/office/powerpoint/2010/main">
     <mc:Choice Requires="p14">
       <p:transition spd="slow" p14:dur="2000"/>
     </mc:Choice>
-    <mc:Fallback>
+    <mc:Fallback xmlns:p15="http://schemas.microsoft.com/office/powerpoint/2012/main" xmlns="">
       <p:transition spd="slow"/>
     </mc:Fallback>
   </mc:AlternateContent>
   <p:timing>
     <p:tnLst>
       <p:par>
-        <p:cTn id="5" dur="indefinite" restart="never" nodeType="tmRoot">
+        <p:cTn id="1" dur="indefinite" restart="never" nodeType="tmRoot">
           <p:childTnLst>
             <p:seq>
-              <p:cTn id="6" dur="indefinite" nodeType="mainSeq"/>
+              <p:cTn id="2" dur="indefinite" nodeType="mainSeq"/>
               <p:prevCondLst>
-                <p:cond delay="0" evt="onPrev">
+                <p:cond evt="onPrev" delay="0">
                   <p:tgtEl>
                     <p:sldTgt/>
                   </p:tgtEl>
                 </p:cond>
               </p:prevCondLst>
               <p:nextCondLst>
-                <p:cond delay="0" evt="onNext">
+                <p:cond evt="onNext" delay="0">
                   <p:tgtEl>
                     <p:sldTgt/>
                   </p:tgtEl>
@@ -4363,7 +5091,7 @@
 </file>
 
 <file path=ppt/slides/slide4.xml><?xml version="1.0" encoding="utf-8"?>
-<p:sld xmlns:a="http://schemas.openxmlformats.org/drawingml/2006/main" xmlns:p="http://schemas.openxmlformats.org/presentationml/2006/main" xmlns:r="http://schemas.openxmlformats.org/officeDocument/2006/relationships" xmlns:p14="http://schemas.microsoft.com/office/powerpoint/2010/main" xmlns:p15="http://schemas.microsoft.com/office/powerpoint/2012/main" xmlns:mc="http://schemas.openxmlformats.org/markup-compatibility/2006">
+<p:sld xmlns:a="http://schemas.openxmlformats.org/drawingml/2006/main" xmlns:r="http://schemas.openxmlformats.org/officeDocument/2006/relationships" xmlns:p="http://schemas.openxmlformats.org/presentationml/2006/main">
   <p:cSld>
     <p:spTree>
       <p:nvGrpSpPr>
@@ -4381,308 +5109,85 @@
       </p:grpSpPr>
       <p:sp>
         <p:nvSpPr>
-          <p:cNvPr id="79" name="CustomShape 1"/>
-          <p:cNvSpPr/>
+          <p:cNvPr id="4" name="文本框 3"/>
+          <p:cNvSpPr txBox="1"/>
           <p:nvPr/>
         </p:nvSpPr>
         <p:spPr>
           <a:xfrm>
-            <a:off x="267120" y="406440"/>
-            <a:ext cx="2143800" cy="1251000"/>
+            <a:off x="310718" y="230819"/>
+            <a:ext cx="2912079" cy="369332"/>
           </a:xfrm>
           <a:prstGeom prst="rect">
             <a:avLst/>
           </a:prstGeom>
           <a:noFill/>
-          <a:ln>
-            <a:noFill/>
-          </a:ln>
-        </p:spPr>
-        <p:style>
-          <a:lnRef idx="0"/>
-          <a:fillRef idx="0"/>
-          <a:effectRef idx="0"/>
-          <a:fontRef idx="minor"/>
-        </p:style>
-        <p:txBody>
-          <a:bodyPr wrap="none" lIns="90000" rIns="90000" tIns="45000" bIns="45000">
+        </p:spPr>
+        <p:txBody>
+          <a:bodyPr wrap="none" rtlCol="0">
             <a:spAutoFit/>
           </a:bodyPr>
-          <a:p>
-            <a:pPr>
-              <a:lnSpc>
-                <a:spcPct val="100000"/>
-              </a:lnSpc>
-            </a:pPr>
+          <a:lstStyle/>
+          <a:p>
             <a:r>
-              <a:rPr b="0" lang="en-US" sz="1800" spc="-1" strike="noStrike">
-                <a:solidFill>
-                  <a:srgbClr val="000000"/>
-                </a:solidFill>
-                <a:latin typeface="Arial"/>
-                <a:ea typeface="DejaVu Sans"/>
-              </a:rPr>
-              <a:t>紅黑樹</a:t>
+              <a:rPr lang="en-US" altLang="zh-CN" dirty="0" smtClean="0"/>
+              <a:t>Idea Tool Code Comments</a:t>
             </a:r>
-            <a:endParaRPr b="0" lang="en-US" sz="1800" spc="-1" strike="noStrike">
-              <a:latin typeface="DejaVu Sans"/>
-            </a:endParaRPr>
-          </a:p>
-          <a:p>
-            <a:pPr>
-              <a:lnSpc>
-                <a:spcPct val="100000"/>
-              </a:lnSpc>
-            </a:pPr>
-            <a:endParaRPr b="0" lang="en-US" sz="1800" spc="-1" strike="noStrike">
-              <a:latin typeface="DejaVu Sans"/>
-            </a:endParaRPr>
-          </a:p>
-          <a:p>
-            <a:pPr>
-              <a:lnSpc>
-                <a:spcPct val="100000"/>
-              </a:lnSpc>
-            </a:pPr>
+            <a:endParaRPr lang="zh-CN" altLang="en-US" dirty="0"/>
+          </a:p>
+        </p:txBody>
+      </p:sp>
+      <p:sp>
+        <p:nvSpPr>
+          <p:cNvPr id="5" name="文本框 4"/>
+          <p:cNvSpPr txBox="1"/>
+          <p:nvPr/>
+        </p:nvSpPr>
+        <p:spPr>
+          <a:xfrm>
+            <a:off x="1091953" y="1127464"/>
+            <a:ext cx="2710999" cy="646331"/>
+          </a:xfrm>
+          <a:prstGeom prst="rect">
+            <a:avLst/>
+          </a:prstGeom>
+          <a:noFill/>
+        </p:spPr>
+        <p:txBody>
+          <a:bodyPr wrap="none" rtlCol="0">
+            <a:spAutoFit/>
+          </a:bodyPr>
+          <a:lstStyle/>
+          <a:p>
             <a:r>
-              <a:rPr b="0" lang="en-US" sz="1800" spc="-1" strike="noStrike">
-                <a:solidFill>
-                  <a:srgbClr val="000000"/>
-                </a:solidFill>
-                <a:latin typeface="Arial"/>
-                <a:ea typeface="DejaVu Sans"/>
-              </a:rPr>
-              <a:t>	</a:t>
-            </a:r>
-            <a:r>
-              <a:rPr b="0" lang="en-US" sz="1800" spc="-1" strike="noStrike" u="sng">
-                <a:solidFill>
-                  <a:srgbClr val="0563c1"/>
-                </a:solidFill>
-                <a:uFillTx/>
-                <a:latin typeface="Arial"/>
-                <a:ea typeface="DejaVu Sans"/>
-                <a:hlinkClick r:id="rId1"/>
-              </a:rPr>
-              <a:t>紅黑樹</a:t>
-            </a:r>
-            <a:endParaRPr b="0" lang="en-US" sz="1800" spc="-1" strike="noStrike">
-              <a:latin typeface="DejaVu Sans"/>
-            </a:endParaRPr>
-          </a:p>
-          <a:p>
-            <a:pPr>
-              <a:lnSpc>
-                <a:spcPct val="100000"/>
-              </a:lnSpc>
-            </a:pPr>
-            <a:r>
-              <a:rPr b="0" lang="en-US" sz="1800" spc="-1" strike="noStrike">
-                <a:solidFill>
-                  <a:srgbClr val="000000"/>
-                </a:solidFill>
-                <a:latin typeface="Arial"/>
-                <a:ea typeface="DejaVu Sans"/>
-              </a:rPr>
-              <a:t>               </a:t>
-            </a:r>
-            <a:r>
-              <a:rPr b="0" lang="en-US" sz="1800" spc="-1" strike="noStrike" u="sng">
-                <a:solidFill>
-                  <a:srgbClr val="0563c1"/>
-                </a:solidFill>
-                <a:uFillTx/>
-                <a:latin typeface="Arial"/>
-                <a:ea typeface="DejaVu Sans"/>
+              <a:rPr lang="en-US" altLang="zh-CN" dirty="0" smtClean="0">
                 <a:hlinkClick r:id="rId2"/>
               </a:rPr>
-              <a:t>紅黑樹</a:t>
+              <a:t>Code Comment Setting</a:t>
             </a:r>
+            <a:endParaRPr lang="en-US" altLang="zh-CN" dirty="0" smtClean="0"/>
+          </a:p>
+          <a:p>
             <a:r>
-              <a:rPr b="0" lang="en-US" sz="1800" spc="-1" strike="noStrike" u="sng">
-                <a:solidFill>
-                  <a:srgbClr val="0563c1"/>
-                </a:solidFill>
-                <a:uFillTx/>
-                <a:latin typeface="Arial"/>
-                <a:ea typeface="DejaVu Sans"/>
+              <a:rPr lang="en-US" altLang="zh-CN" dirty="0" smtClean="0">
                 <a:hlinkClick r:id="rId3"/>
               </a:rPr>
-              <a:t>2</a:t>
+              <a:t>Code Comment Setting2</a:t>
             </a:r>
-            <a:endParaRPr b="0" lang="en-US" sz="1800" spc="-1" strike="noStrike">
-              <a:latin typeface="DejaVu Sans"/>
-            </a:endParaRPr>
+            <a:endParaRPr lang="zh-CN" altLang="en-US" dirty="0"/>
           </a:p>
         </p:txBody>
       </p:sp>
     </p:spTree>
+    <p:extLst>
+      <p:ext uri="{BB962C8B-B14F-4D97-AF65-F5344CB8AC3E}">
+        <p14:creationId xmlns:p14="http://schemas.microsoft.com/office/powerpoint/2010/main" val="1756308094"/>
+      </p:ext>
+    </p:extLst>
   </p:cSld>
-  <mc:AlternateContent>
-    <mc:Choice Requires="p14">
-      <p:transition spd="slow" p14:dur="2000"/>
-    </mc:Choice>
-    <mc:Fallback>
-      <p:transition spd="slow"/>
-    </mc:Fallback>
-  </mc:AlternateContent>
-  <p:timing>
-    <p:tnLst>
-      <p:par>
-        <p:cTn id="7" dur="indefinite" restart="never" nodeType="tmRoot">
-          <p:childTnLst>
-            <p:seq>
-              <p:cTn id="8" dur="indefinite" nodeType="mainSeq"/>
-              <p:prevCondLst>
-                <p:cond delay="0" evt="onPrev">
-                  <p:tgtEl>
-                    <p:sldTgt/>
-                  </p:tgtEl>
-                </p:cond>
-              </p:prevCondLst>
-              <p:nextCondLst>
-                <p:cond delay="0" evt="onNext">
-                  <p:tgtEl>
-                    <p:sldTgt/>
-                  </p:tgtEl>
-                </p:cond>
-              </p:nextCondLst>
-            </p:seq>
-          </p:childTnLst>
-        </p:cTn>
-      </p:par>
-    </p:tnLst>
-  </p:timing>
-</p:sld>
-</file>
-
-<file path=ppt/slides/slide5.xml><?xml version="1.0" encoding="utf-8"?>
-<p:sld xmlns:a="http://schemas.openxmlformats.org/drawingml/2006/main" xmlns:p="http://schemas.openxmlformats.org/presentationml/2006/main" xmlns:r="http://schemas.openxmlformats.org/officeDocument/2006/relationships" xmlns:p14="http://schemas.microsoft.com/office/powerpoint/2010/main" xmlns:p15="http://schemas.microsoft.com/office/powerpoint/2012/main" xmlns:mc="http://schemas.openxmlformats.org/markup-compatibility/2006">
-  <p:cSld>
-    <p:spTree>
-      <p:nvGrpSpPr>
-        <p:cNvPr id="1" name=""/>
-        <p:cNvGrpSpPr/>
-        <p:nvPr/>
-      </p:nvGrpSpPr>
-      <p:grpSpPr>
-        <a:xfrm>
-          <a:off x="0" y="0"/>
-          <a:ext cx="0" cy="0"/>
-          <a:chOff x="0" y="0"/>
-          <a:chExt cx="0" cy="0"/>
-        </a:xfrm>
-      </p:grpSpPr>
-      <p:sp>
-        <p:nvSpPr>
-          <p:cNvPr id="80" name="TextShape 1"/>
-          <p:cNvSpPr txBox="1"/>
-          <p:nvPr/>
-        </p:nvSpPr>
-        <p:spPr>
-          <a:xfrm>
-            <a:off x="1656000" y="1368000"/>
-            <a:ext cx="2698560" cy="445320"/>
-          </a:xfrm>
-          <a:prstGeom prst="rect">
-            <a:avLst/>
-          </a:prstGeom>
-          <a:noFill/>
-          <a:ln>
-            <a:noFill/>
-          </a:ln>
-        </p:spPr>
-        <p:txBody>
-          <a:bodyPr lIns="90000" rIns="90000" tIns="45000" bIns="45000">
-            <a:spAutoFit/>
-          </a:bodyPr>
-          <a:p>
-            <a:r>
-              <a:rPr b="0" lang="en-US" sz="2400" spc="-1" strike="noStrike">
-                <a:latin typeface="DejaVu Serif"/>
-                <a:hlinkClick r:id="rId1"/>
-              </a:rPr>
-              <a:t>DTD Study</a:t>
-            </a:r>
-            <a:endParaRPr b="0" lang="en-US" sz="2400" spc="-1" strike="noStrike">
-              <a:latin typeface="DejaVu Serif"/>
-            </a:endParaRPr>
-          </a:p>
-        </p:txBody>
-      </p:sp>
-      <p:sp>
-        <p:nvSpPr>
-          <p:cNvPr id="81" name="TextShape 2"/>
-          <p:cNvSpPr txBox="1"/>
-          <p:nvPr/>
-        </p:nvSpPr>
-        <p:spPr>
-          <a:xfrm>
-            <a:off x="504000" y="360000"/>
-            <a:ext cx="1407600" cy="355680"/>
-          </a:xfrm>
-          <a:prstGeom prst="rect">
-            <a:avLst/>
-          </a:prstGeom>
-          <a:noFill/>
-          <a:ln>
-            <a:noFill/>
-          </a:ln>
-        </p:spPr>
-        <p:txBody>
-          <a:bodyPr lIns="90000" rIns="90000" tIns="45000" bIns="45000">
-            <a:spAutoFit/>
-          </a:bodyPr>
-          <a:p>
-            <a:r>
-              <a:rPr b="0" lang="en-US" sz="1800" spc="-1" strike="noStrike">
-                <a:latin typeface="DejaVu Sans"/>
-              </a:rPr>
-              <a:t>DTD Study</a:t>
-            </a:r>
-            <a:endParaRPr b="0" lang="en-US" sz="1800" spc="-1" strike="noStrike">
-              <a:latin typeface="DejaVu Sans"/>
-            </a:endParaRPr>
-          </a:p>
-        </p:txBody>
-      </p:sp>
-    </p:spTree>
-  </p:cSld>
-  <mc:AlternateContent>
-    <mc:Choice Requires="p14">
-      <p:transition spd="slow" p14:dur="2000"/>
-    </mc:Choice>
-    <mc:Fallback>
-      <p:transition spd="slow"/>
-    </mc:Fallback>
-  </mc:AlternateContent>
-  <p:timing>
-    <p:tnLst>
-      <p:par>
-        <p:cTn id="9" dur="indefinite" restart="never" nodeType="tmRoot">
-          <p:childTnLst>
-            <p:seq>
-              <p:cTn id="10" dur="indefinite" nodeType="mainSeq"/>
-              <p:prevCondLst>
-                <p:cond delay="0" evt="onPrev">
-                  <p:tgtEl>
-                    <p:sldTgt/>
-                  </p:tgtEl>
-                </p:cond>
-              </p:prevCondLst>
-              <p:nextCondLst>
-                <p:cond delay="0" evt="onNext">
-                  <p:tgtEl>
-                    <p:sldTgt/>
-                  </p:tgtEl>
-                </p:cond>
-              </p:nextCondLst>
-            </p:seq>
-          </p:childTnLst>
-        </p:cTn>
-      </p:par>
-    </p:tnLst>
-  </p:timing>
+  <p:clrMapOvr>
+    <a:masterClrMapping/>
+  </p:clrMapOvr>
 </p:sld>
 </file>
 
@@ -4697,34 +5202,34 @@
         <a:sysClr val="window" lastClr="FFFFFF"/>
       </a:lt1>
       <a:dk2>
-        <a:srgbClr val="44546a"/>
+        <a:srgbClr val="44546A"/>
       </a:dk2>
       <a:lt2>
-        <a:srgbClr val="e7e6e6"/>
+        <a:srgbClr val="E7E6E6"/>
       </a:lt2>
       <a:accent1>
-        <a:srgbClr val="4472c4"/>
+        <a:srgbClr val="4472C4"/>
       </a:accent1>
       <a:accent2>
-        <a:srgbClr val="ed7d31"/>
+        <a:srgbClr val="ED7D31"/>
       </a:accent2>
       <a:accent3>
-        <a:srgbClr val="a5a5a5"/>
+        <a:srgbClr val="A5A5A5"/>
       </a:accent3>
       <a:accent4>
-        <a:srgbClr val="ffc000"/>
+        <a:srgbClr val="FFC000"/>
       </a:accent4>
       <a:accent5>
-        <a:srgbClr val="5b9bd5"/>
+        <a:srgbClr val="5B9BD5"/>
       </a:accent5>
       <a:accent6>
-        <a:srgbClr val="70ad47"/>
+        <a:srgbClr val="70AD47"/>
       </a:accent6>
       <a:hlink>
-        <a:srgbClr val="0563c1"/>
+        <a:srgbClr val="0563C1"/>
       </a:hlink>
       <a:folHlink>
-        <a:srgbClr val="954f72"/>
+        <a:srgbClr val="954F72"/>
       </a:folHlink>
     </a:clrScheme>
     <a:fontScheme name="Office">
@@ -4906,6 +5411,8 @@
       </a:bgFillStyleLst>
     </a:fmtScheme>
   </a:themeElements>
+  <a:objectDefaults/>
+  <a:extraClrSchemeLst/>
 </a:theme>
 </file>
 
@@ -4920,34 +5427,34 @@
         <a:sysClr val="window" lastClr="FFFFFF"/>
       </a:lt1>
       <a:dk2>
-        <a:srgbClr val="44546a"/>
+        <a:srgbClr val="44546A"/>
       </a:dk2>
       <a:lt2>
-        <a:srgbClr val="e7e6e6"/>
+        <a:srgbClr val="E7E6E6"/>
       </a:lt2>
       <a:accent1>
-        <a:srgbClr val="4472c4"/>
+        <a:srgbClr val="4472C4"/>
       </a:accent1>
       <a:accent2>
-        <a:srgbClr val="ed7d31"/>
+        <a:srgbClr val="ED7D31"/>
       </a:accent2>
       <a:accent3>
-        <a:srgbClr val="a5a5a5"/>
+        <a:srgbClr val="A5A5A5"/>
       </a:accent3>
       <a:accent4>
-        <a:srgbClr val="ffc000"/>
+        <a:srgbClr val="FFC000"/>
       </a:accent4>
       <a:accent5>
-        <a:srgbClr val="5b9bd5"/>
+        <a:srgbClr val="5B9BD5"/>
       </a:accent5>
       <a:accent6>
-        <a:srgbClr val="70ad47"/>
+        <a:srgbClr val="70AD47"/>
       </a:accent6>
       <a:hlink>
-        <a:srgbClr val="0563c1"/>
+        <a:srgbClr val="0563C1"/>
       </a:hlink>
       <a:folHlink>
-        <a:srgbClr val="954f72"/>
+        <a:srgbClr val="954F72"/>
       </a:folHlink>
     </a:clrScheme>
     <a:fontScheme name="Office">
@@ -5129,5 +5636,7 @@
       </a:bgFillStyleLst>
     </a:fmtScheme>
   </a:themeElements>
+  <a:objectDefaults/>
+  <a:extraClrSchemeLst/>
 </a:theme>
 </file>
</xml_diff>

<commit_message>
Rm some record information
</commit_message>
<xml_diff>
--- a/JavaStudyRecord/JavaStudyRecord.pptx
+++ b/JavaStudyRecord/JavaStudyRecord.pptx
@@ -9,7 +9,6 @@
     <p:sldId id="256" r:id="rId3"/>
     <p:sldId id="257" r:id="rId4"/>
     <p:sldId id="258" r:id="rId5"/>
-    <p:sldId id="260" r:id="rId6"/>
   </p:sldIdLst>
   <p:sldSz cx="12192000" cy="6858000"/>
   <p:notesSz cx="7559675" cy="10691813"/>
@@ -4338,7 +4337,7 @@
     <mc:Choice Requires="p14">
       <p:transition spd="slow" p14:dur="2000"/>
     </mc:Choice>
-    <mc:Fallback xmlns:p15="http://schemas.microsoft.com/office/powerpoint/2012/main" xmlns="">
+    <mc:Fallback xmlns="" xmlns:p15="http://schemas.microsoft.com/office/powerpoint/2012/main">
       <p:transition spd="slow"/>
     </mc:Fallback>
   </mc:AlternateContent>
@@ -4594,7 +4593,7 @@
     <mc:Choice Requires="p14">
       <p:transition spd="slow" p14:dur="2000"/>
     </mc:Choice>
-    <mc:Fallback xmlns:p15="http://schemas.microsoft.com/office/powerpoint/2012/main" xmlns="">
+    <mc:Fallback xmlns="" xmlns:p15="http://schemas.microsoft.com/office/powerpoint/2012/main">
       <p:transition spd="slow"/>
     </mc:Fallback>
   </mc:AlternateContent>
@@ -4727,43 +4726,7 @@
                 <a:ea typeface="DejaVu Sans"/>
                 <a:hlinkClick r:id="rId2"/>
               </a:rPr>
-              <a:t>       Java</a:t>
-            </a:r>
-            <a:r>
-              <a:rPr lang="en-US" sz="1800" b="0" u="sng" strike="noStrike" spc="-1">
-                <a:solidFill>
-                  <a:srgbClr val="0563C1"/>
-                </a:solidFill>
-                <a:uFillTx/>
-                <a:latin typeface="Arial"/>
-                <a:ea typeface="DejaVu Sans"/>
-                <a:hlinkClick r:id="rId2"/>
-              </a:rPr>
-              <a:t>集合源码系列之</a:t>
-            </a:r>
-            <a:r>
-              <a:rPr lang="en-US" sz="1800" b="0" u="sng" strike="noStrike" spc="-1">
-                <a:solidFill>
-                  <a:srgbClr val="0563C1"/>
-                </a:solidFill>
-                <a:uFillTx/>
-                <a:latin typeface="Arial"/>
-                <a:ea typeface="DejaVu Sans"/>
-                <a:hlinkClick r:id="rId2"/>
-              </a:rPr>
-              <a:t>HashMap</a:t>
-            </a:r>
-            <a:r>
-              <a:rPr lang="en-US" sz="1800" b="0" u="sng" strike="noStrike" spc="-1">
-                <a:solidFill>
-                  <a:srgbClr val="0563C1"/>
-                </a:solidFill>
-                <a:uFillTx/>
-                <a:latin typeface="Arial"/>
-                <a:ea typeface="DejaVu Sans"/>
-                <a:hlinkClick r:id="rId2"/>
-              </a:rPr>
-              <a:t>添加元素的流程</a:t>
+              <a:t>       Java集合源码系列之HashMap添加元素的流程</a:t>
             </a:r>
             <a:endParaRPr lang="en-US" sz="1800" b="0" strike="noStrike" spc="-1">
               <a:latin typeface="DejaVu Sans"/>
@@ -4795,115 +4758,7 @@
                 <a:ea typeface="DejaVu Sans"/>
                 <a:hlinkClick r:id="rId3"/>
               </a:rPr>
-              <a:t>Java</a:t>
-            </a:r>
-            <a:r>
-              <a:rPr lang="en-US" sz="1800" b="0" u="sng" strike="noStrike" spc="-1">
-                <a:solidFill>
-                  <a:srgbClr val="0563C1"/>
-                </a:solidFill>
-                <a:uFillTx/>
-                <a:latin typeface="Arial"/>
-                <a:ea typeface="DejaVu Sans"/>
-                <a:hlinkClick r:id="rId3"/>
-              </a:rPr>
-              <a:t>基础篇：什么是</a:t>
-            </a:r>
-            <a:r>
-              <a:rPr lang="en-US" sz="1800" b="0" u="sng" strike="noStrike" spc="-1">
-                <a:solidFill>
-                  <a:srgbClr val="0563C1"/>
-                </a:solidFill>
-                <a:uFillTx/>
-                <a:latin typeface="Arial"/>
-                <a:ea typeface="DejaVu Sans"/>
-                <a:hlinkClick r:id="rId3"/>
-              </a:rPr>
-              <a:t>hashCode</a:t>
-            </a:r>
-            <a:r>
-              <a:rPr lang="en-US" sz="1800" b="0" u="sng" strike="noStrike" spc="-1">
-                <a:solidFill>
-                  <a:srgbClr val="0563C1"/>
-                </a:solidFill>
-                <a:uFillTx/>
-                <a:latin typeface="Arial"/>
-                <a:ea typeface="DejaVu Sans"/>
-                <a:hlinkClick r:id="rId3"/>
-              </a:rPr>
-              <a:t> </a:t>
-            </a:r>
-            <a:r>
-              <a:rPr lang="en-US" sz="1800" b="0" u="sng" strike="noStrike" spc="-1">
-                <a:solidFill>
-                  <a:srgbClr val="0563C1"/>
-                </a:solidFill>
-                <a:uFillTx/>
-                <a:latin typeface="Arial"/>
-                <a:ea typeface="DejaVu Sans"/>
-                <a:hlinkClick r:id="rId3"/>
-              </a:rPr>
-              <a:t>以及 </a:t>
-            </a:r>
-            <a:r>
-              <a:rPr lang="en-US" sz="1800" b="0" u="sng" strike="noStrike" spc="-1">
-                <a:solidFill>
-                  <a:srgbClr val="0563C1"/>
-                </a:solidFill>
-                <a:uFillTx/>
-                <a:latin typeface="Arial"/>
-                <a:ea typeface="DejaVu Sans"/>
-                <a:hlinkClick r:id="rId3"/>
-              </a:rPr>
-              <a:t>hashCode</a:t>
-            </a:r>
-            <a:r>
-              <a:rPr lang="en-US" sz="1800" b="0" u="sng" strike="noStrike" spc="-1">
-                <a:solidFill>
-                  <a:srgbClr val="0563C1"/>
-                </a:solidFill>
-                <a:uFillTx/>
-                <a:latin typeface="Arial"/>
-                <a:ea typeface="DejaVu Sans"/>
-                <a:hlinkClick r:id="rId3"/>
-              </a:rPr>
-              <a:t>()</a:t>
-            </a:r>
-            <a:r>
-              <a:rPr lang="en-US" sz="1800" b="0" u="sng" strike="noStrike" spc="-1">
-                <a:solidFill>
-                  <a:srgbClr val="0563C1"/>
-                </a:solidFill>
-                <a:uFillTx/>
-                <a:latin typeface="Arial"/>
-                <a:ea typeface="DejaVu Sans"/>
-                <a:hlinkClick r:id="rId3"/>
-              </a:rPr>
-              <a:t>与</a:t>
-            </a:r>
-            <a:r>
-              <a:rPr lang="en-US" sz="1800" b="0" u="sng" strike="noStrike" spc="-1">
-                <a:solidFill>
-                  <a:srgbClr val="0563C1"/>
-                </a:solidFill>
-                <a:uFillTx/>
-                <a:latin typeface="Arial"/>
-                <a:ea typeface="DejaVu Sans"/>
-                <a:hlinkClick r:id="rId3"/>
-              </a:rPr>
-              <a:t>equals()</a:t>
-            </a:r>
-            <a:r>
-              <a:rPr lang="en-US" sz="1800" b="0" u="sng" strike="noStrike" spc="-1">
-                <a:solidFill>
-                  <a:srgbClr val="0563C1"/>
-                </a:solidFill>
-                <a:uFillTx/>
-                <a:latin typeface="Arial"/>
-                <a:ea typeface="DejaVu Sans"/>
-                <a:hlinkClick r:id="rId3"/>
-              </a:rPr>
-              <a:t>的联系</a:t>
+              <a:t>Java基础篇：什么是hashCode 以及 hashCode()与equals()的联系</a:t>
             </a:r>
             <a:endParaRPr lang="en-US" sz="1800" b="0" strike="noStrike" spc="-1">
               <a:latin typeface="DejaVu Sans"/>
@@ -4935,43 +4790,7 @@
                 <a:ea typeface="DejaVu Sans"/>
                 <a:hlinkClick r:id="rId4"/>
               </a:rPr>
-              <a:t>Java</a:t>
-            </a:r>
-            <a:r>
-              <a:rPr lang="en-US" sz="1800" b="0" u="sng" strike="noStrike" spc="-1">
-                <a:solidFill>
-                  <a:srgbClr val="0563C1"/>
-                </a:solidFill>
-                <a:uFillTx/>
-                <a:latin typeface="Arial"/>
-                <a:ea typeface="DejaVu Sans"/>
-                <a:hlinkClick r:id="rId4"/>
-              </a:rPr>
-              <a:t>基础之</a:t>
-            </a:r>
-            <a:r>
-              <a:rPr lang="en-US" sz="1800" b="0" u="sng" strike="noStrike" spc="-1">
-                <a:solidFill>
-                  <a:srgbClr val="0563C1"/>
-                </a:solidFill>
-                <a:uFillTx/>
-                <a:latin typeface="Arial"/>
-                <a:ea typeface="DejaVu Sans"/>
-                <a:hlinkClick r:id="rId4"/>
-              </a:rPr>
-              <a:t>hashcode</a:t>
-            </a:r>
-            <a:r>
-              <a:rPr lang="en-US" sz="1800" b="0" u="sng" strike="noStrike" spc="-1">
-                <a:solidFill>
-                  <a:srgbClr val="0563C1"/>
-                </a:solidFill>
-                <a:uFillTx/>
-                <a:latin typeface="Arial"/>
-                <a:ea typeface="DejaVu Sans"/>
-                <a:hlinkClick r:id="rId4"/>
-              </a:rPr>
-              <a:t>剖析</a:t>
+              <a:t>Java基础之hashcode剖析</a:t>
             </a:r>
             <a:endParaRPr lang="en-US" sz="1800" b="0" strike="noStrike" spc="-1">
               <a:latin typeface="DejaVu Sans"/>
@@ -5003,43 +4822,7 @@
                 <a:ea typeface="DejaVu Sans"/>
                 <a:hlinkClick r:id="rId5"/>
               </a:rPr>
-              <a:t>深入理解 </a:t>
-            </a:r>
-            <a:r>
-              <a:rPr lang="en-US" sz="1800" b="0" u="sng" strike="noStrike" spc="-1">
-                <a:solidFill>
-                  <a:srgbClr val="0563C1"/>
-                </a:solidFill>
-                <a:uFillTx/>
-                <a:latin typeface="Arial"/>
-                <a:ea typeface="DejaVu Sans"/>
-                <a:hlinkClick r:id="rId5"/>
-              </a:rPr>
-              <a:t>Java </a:t>
-            </a:r>
-            <a:r>
-              <a:rPr lang="en-US" sz="1800" b="0" u="sng" strike="noStrike" spc="-1">
-                <a:solidFill>
-                  <a:srgbClr val="0563C1"/>
-                </a:solidFill>
-                <a:uFillTx/>
-                <a:latin typeface="Arial"/>
-                <a:ea typeface="DejaVu Sans"/>
-                <a:hlinkClick r:id="rId5"/>
-              </a:rPr>
-              <a:t>中的 </a:t>
-            </a:r>
-            <a:r>
-              <a:rPr lang="en-US" sz="1800" b="0" u="sng" strike="noStrike" spc="-1">
-                <a:solidFill>
-                  <a:srgbClr val="0563C1"/>
-                </a:solidFill>
-                <a:uFillTx/>
-                <a:latin typeface="Arial"/>
-                <a:ea typeface="DejaVu Sans"/>
-                <a:hlinkClick r:id="rId5"/>
-              </a:rPr>
-              <a:t>hashCode</a:t>
+              <a:t>深入理解 Java 中的 hashCode</a:t>
             </a:r>
             <a:endParaRPr lang="en-US" sz="1800" b="0" strike="noStrike" spc="-1">
               <a:latin typeface="DejaVu Sans"/>
@@ -5056,7 +4839,7 @@
     <mc:Choice Requires="p14">
       <p:transition spd="slow" p14:dur="2000"/>
     </mc:Choice>
-    <mc:Fallback xmlns:p15="http://schemas.microsoft.com/office/powerpoint/2012/main" xmlns="">
+    <mc:Fallback xmlns="" xmlns:p15="http://schemas.microsoft.com/office/powerpoint/2012/main">
       <p:transition spd="slow"/>
     </mc:Fallback>
   </mc:AlternateContent>
@@ -5087,107 +4870,6 @@
       </p:par>
     </p:tnLst>
   </p:timing>
-</p:sld>
-</file>
-
-<file path=ppt/slides/slide4.xml><?xml version="1.0" encoding="utf-8"?>
-<p:sld xmlns:a="http://schemas.openxmlformats.org/drawingml/2006/main" xmlns:r="http://schemas.openxmlformats.org/officeDocument/2006/relationships" xmlns:p="http://schemas.openxmlformats.org/presentationml/2006/main">
-  <p:cSld>
-    <p:spTree>
-      <p:nvGrpSpPr>
-        <p:cNvPr id="1" name=""/>
-        <p:cNvGrpSpPr/>
-        <p:nvPr/>
-      </p:nvGrpSpPr>
-      <p:grpSpPr>
-        <a:xfrm>
-          <a:off x="0" y="0"/>
-          <a:ext cx="0" cy="0"/>
-          <a:chOff x="0" y="0"/>
-          <a:chExt cx="0" cy="0"/>
-        </a:xfrm>
-      </p:grpSpPr>
-      <p:sp>
-        <p:nvSpPr>
-          <p:cNvPr id="4" name="文本框 3"/>
-          <p:cNvSpPr txBox="1"/>
-          <p:nvPr/>
-        </p:nvSpPr>
-        <p:spPr>
-          <a:xfrm>
-            <a:off x="310718" y="230819"/>
-            <a:ext cx="2912079" cy="369332"/>
-          </a:xfrm>
-          <a:prstGeom prst="rect">
-            <a:avLst/>
-          </a:prstGeom>
-          <a:noFill/>
-        </p:spPr>
-        <p:txBody>
-          <a:bodyPr wrap="none" rtlCol="0">
-            <a:spAutoFit/>
-          </a:bodyPr>
-          <a:lstStyle/>
-          <a:p>
-            <a:r>
-              <a:rPr lang="en-US" altLang="zh-CN" dirty="0" smtClean="0"/>
-              <a:t>Idea Tool Code Comments</a:t>
-            </a:r>
-            <a:endParaRPr lang="zh-CN" altLang="en-US" dirty="0"/>
-          </a:p>
-        </p:txBody>
-      </p:sp>
-      <p:sp>
-        <p:nvSpPr>
-          <p:cNvPr id="5" name="文本框 4"/>
-          <p:cNvSpPr txBox="1"/>
-          <p:nvPr/>
-        </p:nvSpPr>
-        <p:spPr>
-          <a:xfrm>
-            <a:off x="1091953" y="1127464"/>
-            <a:ext cx="2710999" cy="646331"/>
-          </a:xfrm>
-          <a:prstGeom prst="rect">
-            <a:avLst/>
-          </a:prstGeom>
-          <a:noFill/>
-        </p:spPr>
-        <p:txBody>
-          <a:bodyPr wrap="none" rtlCol="0">
-            <a:spAutoFit/>
-          </a:bodyPr>
-          <a:lstStyle/>
-          <a:p>
-            <a:r>
-              <a:rPr lang="en-US" altLang="zh-CN" dirty="0" smtClean="0">
-                <a:hlinkClick r:id="rId2"/>
-              </a:rPr>
-              <a:t>Code Comment Setting</a:t>
-            </a:r>
-            <a:endParaRPr lang="en-US" altLang="zh-CN" dirty="0" smtClean="0"/>
-          </a:p>
-          <a:p>
-            <a:r>
-              <a:rPr lang="en-US" altLang="zh-CN" dirty="0" smtClean="0">
-                <a:hlinkClick r:id="rId3"/>
-              </a:rPr>
-              <a:t>Code Comment Setting2</a:t>
-            </a:r>
-            <a:endParaRPr lang="zh-CN" altLang="en-US" dirty="0"/>
-          </a:p>
-        </p:txBody>
-      </p:sp>
-    </p:spTree>
-    <p:extLst>
-      <p:ext uri="{BB962C8B-B14F-4D97-AF65-F5344CB8AC3E}">
-        <p14:creationId xmlns:p14="http://schemas.microsoft.com/office/powerpoint/2010/main" val="1756308094"/>
-      </p:ext>
-    </p:extLst>
-  </p:cSld>
-  <p:clrMapOvr>
-    <a:masterClrMapping/>
-  </p:clrMapOvr>
 </p:sld>
 </file>
 

</xml_diff>

<commit_message>
Add mysql study website
</commit_message>
<xml_diff>
--- a/JavaStudyRecord/JavaStudyRecord.pptx
+++ b/JavaStudyRecord/JavaStudyRecord.pptx
@@ -7,8 +7,8 @@
   </p:sldMasterIdLst>
   <p:sldIdLst>
     <p:sldId id="256" r:id="rId3"/>
-    <p:sldId id="257" r:id="rId4"/>
-    <p:sldId id="258" r:id="rId5"/>
+    <p:sldId id="258" r:id="rId4"/>
+    <p:sldId id="259" r:id="rId5"/>
   </p:sldIdLst>
   <p:sldSz cx="12192000" cy="6858000"/>
   <p:notesSz cx="7559675" cy="10691813"/>
@@ -4390,14 +4390,14 @@
       </p:grpSpPr>
       <p:sp>
         <p:nvSpPr>
-          <p:cNvPr id="77" name="CustomShape 1"/>
+          <p:cNvPr id="78" name="CustomShape 1"/>
           <p:cNvSpPr/>
           <p:nvPr/>
         </p:nvSpPr>
         <p:spPr>
           <a:xfrm>
-            <a:off x="216000" y="288000"/>
-            <a:ext cx="36447120" cy="1461960"/>
+            <a:off x="265320" y="301680"/>
+            <a:ext cx="7288920" cy="1991880"/>
           </a:xfrm>
           <a:prstGeom prst="rect">
             <a:avLst/>
@@ -4420,7 +4420,7 @@
           <a:fontRef idx="minor"/>
         </p:style>
         <p:txBody>
-          <a:bodyPr lIns="90000" tIns="45000" rIns="90000" bIns="45000">
+          <a:bodyPr wrap="none" lIns="90000" tIns="45000" rIns="90000" bIns="45000">
             <a:spAutoFit/>
           </a:bodyPr>
           <a:lstStyle/>
@@ -4435,10 +4435,42 @@
                 <a:solidFill>
                   <a:srgbClr val="000000"/>
                 </a:solidFill>
-                <a:latin typeface="DejaVu Sans"/>
+                <a:latin typeface="Arial"/>
                 <a:ea typeface="DejaVu Sans"/>
               </a:rPr>
-              <a:t>XML Parser Study Website:</a:t>
+              <a:t>HashCode的讲解</a:t>
+            </a:r>
+            <a:endParaRPr lang="en-US" sz="1800" b="0" strike="noStrike" spc="-1">
+              <a:latin typeface="DejaVu Sans"/>
+            </a:endParaRPr>
+          </a:p>
+          <a:p>
+            <a:pPr>
+              <a:lnSpc>
+                <a:spcPct val="100000"/>
+              </a:lnSpc>
+            </a:pPr>
+            <a:endParaRPr lang="en-US" sz="1800" b="0" strike="noStrike" spc="-1">
+              <a:latin typeface="DejaVu Sans"/>
+            </a:endParaRPr>
+          </a:p>
+          <a:p>
+            <a:pPr>
+              <a:lnSpc>
+                <a:spcPct val="100000"/>
+              </a:lnSpc>
+            </a:pPr>
+            <a:r>
+              <a:rPr lang="en-US" sz="1800" b="0" u="sng" strike="noStrike" spc="-1">
+                <a:solidFill>
+                  <a:srgbClr val="0563C1"/>
+                </a:solidFill>
+                <a:uFillTx/>
+                <a:latin typeface="Arial"/>
+                <a:ea typeface="DejaVu Sans"/>
+                <a:hlinkClick r:id="rId2"/>
+              </a:rPr>
+              <a:t>       Java集合源码系列之HashMap添加元素的流程</a:t>
             </a:r>
             <a:endParaRPr lang="en-US" sz="1800" b="0" strike="noStrike" spc="-1">
               <a:latin typeface="DejaVu Sans"/>
@@ -4455,10 +4487,10 @@
                 <a:solidFill>
                   <a:srgbClr val="000000"/>
                 </a:solidFill>
-                <a:latin typeface="DejaVu Sans"/>
+                <a:latin typeface="Arial"/>
                 <a:ea typeface="DejaVu Sans"/>
               </a:rPr>
-              <a:t>      </a:t>
+              <a:t>       </a:t>
             </a:r>
             <a:r>
               <a:rPr lang="en-US" sz="1800" b="0" u="sng" strike="noStrike" spc="-1">
@@ -4466,11 +4498,11 @@
                   <a:srgbClr val="0563C1"/>
                 </a:solidFill>
                 <a:uFillTx/>
-                <a:latin typeface="DejaVu Sans"/>
+                <a:latin typeface="Arial"/>
                 <a:ea typeface="DejaVu Sans"/>
-                <a:hlinkClick r:id="rId2"/>
+                <a:hlinkClick r:id="rId3"/>
               </a:rPr>
-              <a:t>Xml_Parser</a:t>
+              <a:t>Java基础篇：什么是hashCode 以及 hashCode()与equals()的联系</a:t>
             </a:r>
             <a:endParaRPr lang="en-US" sz="1800" b="0" strike="noStrike" spc="-1">
               <a:latin typeface="DejaVu Sans"/>
@@ -4487,10 +4519,10 @@
                 <a:solidFill>
                   <a:srgbClr val="000000"/>
                 </a:solidFill>
-                <a:latin typeface="DejaVu Sans"/>
+                <a:latin typeface="Arial"/>
                 <a:ea typeface="DejaVu Sans"/>
               </a:rPr>
-              <a:t>      </a:t>
+              <a:t>       </a:t>
             </a:r>
             <a:r>
               <a:rPr lang="en-US" sz="1800" b="0" u="sng" strike="noStrike" spc="-1">
@@ -4498,11 +4530,11 @@
                   <a:srgbClr val="0563C1"/>
                 </a:solidFill>
                 <a:uFillTx/>
-                <a:latin typeface="DejaVu Sans"/>
+                <a:latin typeface="Arial"/>
                 <a:ea typeface="DejaVu Sans"/>
-                <a:hlinkClick r:id="rId3"/>
+                <a:hlinkClick r:id="rId4"/>
               </a:rPr>
-              <a:t>Xml_Parser2</a:t>
+              <a:t>Java基础之hashcode剖析</a:t>
             </a:r>
             <a:endParaRPr lang="en-US" sz="1800" b="0" strike="noStrike" spc="-1">
               <a:latin typeface="DejaVu Sans"/>
@@ -4519,10 +4551,10 @@
                 <a:solidFill>
                   <a:srgbClr val="000000"/>
                 </a:solidFill>
-                <a:latin typeface="DejaVu Sans"/>
+                <a:latin typeface="Arial"/>
                 <a:ea typeface="DejaVu Sans"/>
               </a:rPr>
-              <a:t>      </a:t>
+              <a:t>       </a:t>
             </a:r>
             <a:r>
               <a:rPr lang="en-US" sz="1800" b="0" u="sng" strike="noStrike" spc="-1">
@@ -4530,53 +4562,11 @@
                   <a:srgbClr val="0563C1"/>
                 </a:solidFill>
                 <a:uFillTx/>
-                <a:latin typeface="DejaVu Sans"/>
-                <a:ea typeface="DejaVu Sans"/>
-                <a:hlinkClick r:id="rId4"/>
-              </a:rPr>
-              <a:t>Xml_Parser3</a:t>
-            </a:r>
-            <a:endParaRPr lang="en-US" sz="1800" b="0" strike="noStrike" spc="-1">
-              <a:latin typeface="DejaVu Sans"/>
-            </a:endParaRPr>
-          </a:p>
-          <a:p>
-            <a:pPr>
-              <a:lnSpc>
-                <a:spcPct val="100000"/>
-              </a:lnSpc>
-            </a:pPr>
-            <a:r>
-              <a:rPr lang="en-US" sz="1800" b="0" strike="noStrike" spc="-1">
-                <a:solidFill>
-                  <a:srgbClr val="000000"/>
-                </a:solidFill>
-                <a:latin typeface="DejaVu Sans"/>
-                <a:ea typeface="DejaVu Sans"/>
-              </a:rPr>
-              <a:t>      </a:t>
-            </a:r>
-            <a:r>
-              <a:rPr lang="en-US" sz="1800" b="0" u="sng" strike="noStrike" spc="-1">
-                <a:solidFill>
-                  <a:srgbClr val="0563C1"/>
-                </a:solidFill>
-                <a:uFillTx/>
-                <a:latin typeface="DejaVu Sans"/>
+                <a:latin typeface="Arial"/>
                 <a:ea typeface="DejaVu Sans"/>
                 <a:hlinkClick r:id="rId5"/>
               </a:rPr>
-              <a:t>Xml_Parser4</a:t>
-            </a:r>
-            <a:r>
-              <a:rPr lang="en-US" sz="1800" b="0" strike="noStrike" spc="-1">
-                <a:solidFill>
-                  <a:srgbClr val="000000"/>
-                </a:solidFill>
-                <a:latin typeface="DejaVu Sans"/>
-                <a:ea typeface="DejaVu Sans"/>
-              </a:rPr>
-              <a:t>	</a:t>
+              <a:t>深入理解 Java 中的 hashCode</a:t>
             </a:r>
             <a:endParaRPr lang="en-US" sz="1800" b="0" strike="noStrike" spc="-1">
               <a:latin typeface="DejaVu Sans"/>
@@ -4646,230 +4636,98 @@
       </p:grpSpPr>
       <p:sp>
         <p:nvSpPr>
-          <p:cNvPr id="78" name="CustomShape 1"/>
-          <p:cNvSpPr/>
+          <p:cNvPr id="4" name="文本框 3"/>
+          <p:cNvSpPr txBox="1"/>
           <p:nvPr/>
         </p:nvSpPr>
         <p:spPr>
           <a:xfrm>
-            <a:off x="265320" y="301680"/>
-            <a:ext cx="7288920" cy="1991880"/>
+            <a:off x="257452" y="292963"/>
+            <a:ext cx="1479892" cy="369332"/>
           </a:xfrm>
           <a:prstGeom prst="rect">
             <a:avLst/>
           </a:prstGeom>
           <a:noFill/>
-          <a:ln>
-            <a:noFill/>
-          </a:ln>
-        </p:spPr>
-        <p:style>
-          <a:lnRef idx="0">
-            <a:scrgbClr r="0" g="0" b="0"/>
-          </a:lnRef>
-          <a:fillRef idx="0">
-            <a:scrgbClr r="0" g="0" b="0"/>
-          </a:fillRef>
-          <a:effectRef idx="0">
-            <a:scrgbClr r="0" g="0" b="0"/>
-          </a:effectRef>
-          <a:fontRef idx="minor"/>
-        </p:style>
-        <p:txBody>
-          <a:bodyPr wrap="none" lIns="90000" tIns="45000" rIns="90000" bIns="45000">
+        </p:spPr>
+        <p:txBody>
+          <a:bodyPr wrap="none" rtlCol="0">
             <a:spAutoFit/>
           </a:bodyPr>
           <a:lstStyle/>
           <a:p>
-            <a:pPr>
-              <a:lnSpc>
-                <a:spcPct val="100000"/>
-              </a:lnSpc>
-            </a:pPr>
             <a:r>
-              <a:rPr lang="en-US" sz="1800" b="0" strike="noStrike" spc="-1">
-                <a:solidFill>
-                  <a:srgbClr val="000000"/>
-                </a:solidFill>
-                <a:latin typeface="Arial"/>
-                <a:ea typeface="DejaVu Sans"/>
-              </a:rPr>
-              <a:t>HashCode的讲解</a:t>
+              <a:rPr lang="en-US" altLang="zh-CN" dirty="0" err="1" smtClean="0"/>
+              <a:t>MySql</a:t>
             </a:r>
-            <a:endParaRPr lang="en-US" sz="1800" b="0" strike="noStrike" spc="-1">
-              <a:latin typeface="DejaVu Sans"/>
-            </a:endParaRPr>
-          </a:p>
-          <a:p>
-            <a:pPr>
-              <a:lnSpc>
-                <a:spcPct val="100000"/>
-              </a:lnSpc>
-            </a:pPr>
-            <a:endParaRPr lang="en-US" sz="1800" b="0" strike="noStrike" spc="-1">
-              <a:latin typeface="DejaVu Sans"/>
-            </a:endParaRPr>
-          </a:p>
-          <a:p>
-            <a:pPr>
-              <a:lnSpc>
-                <a:spcPct val="100000"/>
-              </a:lnSpc>
-            </a:pPr>
             <a:r>
-              <a:rPr lang="en-US" sz="1800" b="0" u="sng" strike="noStrike" spc="-1">
-                <a:solidFill>
-                  <a:srgbClr val="0563C1"/>
-                </a:solidFill>
-                <a:uFillTx/>
-                <a:latin typeface="Arial"/>
-                <a:ea typeface="DejaVu Sans"/>
+              <a:rPr lang="en-US" altLang="zh-CN" dirty="0" smtClean="0"/>
+              <a:t> Study</a:t>
+            </a:r>
+            <a:endParaRPr lang="zh-CN" altLang="en-US" dirty="0"/>
+          </a:p>
+        </p:txBody>
+      </p:sp>
+      <p:sp>
+        <p:nvSpPr>
+          <p:cNvPr id="5" name="文本框 4"/>
+          <p:cNvSpPr txBox="1"/>
+          <p:nvPr/>
+        </p:nvSpPr>
+        <p:spPr>
+          <a:xfrm>
+            <a:off x="1038687" y="1118586"/>
+            <a:ext cx="1031051" cy="923330"/>
+          </a:xfrm>
+          <a:prstGeom prst="rect">
+            <a:avLst/>
+          </a:prstGeom>
+          <a:noFill/>
+        </p:spPr>
+        <p:txBody>
+          <a:bodyPr wrap="none" rtlCol="0">
+            <a:spAutoFit/>
+          </a:bodyPr>
+          <a:lstStyle/>
+          <a:p>
+            <a:r>
+              <a:rPr lang="en-US" altLang="zh-CN" dirty="0" smtClean="0">
                 <a:hlinkClick r:id="rId2"/>
               </a:rPr>
-              <a:t>       Java集合源码系列之HashMap添加元素的流程</a:t>
+              <a:t>Mysql-1</a:t>
             </a:r>
-            <a:endParaRPr lang="en-US" sz="1800" b="0" strike="noStrike" spc="-1">
-              <a:latin typeface="DejaVu Sans"/>
-            </a:endParaRPr>
-          </a:p>
-          <a:p>
-            <a:pPr>
-              <a:lnSpc>
-                <a:spcPct val="100000"/>
-              </a:lnSpc>
-            </a:pPr>
+            <a:endParaRPr lang="en-US" altLang="zh-CN" dirty="0" smtClean="0"/>
+          </a:p>
+          <a:p>
             <a:r>
-              <a:rPr lang="en-US" sz="1800" b="0" strike="noStrike" spc="-1">
-                <a:solidFill>
-                  <a:srgbClr val="000000"/>
-                </a:solidFill>
-                <a:latin typeface="Arial"/>
-                <a:ea typeface="DejaVu Sans"/>
-              </a:rPr>
-              <a:t>       </a:t>
-            </a:r>
-            <a:r>
-              <a:rPr lang="en-US" sz="1800" b="0" u="sng" strike="noStrike" spc="-1">
-                <a:solidFill>
-                  <a:srgbClr val="0563C1"/>
-                </a:solidFill>
-                <a:uFillTx/>
-                <a:latin typeface="Arial"/>
-                <a:ea typeface="DejaVu Sans"/>
+              <a:rPr lang="en-US" altLang="zh-CN" dirty="0" smtClean="0">
                 <a:hlinkClick r:id="rId3"/>
               </a:rPr>
-              <a:t>Java基础篇：什么是hashCode 以及 hashCode()与equals()的联系</a:t>
+              <a:t>MySql-2</a:t>
             </a:r>
-            <a:endParaRPr lang="en-US" sz="1800" b="0" strike="noStrike" spc="-1">
-              <a:latin typeface="DejaVu Sans"/>
-            </a:endParaRPr>
-          </a:p>
-          <a:p>
-            <a:pPr>
-              <a:lnSpc>
-                <a:spcPct val="100000"/>
-              </a:lnSpc>
-            </a:pPr>
+            <a:endParaRPr lang="en-US" altLang="zh-CN" dirty="0" smtClean="0"/>
+          </a:p>
+          <a:p>
             <a:r>
-              <a:rPr lang="en-US" sz="1800" b="0" strike="noStrike" spc="-1">
-                <a:solidFill>
-                  <a:srgbClr val="000000"/>
-                </a:solidFill>
-                <a:latin typeface="Arial"/>
-                <a:ea typeface="DejaVu Sans"/>
-              </a:rPr>
-              <a:t>       </a:t>
-            </a:r>
-            <a:r>
-              <a:rPr lang="en-US" sz="1800" b="0" u="sng" strike="noStrike" spc="-1">
-                <a:solidFill>
-                  <a:srgbClr val="0563C1"/>
-                </a:solidFill>
-                <a:uFillTx/>
-                <a:latin typeface="Arial"/>
-                <a:ea typeface="DejaVu Sans"/>
+              <a:rPr lang="en-US" altLang="zh-CN" dirty="0" smtClean="0">
                 <a:hlinkClick r:id="rId4"/>
               </a:rPr>
-              <a:t>Java基础之hashcode剖析</a:t>
+              <a:t>MySql-3</a:t>
             </a:r>
-            <a:endParaRPr lang="en-US" sz="1800" b="0" strike="noStrike" spc="-1">
-              <a:latin typeface="DejaVu Sans"/>
-            </a:endParaRPr>
-          </a:p>
-          <a:p>
-            <a:pPr>
-              <a:lnSpc>
-                <a:spcPct val="100000"/>
-              </a:lnSpc>
-            </a:pPr>
-            <a:r>
-              <a:rPr lang="en-US" sz="1800" b="0" strike="noStrike" spc="-1">
-                <a:solidFill>
-                  <a:srgbClr val="000000"/>
-                </a:solidFill>
-                <a:latin typeface="Arial"/>
-                <a:ea typeface="DejaVu Sans"/>
-              </a:rPr>
-              <a:t>       </a:t>
-            </a:r>
-            <a:r>
-              <a:rPr lang="en-US" sz="1800" b="0" u="sng" strike="noStrike" spc="-1">
-                <a:solidFill>
-                  <a:srgbClr val="0563C1"/>
-                </a:solidFill>
-                <a:uFillTx/>
-                <a:latin typeface="Arial"/>
-                <a:ea typeface="DejaVu Sans"/>
-                <a:hlinkClick r:id="rId5"/>
-              </a:rPr>
-              <a:t>深入理解 Java 中的 hashCode</a:t>
-            </a:r>
-            <a:endParaRPr lang="en-US" sz="1800" b="0" strike="noStrike" spc="-1">
-              <a:latin typeface="DejaVu Sans"/>
-            </a:endParaRPr>
+            <a:endParaRPr lang="zh-CN" altLang="en-US" dirty="0"/>
           </a:p>
         </p:txBody>
       </p:sp>
     </p:spTree>
+    <p:extLst>
+      <p:ext uri="{BB962C8B-B14F-4D97-AF65-F5344CB8AC3E}">
+        <p14:creationId xmlns:p14="http://schemas.microsoft.com/office/powerpoint/2010/main" val="2352770958"/>
+      </p:ext>
+    </p:extLst>
   </p:cSld>
   <p:clrMapOvr>
     <a:masterClrMapping/>
   </p:clrMapOvr>
-  <mc:AlternateContent xmlns:mc="http://schemas.openxmlformats.org/markup-compatibility/2006" xmlns:p14="http://schemas.microsoft.com/office/powerpoint/2010/main">
-    <mc:Choice Requires="p14">
-      <p:transition spd="slow" p14:dur="2000"/>
-    </mc:Choice>
-    <mc:Fallback xmlns="" xmlns:p15="http://schemas.microsoft.com/office/powerpoint/2012/main">
-      <p:transition spd="slow"/>
-    </mc:Fallback>
-  </mc:AlternateContent>
-  <p:timing>
-    <p:tnLst>
-      <p:par>
-        <p:cTn id="1" dur="indefinite" restart="never" nodeType="tmRoot">
-          <p:childTnLst>
-            <p:seq>
-              <p:cTn id="2" dur="indefinite" nodeType="mainSeq"/>
-              <p:prevCondLst>
-                <p:cond evt="onPrev" delay="0">
-                  <p:tgtEl>
-                    <p:sldTgt/>
-                  </p:tgtEl>
-                </p:cond>
-              </p:prevCondLst>
-              <p:nextCondLst>
-                <p:cond evt="onNext" delay="0">
-                  <p:tgtEl>
-                    <p:sldTgt/>
-                  </p:tgtEl>
-                </p:cond>
-              </p:nextCondLst>
-            </p:seq>
-          </p:childTnLst>
-        </p:cTn>
-      </p:par>
-    </p:tnLst>
-  </p:timing>
 </p:sld>
 </file>
 

</xml_diff>

<commit_message>
Record jdbc, classfor study website
</commit_message>
<xml_diff>
--- a/JavaStudyRecord/JavaStudyRecord.pptx
+++ b/JavaStudyRecord/JavaStudyRecord.pptx
@@ -8,6 +8,7 @@
     <p:sldId id="258" r:id="rId2"/>
     <p:sldId id="259" r:id="rId3"/>
     <p:sldId id="260" r:id="rId4"/>
+    <p:sldId id="261" r:id="rId5"/>
   </p:sldIdLst>
   <p:sldSz cx="12192000" cy="6858000"/>
   <p:notesSz cx="7559675" cy="10691813"/>
@@ -2399,7 +2400,7 @@
     <mc:Choice Requires="p14">
       <p:transition spd="slow" p14:dur="2000"/>
     </mc:Choice>
-    <mc:Fallback xmlns:p15="http://schemas.microsoft.com/office/powerpoint/2012/main" xmlns="">
+    <mc:Fallback xmlns="" xmlns:p15="http://schemas.microsoft.com/office/powerpoint/2012/main">
       <p:transition spd="slow"/>
     </mc:Fallback>
   </mc:AlternateContent>
@@ -2642,6 +2643,148 @@
   <p:clrMapOvr>
     <a:masterClrMapping/>
   </p:clrMapOvr>
+  <p:timing>
+    <p:tnLst>
+      <p:par>
+        <p:cTn id="1" dur="indefinite" restart="never" nodeType="tmRoot"/>
+      </p:par>
+    </p:tnLst>
+  </p:timing>
+</p:sld>
+</file>
+
+<file path=ppt/slides/slide4.xml><?xml version="1.0" encoding="utf-8"?>
+<p:sld xmlns:a="http://schemas.openxmlformats.org/drawingml/2006/main" xmlns:r="http://schemas.openxmlformats.org/officeDocument/2006/relationships" xmlns:p="http://schemas.openxmlformats.org/presentationml/2006/main">
+  <p:cSld>
+    <p:spTree>
+      <p:nvGrpSpPr>
+        <p:cNvPr id="1" name=""/>
+        <p:cNvGrpSpPr/>
+        <p:nvPr/>
+      </p:nvGrpSpPr>
+      <p:grpSpPr>
+        <a:xfrm>
+          <a:off x="0" y="0"/>
+          <a:ext cx="0" cy="0"/>
+          <a:chOff x="0" y="0"/>
+          <a:chExt cx="0" cy="0"/>
+        </a:xfrm>
+      </p:grpSpPr>
+      <p:sp>
+        <p:nvSpPr>
+          <p:cNvPr id="4" name="文本框 3"/>
+          <p:cNvSpPr txBox="1"/>
+          <p:nvPr/>
+        </p:nvSpPr>
+        <p:spPr>
+          <a:xfrm>
+            <a:off x="186430" y="133165"/>
+            <a:ext cx="787395" cy="369332"/>
+          </a:xfrm>
+          <a:prstGeom prst="rect">
+            <a:avLst/>
+          </a:prstGeom>
+          <a:noFill/>
+        </p:spPr>
+        <p:txBody>
+          <a:bodyPr wrap="none" rtlCol="0">
+            <a:spAutoFit/>
+          </a:bodyPr>
+          <a:lstStyle/>
+          <a:p>
+            <a:r>
+              <a:rPr lang="en-US" altLang="zh-CN" smtClean="0"/>
+              <a:t>JDBC</a:t>
+            </a:r>
+            <a:endParaRPr lang="zh-CN" altLang="en-US" dirty="0"/>
+          </a:p>
+        </p:txBody>
+      </p:sp>
+      <p:sp>
+        <p:nvSpPr>
+          <p:cNvPr id="5" name="文本框 4"/>
+          <p:cNvSpPr txBox="1"/>
+          <p:nvPr/>
+        </p:nvSpPr>
+        <p:spPr>
+          <a:xfrm>
+            <a:off x="1269507" y="1269507"/>
+            <a:ext cx="1159292" cy="1477328"/>
+          </a:xfrm>
+          <a:prstGeom prst="rect">
+            <a:avLst/>
+          </a:prstGeom>
+          <a:noFill/>
+        </p:spPr>
+        <p:txBody>
+          <a:bodyPr wrap="none" rtlCol="0">
+            <a:spAutoFit/>
+          </a:bodyPr>
+          <a:lstStyle/>
+          <a:p>
+            <a:r>
+              <a:rPr lang="en-US" altLang="zh-CN" dirty="0" smtClean="0">
+                <a:hlinkClick r:id="rId2"/>
+              </a:rPr>
+              <a:t>Jdbc1</a:t>
+            </a:r>
+            <a:endParaRPr lang="en-US" altLang="zh-CN" dirty="0" smtClean="0"/>
+          </a:p>
+          <a:p>
+            <a:r>
+              <a:rPr lang="en-US" altLang="zh-CN" dirty="0" smtClean="0">
+                <a:hlinkClick r:id="rId3"/>
+              </a:rPr>
+              <a:t>Jdbc2</a:t>
+            </a:r>
+            <a:endParaRPr lang="en-US" altLang="zh-CN" dirty="0" smtClean="0"/>
+          </a:p>
+          <a:p>
+            <a:r>
+              <a:rPr lang="en-US" altLang="zh-CN" dirty="0" smtClean="0">
+                <a:hlinkClick r:id="rId4"/>
+              </a:rPr>
+              <a:t>Jdbc3</a:t>
+            </a:r>
+            <a:endParaRPr lang="en-US" altLang="zh-CN" dirty="0" smtClean="0"/>
+          </a:p>
+          <a:p>
+            <a:r>
+              <a:rPr lang="en-US" altLang="zh-CN" dirty="0" smtClean="0">
+                <a:hlinkClick r:id="rId5"/>
+              </a:rPr>
+              <a:t>Classfor1</a:t>
+            </a:r>
+            <a:endParaRPr lang="en-US" altLang="zh-CN" dirty="0" smtClean="0"/>
+          </a:p>
+          <a:p>
+            <a:r>
+              <a:rPr lang="en-US" altLang="zh-CN" smtClean="0">
+                <a:hlinkClick r:id="rId6"/>
+              </a:rPr>
+              <a:t>Classfor2</a:t>
+            </a:r>
+            <a:endParaRPr lang="zh-CN" altLang="en-US" dirty="0"/>
+          </a:p>
+        </p:txBody>
+      </p:sp>
+    </p:spTree>
+    <p:extLst>
+      <p:ext uri="{BB962C8B-B14F-4D97-AF65-F5344CB8AC3E}">
+        <p14:creationId xmlns:p14="http://schemas.microsoft.com/office/powerpoint/2010/main" val="1035688067"/>
+      </p:ext>
+    </p:extLst>
+  </p:cSld>
+  <p:clrMapOvr>
+    <a:masterClrMapping/>
+  </p:clrMapOvr>
+  <p:timing>
+    <p:tnLst>
+      <p:par>
+        <p:cTn id="1" dur="indefinite" restart="never" nodeType="tmRoot"/>
+      </p:par>
+    </p:tnLst>
+  </p:timing>
 </p:sld>
 </file>
 

</xml_diff>

<commit_message>
Add the lock study
</commit_message>
<xml_diff>
--- a/JavaStudyRecord/JavaStudyRecord.pptx
+++ b/JavaStudyRecord/JavaStudyRecord.pptx
@@ -9,6 +9,7 @@
     <p:sldId id="256" r:id="rId3"/>
     <p:sldId id="258" r:id="rId4"/>
     <p:sldId id="259" r:id="rId5"/>
+    <p:sldId id="260" r:id="rId6"/>
   </p:sldIdLst>
   <p:sldSz cx="12192000" cy="6858000"/>
   <p:notesSz cx="7559675" cy="10691813"/>
@@ -4333,14 +4334,6 @@
   <p:clrMapOvr>
     <a:masterClrMapping/>
   </p:clrMapOvr>
-  <mc:AlternateContent xmlns:mc="http://schemas.openxmlformats.org/markup-compatibility/2006" xmlns:p14="http://schemas.microsoft.com/office/powerpoint/2010/main">
-    <mc:Choice Requires="p14">
-      <p:transition spd="slow" p14:dur="2000"/>
-    </mc:Choice>
-    <mc:Fallback xmlns="" xmlns:p15="http://schemas.microsoft.com/office/powerpoint/2012/main">
-      <p:transition spd="slow"/>
-    </mc:Fallback>
-  </mc:AlternateContent>
   <p:timing>
     <p:tnLst>
       <p:par>
@@ -4579,14 +4572,6 @@
   <p:clrMapOvr>
     <a:masterClrMapping/>
   </p:clrMapOvr>
-  <mc:AlternateContent xmlns:mc="http://schemas.openxmlformats.org/markup-compatibility/2006" xmlns:p14="http://schemas.microsoft.com/office/powerpoint/2010/main">
-    <mc:Choice Requires="p14">
-      <p:transition spd="slow" p14:dur="2000"/>
-    </mc:Choice>
-    <mc:Fallback xmlns="" xmlns:p15="http://schemas.microsoft.com/office/powerpoint/2012/main">
-      <p:transition spd="slow"/>
-    </mc:Fallback>
-  </mc:AlternateContent>
   <p:timing>
     <p:tnLst>
       <p:par>
@@ -4657,11 +4642,11 @@
           <a:lstStyle/>
           <a:p>
             <a:r>
-              <a:rPr lang="en-US" altLang="zh-CN" dirty="0" err="1" smtClean="0"/>
+              <a:rPr lang="en-US" altLang="zh-CN" dirty="0" err="1"/>
               <a:t>MySql</a:t>
             </a:r>
             <a:r>
-              <a:rPr lang="en-US" altLang="zh-CN" dirty="0" smtClean="0"/>
+              <a:rPr lang="en-US" altLang="zh-CN" dirty="0"/>
               <a:t> Study</a:t>
             </a:r>
             <a:endParaRPr lang="zh-CN" altLang="en-US" dirty="0"/>
@@ -4691,25 +4676,25 @@
           <a:lstStyle/>
           <a:p>
             <a:r>
-              <a:rPr lang="en-US" altLang="zh-CN" dirty="0" smtClean="0">
+              <a:rPr lang="en-US" altLang="zh-CN" dirty="0">
                 <a:hlinkClick r:id="rId2"/>
               </a:rPr>
               <a:t>Mysql-1</a:t>
             </a:r>
-            <a:endParaRPr lang="en-US" altLang="zh-CN" dirty="0" smtClean="0"/>
+            <a:endParaRPr lang="en-US" altLang="zh-CN" dirty="0"/>
           </a:p>
           <a:p>
             <a:r>
-              <a:rPr lang="en-US" altLang="zh-CN" dirty="0" smtClean="0">
+              <a:rPr lang="en-US" altLang="zh-CN" dirty="0">
                 <a:hlinkClick r:id="rId3"/>
               </a:rPr>
               <a:t>MySql-2</a:t>
             </a:r>
-            <a:endParaRPr lang="en-US" altLang="zh-CN" dirty="0" smtClean="0"/>
+            <a:endParaRPr lang="en-US" altLang="zh-CN" dirty="0"/>
           </a:p>
           <a:p>
             <a:r>
-              <a:rPr lang="en-US" altLang="zh-CN" dirty="0" smtClean="0">
+              <a:rPr lang="en-US" altLang="zh-CN" dirty="0">
                 <a:hlinkClick r:id="rId4"/>
               </a:rPr>
               <a:t>MySql-3</a:t>
@@ -4722,6 +4707,128 @@
     <p:extLst>
       <p:ext uri="{BB962C8B-B14F-4D97-AF65-F5344CB8AC3E}">
         <p14:creationId xmlns:p14="http://schemas.microsoft.com/office/powerpoint/2010/main" val="2352770958"/>
+      </p:ext>
+    </p:extLst>
+  </p:cSld>
+  <p:clrMapOvr>
+    <a:masterClrMapping/>
+  </p:clrMapOvr>
+</p:sld>
+</file>
+
+<file path=ppt/slides/slide4.xml><?xml version="1.0" encoding="utf-8"?>
+<p:sld xmlns:a="http://schemas.openxmlformats.org/drawingml/2006/main" xmlns:r="http://schemas.openxmlformats.org/officeDocument/2006/relationships" xmlns:p="http://schemas.openxmlformats.org/presentationml/2006/main">
+  <p:cSld>
+    <p:spTree>
+      <p:nvGrpSpPr>
+        <p:cNvPr id="1" name=""/>
+        <p:cNvGrpSpPr/>
+        <p:nvPr/>
+      </p:nvGrpSpPr>
+      <p:grpSpPr>
+        <a:xfrm>
+          <a:off x="0" y="0"/>
+          <a:ext cx="0" cy="0"/>
+          <a:chOff x="0" y="0"/>
+          <a:chExt cx="0" cy="0"/>
+        </a:xfrm>
+      </p:grpSpPr>
+      <p:sp>
+        <p:nvSpPr>
+          <p:cNvPr id="4" name="文字方塊 3">
+            <a:extLst>
+              <a:ext uri="{FF2B5EF4-FFF2-40B4-BE49-F238E27FC236}">
+                <a16:creationId xmlns:a16="http://schemas.microsoft.com/office/drawing/2014/main" id="{E8A75BC5-3B32-43CC-AFBE-1100EBF4B28C}"/>
+              </a:ext>
+            </a:extLst>
+          </p:cNvPr>
+          <p:cNvSpPr txBox="1"/>
+          <p:nvPr/>
+        </p:nvSpPr>
+        <p:spPr>
+          <a:xfrm>
+            <a:off x="254000" y="386080"/>
+            <a:ext cx="1223412" cy="369332"/>
+          </a:xfrm>
+          <a:prstGeom prst="rect">
+            <a:avLst/>
+          </a:prstGeom>
+          <a:noFill/>
+        </p:spPr>
+        <p:txBody>
+          <a:bodyPr wrap="none" rtlCol="0">
+            <a:spAutoFit/>
+          </a:bodyPr>
+          <a:lstStyle/>
+          <a:p>
+            <a:r>
+              <a:rPr lang="en-US" altLang="zh-TW" dirty="0"/>
+              <a:t>Java Lock</a:t>
+            </a:r>
+            <a:endParaRPr lang="zh-TW" altLang="en-US" dirty="0"/>
+          </a:p>
+        </p:txBody>
+      </p:sp>
+      <p:sp>
+        <p:nvSpPr>
+          <p:cNvPr id="5" name="文字方塊 4">
+            <a:extLst>
+              <a:ext uri="{FF2B5EF4-FFF2-40B4-BE49-F238E27FC236}">
+                <a16:creationId xmlns:a16="http://schemas.microsoft.com/office/drawing/2014/main" id="{B31A761E-CAF7-4B26-970D-72B7E1A29696}"/>
+              </a:ext>
+            </a:extLst>
+          </p:cNvPr>
+          <p:cNvSpPr txBox="1"/>
+          <p:nvPr/>
+        </p:nvSpPr>
+        <p:spPr>
+          <a:xfrm>
+            <a:off x="1158240" y="1330960"/>
+            <a:ext cx="1287532" cy="923330"/>
+          </a:xfrm>
+          <a:prstGeom prst="rect">
+            <a:avLst/>
+          </a:prstGeom>
+          <a:noFill/>
+        </p:spPr>
+        <p:txBody>
+          <a:bodyPr wrap="none" rtlCol="0">
+            <a:spAutoFit/>
+          </a:bodyPr>
+          <a:lstStyle/>
+          <a:p>
+            <a:r>
+              <a:rPr lang="en-US" altLang="zh-TW" dirty="0">
+                <a:hlinkClick r:id="rId2"/>
+              </a:rPr>
+              <a:t>JavaLock1</a:t>
+            </a:r>
+            <a:endParaRPr lang="en-US" altLang="zh-TW" dirty="0"/>
+          </a:p>
+          <a:p>
+            <a:r>
+              <a:rPr lang="en-US" altLang="zh-TW" dirty="0">
+                <a:hlinkClick r:id="rId3"/>
+              </a:rPr>
+              <a:t>JavaLock2</a:t>
+            </a:r>
+            <a:endParaRPr lang="en-US" altLang="zh-TW" dirty="0"/>
+          </a:p>
+          <a:p>
+            <a:r>
+              <a:rPr lang="en-US" altLang="zh-TW" dirty="0">
+                <a:hlinkClick r:id="rId4"/>
+              </a:rPr>
+              <a:t>JavaLock3</a:t>
+            </a:r>
+            <a:endParaRPr lang="en-US" altLang="zh-TW" dirty="0"/>
+          </a:p>
+        </p:txBody>
+      </p:sp>
+    </p:spTree>
+    <p:extLst>
+      <p:ext uri="{BB962C8B-B14F-4D97-AF65-F5344CB8AC3E}">
+        <p14:creationId xmlns:p14="http://schemas.microsoft.com/office/powerpoint/2010/main" val="1699367153"/>
       </p:ext>
     </p:extLst>
   </p:cSld>

</xml_diff>